<commit_message>
Changes to Notebook 5 & reports
Notebook 5 was updated along with  reports and slides.
</commit_message>
<xml_diff>
--- a/Big Mountain Resort.pptx
+++ b/Big Mountain Resort.pptx
@@ -4,15 +4,20 @@
   <p:sldMasterIdLst>
     <p:sldMasterId id="2147483648" r:id="rId1"/>
   </p:sldMasterIdLst>
+  <p:notesMasterIdLst>
+    <p:notesMasterId r:id="rId12"/>
+  </p:notesMasterIdLst>
   <p:sldIdLst>
     <p:sldId id="256" r:id="rId2"/>
     <p:sldId id="260" r:id="rId3"/>
-    <p:sldId id="257" r:id="rId4"/>
-    <p:sldId id="259" r:id="rId5"/>
+    <p:sldId id="265" r:id="rId4"/>
+    <p:sldId id="270" r:id="rId5"/>
     <p:sldId id="261" r:id="rId6"/>
     <p:sldId id="262" r:id="rId7"/>
-    <p:sldId id="258" r:id="rId8"/>
-    <p:sldId id="263" r:id="rId9"/>
+    <p:sldId id="268" r:id="rId8"/>
+    <p:sldId id="269" r:id="rId9"/>
+    <p:sldId id="266" r:id="rId10"/>
+    <p:sldId id="267" r:id="rId11"/>
   </p:sldIdLst>
   <p:sldSz cx="12192000" cy="6858000"/>
   <p:notesSz cx="6858000" cy="9144000"/>
@@ -111,7 +116,361 @@
       </a:defRPr>
     </a:lvl9pPr>
   </p:defaultTextStyle>
+  <p:extLst>
+    <p:ext uri="{EFAFB233-063F-42B5-8137-9DF3F51BA10A}">
+      <p15:sldGuideLst xmlns:p15="http://schemas.microsoft.com/office/powerpoint/2012/main"/>
+    </p:ext>
+  </p:extLst>
 </p:presentation>
+</file>
+
+<file path=ppt/notesMasters/notesMaster1.xml><?xml version="1.0" encoding="utf-8"?>
+<p:notesMaster xmlns:a="http://schemas.openxmlformats.org/drawingml/2006/main" xmlns:r="http://schemas.openxmlformats.org/officeDocument/2006/relationships" xmlns:p="http://schemas.openxmlformats.org/presentationml/2006/main">
+  <p:cSld>
+    <p:bg>
+      <p:bgRef idx="1001">
+        <a:schemeClr val="bg1"/>
+      </p:bgRef>
+    </p:bg>
+    <p:spTree>
+      <p:nvGrpSpPr>
+        <p:cNvPr id="1" name=""/>
+        <p:cNvGrpSpPr/>
+        <p:nvPr/>
+      </p:nvGrpSpPr>
+      <p:grpSpPr>
+        <a:xfrm>
+          <a:off x="0" y="0"/>
+          <a:ext cx="0" cy="0"/>
+          <a:chOff x="0" y="0"/>
+          <a:chExt cx="0" cy="0"/>
+        </a:xfrm>
+      </p:grpSpPr>
+      <p:sp>
+        <p:nvSpPr>
+          <p:cNvPr id="2" name="Header Placeholder 1"/>
+          <p:cNvSpPr>
+            <a:spLocks noGrp="1"/>
+          </p:cNvSpPr>
+          <p:nvPr>
+            <p:ph type="hdr" sz="quarter"/>
+          </p:nvPr>
+        </p:nvSpPr>
+        <p:spPr>
+          <a:xfrm>
+            <a:off x="0" y="0"/>
+            <a:ext cx="2971800" cy="458788"/>
+          </a:xfrm>
+          <a:prstGeom prst="rect">
+            <a:avLst/>
+          </a:prstGeom>
+        </p:spPr>
+        <p:txBody>
+          <a:bodyPr vert="horz" lIns="91440" tIns="45720" rIns="91440" bIns="45720" rtlCol="0"/>
+          <a:lstStyle>
+            <a:lvl1pPr algn="l">
+              <a:defRPr sz="1200"/>
+            </a:lvl1pPr>
+          </a:lstStyle>
+          <a:p>
+            <a:endParaRPr lang="en-US"/>
+          </a:p>
+        </p:txBody>
+      </p:sp>
+      <p:sp>
+        <p:nvSpPr>
+          <p:cNvPr id="3" name="Date Placeholder 2"/>
+          <p:cNvSpPr>
+            <a:spLocks noGrp="1"/>
+          </p:cNvSpPr>
+          <p:nvPr>
+            <p:ph type="dt" idx="1"/>
+          </p:nvPr>
+        </p:nvSpPr>
+        <p:spPr>
+          <a:xfrm>
+            <a:off x="3884613" y="0"/>
+            <a:ext cx="2971800" cy="458788"/>
+          </a:xfrm>
+          <a:prstGeom prst="rect">
+            <a:avLst/>
+          </a:prstGeom>
+        </p:spPr>
+        <p:txBody>
+          <a:bodyPr vert="horz" lIns="91440" tIns="45720" rIns="91440" bIns="45720" rtlCol="0"/>
+          <a:lstStyle>
+            <a:lvl1pPr algn="r">
+              <a:defRPr sz="1200"/>
+            </a:lvl1pPr>
+          </a:lstStyle>
+          <a:p>
+            <a:fld id="{92B8FD82-41A7-4D24-90B2-4623A0F63EEB}" type="datetimeFigureOut">
+              <a:rPr lang="en-US" smtClean="0"/>
+              <a:t>12/7/2020</a:t>
+            </a:fld>
+            <a:endParaRPr lang="en-US"/>
+          </a:p>
+        </p:txBody>
+      </p:sp>
+      <p:sp>
+        <p:nvSpPr>
+          <p:cNvPr id="4" name="Slide Image Placeholder 3"/>
+          <p:cNvSpPr>
+            <a:spLocks noGrp="1" noRot="1" noChangeAspect="1"/>
+          </p:cNvSpPr>
+          <p:nvPr>
+            <p:ph type="sldImg" idx="2"/>
+          </p:nvPr>
+        </p:nvSpPr>
+        <p:spPr>
+          <a:xfrm>
+            <a:off x="685800" y="1143000"/>
+            <a:ext cx="5486400" cy="3086100"/>
+          </a:xfrm>
+          <a:prstGeom prst="rect">
+            <a:avLst/>
+          </a:prstGeom>
+          <a:noFill/>
+          <a:ln w="12700">
+            <a:solidFill>
+              <a:prstClr val="black"/>
+            </a:solidFill>
+          </a:ln>
+        </p:spPr>
+        <p:txBody>
+          <a:bodyPr vert="horz" lIns="91440" tIns="45720" rIns="91440" bIns="45720" rtlCol="0" anchor="ctr"/>
+          <a:lstStyle/>
+          <a:p>
+            <a:endParaRPr lang="en-US"/>
+          </a:p>
+        </p:txBody>
+      </p:sp>
+      <p:sp>
+        <p:nvSpPr>
+          <p:cNvPr id="5" name="Notes Placeholder 4"/>
+          <p:cNvSpPr>
+            <a:spLocks noGrp="1"/>
+          </p:cNvSpPr>
+          <p:nvPr>
+            <p:ph type="body" sz="quarter" idx="3"/>
+          </p:nvPr>
+        </p:nvSpPr>
+        <p:spPr>
+          <a:xfrm>
+            <a:off x="685800" y="4400550"/>
+            <a:ext cx="5486400" cy="3600450"/>
+          </a:xfrm>
+          <a:prstGeom prst="rect">
+            <a:avLst/>
+          </a:prstGeom>
+        </p:spPr>
+        <p:txBody>
+          <a:bodyPr vert="horz" lIns="91440" tIns="45720" rIns="91440" bIns="45720" rtlCol="0"/>
+          <a:lstStyle/>
+          <a:p>
+            <a:pPr lvl="0"/>
+            <a:r>
+              <a:rPr lang="en-US"/>
+              <a:t>Click to edit Master text styles</a:t>
+            </a:r>
+          </a:p>
+          <a:p>
+            <a:pPr lvl="1"/>
+            <a:r>
+              <a:rPr lang="en-US"/>
+              <a:t>Second level</a:t>
+            </a:r>
+          </a:p>
+          <a:p>
+            <a:pPr lvl="2"/>
+            <a:r>
+              <a:rPr lang="en-US"/>
+              <a:t>Third level</a:t>
+            </a:r>
+          </a:p>
+          <a:p>
+            <a:pPr lvl="3"/>
+            <a:r>
+              <a:rPr lang="en-US"/>
+              <a:t>Fourth level</a:t>
+            </a:r>
+          </a:p>
+          <a:p>
+            <a:pPr lvl="4"/>
+            <a:r>
+              <a:rPr lang="en-US"/>
+              <a:t>Fifth level</a:t>
+            </a:r>
+          </a:p>
+        </p:txBody>
+      </p:sp>
+      <p:sp>
+        <p:nvSpPr>
+          <p:cNvPr id="6" name="Footer Placeholder 5"/>
+          <p:cNvSpPr>
+            <a:spLocks noGrp="1"/>
+          </p:cNvSpPr>
+          <p:nvPr>
+            <p:ph type="ftr" sz="quarter" idx="4"/>
+          </p:nvPr>
+        </p:nvSpPr>
+        <p:spPr>
+          <a:xfrm>
+            <a:off x="0" y="8685213"/>
+            <a:ext cx="2971800" cy="458787"/>
+          </a:xfrm>
+          <a:prstGeom prst="rect">
+            <a:avLst/>
+          </a:prstGeom>
+        </p:spPr>
+        <p:txBody>
+          <a:bodyPr vert="horz" lIns="91440" tIns="45720" rIns="91440" bIns="45720" rtlCol="0" anchor="b"/>
+          <a:lstStyle>
+            <a:lvl1pPr algn="l">
+              <a:defRPr sz="1200"/>
+            </a:lvl1pPr>
+          </a:lstStyle>
+          <a:p>
+            <a:endParaRPr lang="en-US"/>
+          </a:p>
+        </p:txBody>
+      </p:sp>
+      <p:sp>
+        <p:nvSpPr>
+          <p:cNvPr id="7" name="Slide Number Placeholder 6"/>
+          <p:cNvSpPr>
+            <a:spLocks noGrp="1"/>
+          </p:cNvSpPr>
+          <p:nvPr>
+            <p:ph type="sldNum" sz="quarter" idx="5"/>
+          </p:nvPr>
+        </p:nvSpPr>
+        <p:spPr>
+          <a:xfrm>
+            <a:off x="3884613" y="8685213"/>
+            <a:ext cx="2971800" cy="458787"/>
+          </a:xfrm>
+          <a:prstGeom prst="rect">
+            <a:avLst/>
+          </a:prstGeom>
+        </p:spPr>
+        <p:txBody>
+          <a:bodyPr vert="horz" lIns="91440" tIns="45720" rIns="91440" bIns="45720" rtlCol="0" anchor="b"/>
+          <a:lstStyle>
+            <a:lvl1pPr algn="r">
+              <a:defRPr sz="1200"/>
+            </a:lvl1pPr>
+          </a:lstStyle>
+          <a:p>
+            <a:fld id="{0C783CA7-6DE4-4D33-A296-6D408421803A}" type="slidenum">
+              <a:rPr lang="en-US" smtClean="0"/>
+              <a:t>‹#›</a:t>
+            </a:fld>
+            <a:endParaRPr lang="en-US"/>
+          </a:p>
+        </p:txBody>
+      </p:sp>
+    </p:spTree>
+    <p:extLst>
+      <p:ext uri="{BB962C8B-B14F-4D97-AF65-F5344CB8AC3E}">
+        <p14:creationId xmlns:p14="http://schemas.microsoft.com/office/powerpoint/2010/main" val="375901428"/>
+      </p:ext>
+    </p:extLst>
+  </p:cSld>
+  <p:clrMap bg1="lt1" tx1="dk1" bg2="lt2" tx2="dk2" accent1="accent1" accent2="accent2" accent3="accent3" accent4="accent4" accent5="accent5" accent6="accent6" hlink="hlink" folHlink="folHlink"/>
+  <p:notesStyle>
+    <a:lvl1pPr marL="0" algn="l" defTabSz="914400" rtl="0" eaLnBrk="1" latinLnBrk="0" hangingPunct="1">
+      <a:defRPr sz="1200" kern="1200">
+        <a:solidFill>
+          <a:schemeClr val="tx1"/>
+        </a:solidFill>
+        <a:latin typeface="+mn-lt"/>
+        <a:ea typeface="+mn-ea"/>
+        <a:cs typeface="+mn-cs"/>
+      </a:defRPr>
+    </a:lvl1pPr>
+    <a:lvl2pPr marL="457200" algn="l" defTabSz="914400" rtl="0" eaLnBrk="1" latinLnBrk="0" hangingPunct="1">
+      <a:defRPr sz="1200" kern="1200">
+        <a:solidFill>
+          <a:schemeClr val="tx1"/>
+        </a:solidFill>
+        <a:latin typeface="+mn-lt"/>
+        <a:ea typeface="+mn-ea"/>
+        <a:cs typeface="+mn-cs"/>
+      </a:defRPr>
+    </a:lvl2pPr>
+    <a:lvl3pPr marL="914400" algn="l" defTabSz="914400" rtl="0" eaLnBrk="1" latinLnBrk="0" hangingPunct="1">
+      <a:defRPr sz="1200" kern="1200">
+        <a:solidFill>
+          <a:schemeClr val="tx1"/>
+        </a:solidFill>
+        <a:latin typeface="+mn-lt"/>
+        <a:ea typeface="+mn-ea"/>
+        <a:cs typeface="+mn-cs"/>
+      </a:defRPr>
+    </a:lvl3pPr>
+    <a:lvl4pPr marL="1371600" algn="l" defTabSz="914400" rtl="0" eaLnBrk="1" latinLnBrk="0" hangingPunct="1">
+      <a:defRPr sz="1200" kern="1200">
+        <a:solidFill>
+          <a:schemeClr val="tx1"/>
+        </a:solidFill>
+        <a:latin typeface="+mn-lt"/>
+        <a:ea typeface="+mn-ea"/>
+        <a:cs typeface="+mn-cs"/>
+      </a:defRPr>
+    </a:lvl4pPr>
+    <a:lvl5pPr marL="1828800" algn="l" defTabSz="914400" rtl="0" eaLnBrk="1" latinLnBrk="0" hangingPunct="1">
+      <a:defRPr sz="1200" kern="1200">
+        <a:solidFill>
+          <a:schemeClr val="tx1"/>
+        </a:solidFill>
+        <a:latin typeface="+mn-lt"/>
+        <a:ea typeface="+mn-ea"/>
+        <a:cs typeface="+mn-cs"/>
+      </a:defRPr>
+    </a:lvl5pPr>
+    <a:lvl6pPr marL="2286000" algn="l" defTabSz="914400" rtl="0" eaLnBrk="1" latinLnBrk="0" hangingPunct="1">
+      <a:defRPr sz="1200" kern="1200">
+        <a:solidFill>
+          <a:schemeClr val="tx1"/>
+        </a:solidFill>
+        <a:latin typeface="+mn-lt"/>
+        <a:ea typeface="+mn-ea"/>
+        <a:cs typeface="+mn-cs"/>
+      </a:defRPr>
+    </a:lvl6pPr>
+    <a:lvl7pPr marL="2743200" algn="l" defTabSz="914400" rtl="0" eaLnBrk="1" latinLnBrk="0" hangingPunct="1">
+      <a:defRPr sz="1200" kern="1200">
+        <a:solidFill>
+          <a:schemeClr val="tx1"/>
+        </a:solidFill>
+        <a:latin typeface="+mn-lt"/>
+        <a:ea typeface="+mn-ea"/>
+        <a:cs typeface="+mn-cs"/>
+      </a:defRPr>
+    </a:lvl7pPr>
+    <a:lvl8pPr marL="3200400" algn="l" defTabSz="914400" rtl="0" eaLnBrk="1" latinLnBrk="0" hangingPunct="1">
+      <a:defRPr sz="1200" kern="1200">
+        <a:solidFill>
+          <a:schemeClr val="tx1"/>
+        </a:solidFill>
+        <a:latin typeface="+mn-lt"/>
+        <a:ea typeface="+mn-ea"/>
+        <a:cs typeface="+mn-cs"/>
+      </a:defRPr>
+    </a:lvl8pPr>
+    <a:lvl9pPr marL="3657600" algn="l" defTabSz="914400" rtl="0" eaLnBrk="1" latinLnBrk="0" hangingPunct="1">
+      <a:defRPr sz="1200" kern="1200">
+        <a:solidFill>
+          <a:schemeClr val="tx1"/>
+        </a:solidFill>
+        <a:latin typeface="+mn-lt"/>
+        <a:ea typeface="+mn-ea"/>
+        <a:cs typeface="+mn-cs"/>
+      </a:defRPr>
+    </a:lvl9pPr>
+  </p:notesStyle>
+</p:notesMaster>
 </file>
 
 <file path=ppt/slideLayouts/slideLayout1.xml><?xml version="1.0" encoding="utf-8"?>
@@ -259,9 +618,9 @@
           <a:bodyPr/>
           <a:lstStyle/>
           <a:p>
-            <a:fld id="{C4488ED7-FD37-47A2-B0D5-A4379C96F5C7}" type="datetimeFigureOut">
+            <a:fld id="{830ACA9B-9442-4F74-96F9-19F78F3499A5}" type="datetime1">
               <a:rPr lang="en-US" smtClean="0"/>
-              <a:t>11/12/2020</a:t>
+              <a:t>12/7/2020</a:t>
             </a:fld>
             <a:endParaRPr lang="en-US"/>
           </a:p>
@@ -457,9 +816,9 @@
           <a:bodyPr/>
           <a:lstStyle/>
           <a:p>
-            <a:fld id="{C4488ED7-FD37-47A2-B0D5-A4379C96F5C7}" type="datetimeFigureOut">
+            <a:fld id="{758F8F29-EEED-4DC8-9212-332E75A5F327}" type="datetime1">
               <a:rPr lang="en-US" smtClean="0"/>
-              <a:t>11/12/2020</a:t>
+              <a:t>12/7/2020</a:t>
             </a:fld>
             <a:endParaRPr lang="en-US"/>
           </a:p>
@@ -665,9 +1024,9 @@
           <a:bodyPr/>
           <a:lstStyle/>
           <a:p>
-            <a:fld id="{C4488ED7-FD37-47A2-B0D5-A4379C96F5C7}" type="datetimeFigureOut">
+            <a:fld id="{73028C82-8057-4882-BEC1-8FDDF63AD5FF}" type="datetime1">
               <a:rPr lang="en-US" smtClean="0"/>
-              <a:t>11/12/2020</a:t>
+              <a:t>12/7/2020</a:t>
             </a:fld>
             <a:endParaRPr lang="en-US"/>
           </a:p>
@@ -863,9 +1222,9 @@
           <a:bodyPr/>
           <a:lstStyle/>
           <a:p>
-            <a:fld id="{C4488ED7-FD37-47A2-B0D5-A4379C96F5C7}" type="datetimeFigureOut">
+            <a:fld id="{EECF5C26-C894-4584-9E07-3B0F580A521B}" type="datetime1">
               <a:rPr lang="en-US" smtClean="0"/>
-              <a:t>11/12/2020</a:t>
+              <a:t>12/7/2020</a:t>
             </a:fld>
             <a:endParaRPr lang="en-US"/>
           </a:p>
@@ -1138,9 +1497,9 @@
           <a:bodyPr/>
           <a:lstStyle/>
           <a:p>
-            <a:fld id="{C4488ED7-FD37-47A2-B0D5-A4379C96F5C7}" type="datetimeFigureOut">
+            <a:fld id="{7B1ADD36-E10D-464A-994D-65F18547E4A5}" type="datetime1">
               <a:rPr lang="en-US" smtClean="0"/>
-              <a:t>11/12/2020</a:t>
+              <a:t>12/7/2020</a:t>
             </a:fld>
             <a:endParaRPr lang="en-US"/>
           </a:p>
@@ -1403,9 +1762,9 @@
           <a:bodyPr/>
           <a:lstStyle/>
           <a:p>
-            <a:fld id="{C4488ED7-FD37-47A2-B0D5-A4379C96F5C7}" type="datetimeFigureOut">
+            <a:fld id="{4D9D4978-EB32-4210-B705-694020E7E134}" type="datetime1">
               <a:rPr lang="en-US" smtClean="0"/>
-              <a:t>11/12/2020</a:t>
+              <a:t>12/7/2020</a:t>
             </a:fld>
             <a:endParaRPr lang="en-US"/>
           </a:p>
@@ -1815,9 +2174,9 @@
           <a:bodyPr/>
           <a:lstStyle/>
           <a:p>
-            <a:fld id="{C4488ED7-FD37-47A2-B0D5-A4379C96F5C7}" type="datetimeFigureOut">
+            <a:fld id="{A70CF036-046F-488A-8C04-F3F1B0D17B4F}" type="datetime1">
               <a:rPr lang="en-US" smtClean="0"/>
-              <a:t>11/12/2020</a:t>
+              <a:t>12/7/2020</a:t>
             </a:fld>
             <a:endParaRPr lang="en-US"/>
           </a:p>
@@ -1956,9 +2315,9 @@
           <a:bodyPr/>
           <a:lstStyle/>
           <a:p>
-            <a:fld id="{C4488ED7-FD37-47A2-B0D5-A4379C96F5C7}" type="datetimeFigureOut">
+            <a:fld id="{EAD143C0-77F7-4A46-BF57-CD6FB5D3F94D}" type="datetime1">
               <a:rPr lang="en-US" smtClean="0"/>
-              <a:t>11/12/2020</a:t>
+              <a:t>12/7/2020</a:t>
             </a:fld>
             <a:endParaRPr lang="en-US"/>
           </a:p>
@@ -2069,9 +2428,9 @@
           <a:bodyPr/>
           <a:lstStyle/>
           <a:p>
-            <a:fld id="{C4488ED7-FD37-47A2-B0D5-A4379C96F5C7}" type="datetimeFigureOut">
+            <a:fld id="{D41F078E-A17B-41D7-8695-590531BAB3BB}" type="datetime1">
               <a:rPr lang="en-US" smtClean="0"/>
-              <a:t>11/12/2020</a:t>
+              <a:t>12/7/2020</a:t>
             </a:fld>
             <a:endParaRPr lang="en-US"/>
           </a:p>
@@ -2380,9 +2739,9 @@
           <a:bodyPr/>
           <a:lstStyle/>
           <a:p>
-            <a:fld id="{C4488ED7-FD37-47A2-B0D5-A4379C96F5C7}" type="datetimeFigureOut">
+            <a:fld id="{63932EE6-3832-4B82-9DD2-5A3A53A138E8}" type="datetime1">
               <a:rPr lang="en-US" smtClean="0"/>
-              <a:t>11/12/2020</a:t>
+              <a:t>12/7/2020</a:t>
             </a:fld>
             <a:endParaRPr lang="en-US"/>
           </a:p>
@@ -2668,9 +3027,9 @@
           <a:bodyPr/>
           <a:lstStyle/>
           <a:p>
-            <a:fld id="{C4488ED7-FD37-47A2-B0D5-A4379C96F5C7}" type="datetimeFigureOut">
+            <a:fld id="{58E55B0C-B969-45CC-A37D-6F760B80D721}" type="datetime1">
               <a:rPr lang="en-US" smtClean="0"/>
-              <a:t>11/12/2020</a:t>
+              <a:t>12/7/2020</a:t>
             </a:fld>
             <a:endParaRPr lang="en-US"/>
           </a:p>
@@ -2909,9 +3268,9 @@
             </a:lvl1pPr>
           </a:lstStyle>
           <a:p>
-            <a:fld id="{C4488ED7-FD37-47A2-B0D5-A4379C96F5C7}" type="datetimeFigureOut">
+            <a:fld id="{95B1C77C-B584-40A7-BECC-DCE471DABE69}" type="datetime1">
               <a:rPr lang="en-US" smtClean="0"/>
-              <a:t>11/12/2020</a:t>
+              <a:t>12/7/2020</a:t>
             </a:fld>
             <a:endParaRPr lang="en-US"/>
           </a:p>
@@ -3028,6 +3387,7 @@
     <p:sldLayoutId id="2147483658" r:id="rId10"/>
     <p:sldLayoutId id="2147483659" r:id="rId11"/>
   </p:sldLayoutIdLst>
+  <p:hf hdr="0" ftr="0" dt="0"/>
   <p:txStyles>
     <p:titleStyle>
       <a:lvl1pPr algn="l" defTabSz="914400" rtl="0" eaLnBrk="1" latinLnBrk="0" hangingPunct="1">
@@ -3476,7 +3836,7 @@
         </p:nvSpPr>
         <p:spPr>
           <a:xfrm>
-            <a:off x="6590662" y="4267832"/>
+            <a:off x="6664802" y="3551140"/>
             <a:ext cx="4805996" cy="1297115"/>
           </a:xfrm>
         </p:spPr>
@@ -3488,7 +3848,7 @@
           <a:p>
             <a:pPr algn="l"/>
             <a:r>
-              <a:rPr lang="en-US" sz="4400">
+              <a:rPr lang="en-US" sz="4400" dirty="0">
                 <a:solidFill>
                   <a:srgbClr val="000000"/>
                 </a:solidFill>
@@ -3516,7 +3876,7 @@
         </p:nvSpPr>
         <p:spPr>
           <a:xfrm>
-            <a:off x="6590966" y="3428999"/>
+            <a:off x="6665106" y="2712307"/>
             <a:ext cx="4805691" cy="838831"/>
           </a:xfrm>
         </p:spPr>
@@ -3528,7 +3888,7 @@
           <a:p>
             <a:pPr algn="l"/>
             <a:r>
-              <a:rPr lang="en-US" sz="1800">
+              <a:rPr lang="en-US" sz="1800" dirty="0">
                 <a:solidFill>
                   <a:srgbClr val="000000"/>
                 </a:solidFill>
@@ -3786,6 +4146,253 @@
           </a:custGeom>
         </p:spPr>
       </p:pic>
+      <p:sp>
+        <p:nvSpPr>
+          <p:cNvPr id="4" name="Slide Number Placeholder 3">
+            <a:extLst>
+              <a:ext uri="{FF2B5EF4-FFF2-40B4-BE49-F238E27FC236}">
+                <a16:creationId xmlns:a16="http://schemas.microsoft.com/office/drawing/2014/main" id="{7DD64BAE-1A83-47C0-BC31-9C9692C7CC4C}"/>
+              </a:ext>
+            </a:extLst>
+          </p:cNvPr>
+          <p:cNvSpPr>
+            <a:spLocks noGrp="1"/>
+          </p:cNvSpPr>
+          <p:nvPr>
+            <p:ph type="sldNum" sz="quarter" idx="12"/>
+          </p:nvPr>
+        </p:nvSpPr>
+        <p:spPr/>
+        <p:txBody>
+          <a:bodyPr/>
+          <a:lstStyle/>
+          <a:p>
+            <a:fld id="{144EF1FE-37A2-4E8F-9397-BF5241D9507E}" type="slidenum">
+              <a:rPr lang="en-US" smtClean="0"/>
+              <a:t>1</a:t>
+            </a:fld>
+            <a:endParaRPr lang="en-US"/>
+          </a:p>
+        </p:txBody>
+      </p:sp>
+      <p:sp>
+        <p:nvSpPr>
+          <p:cNvPr id="13" name="Subtitle 2">
+            <a:extLst>
+              <a:ext uri="{FF2B5EF4-FFF2-40B4-BE49-F238E27FC236}">
+                <a16:creationId xmlns:a16="http://schemas.microsoft.com/office/drawing/2014/main" id="{3A9BA316-449C-4C16-A348-6488C4FA8546}"/>
+              </a:ext>
+            </a:extLst>
+          </p:cNvPr>
+          <p:cNvSpPr txBox="1">
+            <a:spLocks/>
+          </p:cNvSpPr>
+          <p:nvPr/>
+        </p:nvSpPr>
+        <p:spPr>
+          <a:xfrm>
+            <a:off x="6692423" y="5253050"/>
+            <a:ext cx="4805691" cy="838831"/>
+          </a:xfrm>
+          <a:prstGeom prst="rect">
+            <a:avLst/>
+          </a:prstGeom>
+        </p:spPr>
+        <p:txBody>
+          <a:bodyPr vert="horz" lIns="91440" tIns="45720" rIns="91440" bIns="45720" rtlCol="0" anchor="b">
+            <a:normAutofit/>
+          </a:bodyPr>
+          <a:lstStyle>
+            <a:lvl1pPr marL="0" indent="0" algn="ctr" defTabSz="914400" rtl="0" eaLnBrk="1" latinLnBrk="0" hangingPunct="1">
+              <a:lnSpc>
+                <a:spcPct val="90000"/>
+              </a:lnSpc>
+              <a:spcBef>
+                <a:spcPts val="1000"/>
+              </a:spcBef>
+              <a:buFont typeface="Arial" panose="020B0604020202020204" pitchFamily="34" charset="0"/>
+              <a:buNone/>
+              <a:defRPr sz="2400" kern="1200">
+                <a:solidFill>
+                  <a:schemeClr val="tx1"/>
+                </a:solidFill>
+                <a:latin typeface="+mn-lt"/>
+                <a:ea typeface="+mn-ea"/>
+                <a:cs typeface="+mn-cs"/>
+              </a:defRPr>
+            </a:lvl1pPr>
+            <a:lvl2pPr marL="457200" indent="0" algn="ctr" defTabSz="914400" rtl="0" eaLnBrk="1" latinLnBrk="0" hangingPunct="1">
+              <a:lnSpc>
+                <a:spcPct val="90000"/>
+              </a:lnSpc>
+              <a:spcBef>
+                <a:spcPts val="500"/>
+              </a:spcBef>
+              <a:buFont typeface="Arial" panose="020B0604020202020204" pitchFamily="34" charset="0"/>
+              <a:buNone/>
+              <a:defRPr sz="2000" kern="1200">
+                <a:solidFill>
+                  <a:schemeClr val="tx1"/>
+                </a:solidFill>
+                <a:latin typeface="+mn-lt"/>
+                <a:ea typeface="+mn-ea"/>
+                <a:cs typeface="+mn-cs"/>
+              </a:defRPr>
+            </a:lvl2pPr>
+            <a:lvl3pPr marL="914400" indent="0" algn="ctr" defTabSz="914400" rtl="0" eaLnBrk="1" latinLnBrk="0" hangingPunct="1">
+              <a:lnSpc>
+                <a:spcPct val="90000"/>
+              </a:lnSpc>
+              <a:spcBef>
+                <a:spcPts val="500"/>
+              </a:spcBef>
+              <a:buFont typeface="Arial" panose="020B0604020202020204" pitchFamily="34" charset="0"/>
+              <a:buNone/>
+              <a:defRPr sz="1800" kern="1200">
+                <a:solidFill>
+                  <a:schemeClr val="tx1"/>
+                </a:solidFill>
+                <a:latin typeface="+mn-lt"/>
+                <a:ea typeface="+mn-ea"/>
+                <a:cs typeface="+mn-cs"/>
+              </a:defRPr>
+            </a:lvl3pPr>
+            <a:lvl4pPr marL="1371600" indent="0" algn="ctr" defTabSz="914400" rtl="0" eaLnBrk="1" latinLnBrk="0" hangingPunct="1">
+              <a:lnSpc>
+                <a:spcPct val="90000"/>
+              </a:lnSpc>
+              <a:spcBef>
+                <a:spcPts val="500"/>
+              </a:spcBef>
+              <a:buFont typeface="Arial" panose="020B0604020202020204" pitchFamily="34" charset="0"/>
+              <a:buNone/>
+              <a:defRPr sz="1600" kern="1200">
+                <a:solidFill>
+                  <a:schemeClr val="tx1"/>
+                </a:solidFill>
+                <a:latin typeface="+mn-lt"/>
+                <a:ea typeface="+mn-ea"/>
+                <a:cs typeface="+mn-cs"/>
+              </a:defRPr>
+            </a:lvl4pPr>
+            <a:lvl5pPr marL="1828800" indent="0" algn="ctr" defTabSz="914400" rtl="0" eaLnBrk="1" latinLnBrk="0" hangingPunct="1">
+              <a:lnSpc>
+                <a:spcPct val="90000"/>
+              </a:lnSpc>
+              <a:spcBef>
+                <a:spcPts val="500"/>
+              </a:spcBef>
+              <a:buFont typeface="Arial" panose="020B0604020202020204" pitchFamily="34" charset="0"/>
+              <a:buNone/>
+              <a:defRPr sz="1600" kern="1200">
+                <a:solidFill>
+                  <a:schemeClr val="tx1"/>
+                </a:solidFill>
+                <a:latin typeface="+mn-lt"/>
+                <a:ea typeface="+mn-ea"/>
+                <a:cs typeface="+mn-cs"/>
+              </a:defRPr>
+            </a:lvl5pPr>
+            <a:lvl6pPr marL="2286000" indent="0" algn="ctr" defTabSz="914400" rtl="0" eaLnBrk="1" latinLnBrk="0" hangingPunct="1">
+              <a:lnSpc>
+                <a:spcPct val="90000"/>
+              </a:lnSpc>
+              <a:spcBef>
+                <a:spcPts val="500"/>
+              </a:spcBef>
+              <a:buFont typeface="Arial" panose="020B0604020202020204" pitchFamily="34" charset="0"/>
+              <a:buNone/>
+              <a:defRPr sz="1600" kern="1200">
+                <a:solidFill>
+                  <a:schemeClr val="tx1"/>
+                </a:solidFill>
+                <a:latin typeface="+mn-lt"/>
+                <a:ea typeface="+mn-ea"/>
+                <a:cs typeface="+mn-cs"/>
+              </a:defRPr>
+            </a:lvl6pPr>
+            <a:lvl7pPr marL="2743200" indent="0" algn="ctr" defTabSz="914400" rtl="0" eaLnBrk="1" latinLnBrk="0" hangingPunct="1">
+              <a:lnSpc>
+                <a:spcPct val="90000"/>
+              </a:lnSpc>
+              <a:spcBef>
+                <a:spcPts val="500"/>
+              </a:spcBef>
+              <a:buFont typeface="Arial" panose="020B0604020202020204" pitchFamily="34" charset="0"/>
+              <a:buNone/>
+              <a:defRPr sz="1600" kern="1200">
+                <a:solidFill>
+                  <a:schemeClr val="tx1"/>
+                </a:solidFill>
+                <a:latin typeface="+mn-lt"/>
+                <a:ea typeface="+mn-ea"/>
+                <a:cs typeface="+mn-cs"/>
+              </a:defRPr>
+            </a:lvl7pPr>
+            <a:lvl8pPr marL="3200400" indent="0" algn="ctr" defTabSz="914400" rtl="0" eaLnBrk="1" latinLnBrk="0" hangingPunct="1">
+              <a:lnSpc>
+                <a:spcPct val="90000"/>
+              </a:lnSpc>
+              <a:spcBef>
+                <a:spcPts val="500"/>
+              </a:spcBef>
+              <a:buFont typeface="Arial" panose="020B0604020202020204" pitchFamily="34" charset="0"/>
+              <a:buNone/>
+              <a:defRPr sz="1600" kern="1200">
+                <a:solidFill>
+                  <a:schemeClr val="tx1"/>
+                </a:solidFill>
+                <a:latin typeface="+mn-lt"/>
+                <a:ea typeface="+mn-ea"/>
+                <a:cs typeface="+mn-cs"/>
+              </a:defRPr>
+            </a:lvl8pPr>
+            <a:lvl9pPr marL="3657600" indent="0" algn="ctr" defTabSz="914400" rtl="0" eaLnBrk="1" latinLnBrk="0" hangingPunct="1">
+              <a:lnSpc>
+                <a:spcPct val="90000"/>
+              </a:lnSpc>
+              <a:spcBef>
+                <a:spcPts val="500"/>
+              </a:spcBef>
+              <a:buFont typeface="Arial" panose="020B0604020202020204" pitchFamily="34" charset="0"/>
+              <a:buNone/>
+              <a:defRPr sz="1600" kern="1200">
+                <a:solidFill>
+                  <a:schemeClr val="tx1"/>
+                </a:solidFill>
+                <a:latin typeface="+mn-lt"/>
+                <a:ea typeface="+mn-ea"/>
+                <a:cs typeface="+mn-cs"/>
+              </a:defRPr>
+            </a:lvl9pPr>
+          </a:lstStyle>
+          <a:p>
+            <a:r>
+              <a:rPr lang="en-US" sz="1800" dirty="0">
+                <a:solidFill>
+                  <a:srgbClr val="000000"/>
+                </a:solidFill>
+              </a:rPr>
+              <a:t>Ashutosh Varshney</a:t>
+            </a:r>
+            <a:br>
+              <a:rPr lang="en-US" sz="1800" dirty="0">
+                <a:solidFill>
+                  <a:srgbClr val="000000"/>
+                </a:solidFill>
+              </a:rPr>
+            </a:br>
+            <a:r>
+              <a:rPr lang="en-US" sz="1800" dirty="0">
+                <a:solidFill>
+                  <a:srgbClr val="000000"/>
+                </a:solidFill>
+              </a:rPr>
+              <a:t>November 2020</a:t>
+            </a:r>
+          </a:p>
+        </p:txBody>
+      </p:sp>
     </p:spTree>
     <p:extLst>
       <p:ext uri="{BB962C8B-B14F-4D97-AF65-F5344CB8AC3E}">
@@ -3799,7 +4406,7 @@
 </p:sld>
 </file>
 
-<file path=ppt/slides/slide2.xml><?xml version="1.0" encoding="utf-8"?>
+<file path=ppt/slides/slide10.xml><?xml version="1.0" encoding="utf-8"?>
 <p:sld xmlns:a="http://schemas.openxmlformats.org/drawingml/2006/main" xmlns:r="http://schemas.openxmlformats.org/officeDocument/2006/relationships" xmlns:p="http://schemas.openxmlformats.org/presentationml/2006/main">
   <p:cSld>
     <p:bg>
@@ -4024,6 +4631,521 @@
         </p:nvSpPr>
         <p:spPr>
           <a:xfrm>
+            <a:off x="488539" y="3014337"/>
+            <a:ext cx="3669161" cy="726629"/>
+          </a:xfrm>
+        </p:spPr>
+        <p:txBody>
+          <a:bodyPr vert="horz" lIns="91440" tIns="45720" rIns="91440" bIns="45720" rtlCol="0" anchor="ctr">
+            <a:normAutofit/>
+          </a:bodyPr>
+          <a:lstStyle/>
+          <a:p>
+            <a:r>
+              <a:rPr lang="en-US" sz="3200" b="1" dirty="0">
+                <a:solidFill>
+                  <a:schemeClr val="bg1"/>
+                </a:solidFill>
+              </a:rPr>
+              <a:t>Recommendations</a:t>
+            </a:r>
+            <a:endParaRPr lang="en-US" sz="3100" kern="1200" dirty="0">
+              <a:solidFill>
+                <a:schemeClr val="bg1"/>
+              </a:solidFill>
+              <a:latin typeface="+mj-lt"/>
+              <a:ea typeface="+mj-ea"/>
+              <a:cs typeface="+mj-cs"/>
+            </a:endParaRPr>
+          </a:p>
+        </p:txBody>
+      </p:sp>
+      <p:sp>
+        <p:nvSpPr>
+          <p:cNvPr id="7" name="TextBox 6">
+            <a:extLst>
+              <a:ext uri="{FF2B5EF4-FFF2-40B4-BE49-F238E27FC236}">
+                <a16:creationId xmlns:a16="http://schemas.microsoft.com/office/drawing/2014/main" id="{1D12F95A-68A0-4D18-8A0A-DAEBCAE7A0B7}"/>
+              </a:ext>
+            </a:extLst>
+          </p:cNvPr>
+          <p:cNvSpPr txBox="1"/>
+          <p:nvPr/>
+        </p:nvSpPr>
+        <p:spPr>
+          <a:xfrm>
+            <a:off x="5597611" y="723591"/>
+            <a:ext cx="6208221" cy="5308120"/>
+          </a:xfrm>
+          <a:prstGeom prst="rect">
+            <a:avLst/>
+          </a:prstGeom>
+          <a:noFill/>
+        </p:spPr>
+        <p:txBody>
+          <a:bodyPr wrap="square">
+            <a:spAutoFit/>
+          </a:bodyPr>
+          <a:lstStyle/>
+          <a:p>
+            <a:r>
+              <a:rPr lang="en-US" sz="2800" b="1" dirty="0">
+                <a:solidFill>
+                  <a:srgbClr val="00B0F0"/>
+                </a:solidFill>
+                <a:latin typeface="+mj-lt"/>
+              </a:rPr>
+              <a:t>Model predicts a ticket price of $95.87 </a:t>
+            </a:r>
+            <a:r>
+              <a:rPr lang="en-US" sz="2000" dirty="0">
+                <a:latin typeface="+mj-lt"/>
+              </a:rPr>
+              <a:t>There is a mean absolute error of $10.39 which suggests there is room for an increase.</a:t>
+            </a:r>
+          </a:p>
+          <a:p>
+            <a:endParaRPr lang="en-US" sz="2000" dirty="0">
+              <a:latin typeface="+mj-lt"/>
+            </a:endParaRPr>
+          </a:p>
+          <a:p>
+            <a:pPr>
+              <a:lnSpc>
+                <a:spcPct val="90000"/>
+              </a:lnSpc>
+            </a:pPr>
+            <a:endParaRPr lang="en-US" sz="2400" dirty="0">
+              <a:solidFill>
+                <a:srgbClr val="000000"/>
+              </a:solidFill>
+              <a:latin typeface="+mj-lt"/>
+            </a:endParaRPr>
+          </a:p>
+          <a:p>
+            <a:pPr>
+              <a:lnSpc>
+                <a:spcPct val="90000"/>
+              </a:lnSpc>
+            </a:pPr>
+            <a:r>
+              <a:rPr lang="en-US" sz="2400" b="1" dirty="0">
+                <a:solidFill>
+                  <a:srgbClr val="000000"/>
+                </a:solidFill>
+                <a:latin typeface="+mj-lt"/>
+              </a:rPr>
+              <a:t>Other Proposals to consider</a:t>
+            </a:r>
+            <a:r>
+              <a:rPr lang="en-US" sz="2400" dirty="0">
+                <a:solidFill>
+                  <a:srgbClr val="000000"/>
+                </a:solidFill>
+                <a:latin typeface="+mj-lt"/>
+              </a:rPr>
+              <a:t>:</a:t>
+            </a:r>
+          </a:p>
+          <a:p>
+            <a:pPr marR="0" lvl="0">
+              <a:lnSpc>
+                <a:spcPct val="90000"/>
+              </a:lnSpc>
+              <a:spcBef>
+                <a:spcPts val="0"/>
+              </a:spcBef>
+              <a:spcAft>
+                <a:spcPts val="800"/>
+              </a:spcAft>
+            </a:pPr>
+            <a:endParaRPr lang="en-US" sz="2400" dirty="0">
+              <a:solidFill>
+                <a:srgbClr val="000000"/>
+              </a:solidFill>
+              <a:latin typeface="+mj-lt"/>
+            </a:endParaRPr>
+          </a:p>
+          <a:p>
+            <a:pPr marL="342900" marR="0" lvl="0" indent="-342900">
+              <a:lnSpc>
+                <a:spcPct val="90000"/>
+              </a:lnSpc>
+              <a:spcBef>
+                <a:spcPts val="0"/>
+              </a:spcBef>
+              <a:spcAft>
+                <a:spcPts val="800"/>
+              </a:spcAft>
+              <a:buFont typeface="Arial" panose="020B0604020202020204" pitchFamily="34" charset="0"/>
+              <a:buChar char="•"/>
+            </a:pPr>
+            <a:r>
+              <a:rPr lang="en-US" sz="2400" b="1" dirty="0">
+                <a:solidFill>
+                  <a:srgbClr val="000000"/>
+                </a:solidFill>
+                <a:effectLst/>
+                <a:latin typeface="+mj-lt"/>
+              </a:rPr>
+              <a:t>Close top 1 unused run. </a:t>
+            </a:r>
+            <a:br>
+              <a:rPr lang="en-US" sz="2400" dirty="0">
+                <a:solidFill>
+                  <a:srgbClr val="000000"/>
+                </a:solidFill>
+                <a:effectLst/>
+                <a:latin typeface="+mj-lt"/>
+              </a:rPr>
+            </a:br>
+            <a:r>
+              <a:rPr lang="en-US" sz="2000" dirty="0">
+                <a:effectLst/>
+                <a:latin typeface="+mj-lt"/>
+                <a:ea typeface="Calibri" panose="020F0502020204030204" pitchFamily="34" charset="0"/>
+                <a:cs typeface="Calibri" panose="020F0502020204030204" pitchFamily="34" charset="0"/>
+              </a:rPr>
+              <a:t>Model says closing one run makes no difference. This may lead to reduced operating costs.</a:t>
+            </a:r>
+            <a:br>
+              <a:rPr lang="en-US" sz="2000" dirty="0">
+                <a:solidFill>
+                  <a:srgbClr val="000000"/>
+                </a:solidFill>
+                <a:effectLst/>
+                <a:latin typeface="+mj-lt"/>
+              </a:rPr>
+            </a:br>
+            <a:endParaRPr lang="en-US" sz="2000" dirty="0">
+              <a:solidFill>
+                <a:srgbClr val="000000"/>
+              </a:solidFill>
+              <a:effectLst/>
+              <a:latin typeface="+mj-lt"/>
+            </a:endParaRPr>
+          </a:p>
+          <a:p>
+            <a:pPr marL="342900" marR="0" lvl="0" indent="-342900">
+              <a:lnSpc>
+                <a:spcPct val="90000"/>
+              </a:lnSpc>
+              <a:spcBef>
+                <a:spcPts val="0"/>
+              </a:spcBef>
+              <a:spcAft>
+                <a:spcPts val="800"/>
+              </a:spcAft>
+              <a:buFont typeface="Arial" panose="020B0604020202020204" pitchFamily="34" charset="0"/>
+              <a:buChar char="•"/>
+            </a:pPr>
+            <a:r>
+              <a:rPr lang="en-US" sz="2400" b="1" dirty="0">
+                <a:solidFill>
+                  <a:srgbClr val="000000"/>
+                </a:solidFill>
+                <a:effectLst/>
+                <a:latin typeface="+mj-lt"/>
+              </a:rPr>
+              <a:t>Increase vertical drop 150 feet and install additional chair lift.</a:t>
+            </a:r>
+            <a:r>
+              <a:rPr lang="en-US" sz="2400" b="1" dirty="0">
+                <a:solidFill>
+                  <a:srgbClr val="000000"/>
+                </a:solidFill>
+                <a:latin typeface="+mj-lt"/>
+              </a:rPr>
+              <a:t> </a:t>
+            </a:r>
+            <a:br>
+              <a:rPr lang="en-US" sz="2400" dirty="0">
+                <a:solidFill>
+                  <a:srgbClr val="000000"/>
+                </a:solidFill>
+                <a:latin typeface="+mj-lt"/>
+              </a:rPr>
+            </a:br>
+            <a:r>
+              <a:rPr lang="en-US" sz="2000" dirty="0">
+                <a:solidFill>
+                  <a:srgbClr val="000000"/>
+                </a:solidFill>
+                <a:effectLst/>
+                <a:latin typeface="+mj-lt"/>
+              </a:rPr>
+              <a:t>This scenario increases support for ticket price by $1.99 and over the season this could be expected to amount to $3,474,638.00</a:t>
+            </a:r>
+          </a:p>
+        </p:txBody>
+      </p:sp>
+      <p:sp>
+        <p:nvSpPr>
+          <p:cNvPr id="3" name="Slide Number Placeholder 2">
+            <a:extLst>
+              <a:ext uri="{FF2B5EF4-FFF2-40B4-BE49-F238E27FC236}">
+                <a16:creationId xmlns:a16="http://schemas.microsoft.com/office/drawing/2014/main" id="{6B2C7D00-8D7F-4D18-A28D-0383E980EBC6}"/>
+              </a:ext>
+            </a:extLst>
+          </p:cNvPr>
+          <p:cNvSpPr>
+            <a:spLocks noGrp="1"/>
+          </p:cNvSpPr>
+          <p:nvPr>
+            <p:ph type="sldNum" sz="quarter" idx="12"/>
+          </p:nvPr>
+        </p:nvSpPr>
+        <p:spPr/>
+        <p:txBody>
+          <a:bodyPr/>
+          <a:lstStyle/>
+          <a:p>
+            <a:fld id="{144EF1FE-37A2-4E8F-9397-BF5241D9507E}" type="slidenum">
+              <a:rPr lang="en-US" smtClean="0"/>
+              <a:t>10</a:t>
+            </a:fld>
+            <a:endParaRPr lang="en-US"/>
+          </a:p>
+        </p:txBody>
+      </p:sp>
+    </p:spTree>
+    <p:extLst>
+      <p:ext uri="{BB962C8B-B14F-4D97-AF65-F5344CB8AC3E}">
+        <p14:creationId xmlns:p14="http://schemas.microsoft.com/office/powerpoint/2010/main" val="2810909191"/>
+      </p:ext>
+    </p:extLst>
+  </p:cSld>
+  <p:clrMapOvr>
+    <a:masterClrMapping/>
+  </p:clrMapOvr>
+</p:sld>
+</file>
+
+<file path=ppt/slides/slide2.xml><?xml version="1.0" encoding="utf-8"?>
+<p:sld xmlns:a="http://schemas.openxmlformats.org/drawingml/2006/main" xmlns:r="http://schemas.openxmlformats.org/officeDocument/2006/relationships" xmlns:p="http://schemas.openxmlformats.org/presentationml/2006/main">
+  <p:cSld>
+    <p:bg>
+      <p:bgPr>
+        <a:solidFill>
+          <a:schemeClr val="bg1"/>
+        </a:solidFill>
+        <a:effectLst/>
+      </p:bgPr>
+    </p:bg>
+    <p:spTree>
+      <p:nvGrpSpPr>
+        <p:cNvPr id="1" name=""/>
+        <p:cNvGrpSpPr/>
+        <p:nvPr/>
+      </p:nvGrpSpPr>
+      <p:grpSpPr>
+        <a:xfrm>
+          <a:off x="0" y="0"/>
+          <a:ext cx="0" cy="0"/>
+          <a:chOff x="0" y="0"/>
+          <a:chExt cx="0" cy="0"/>
+        </a:xfrm>
+      </p:grpSpPr>
+      <p:sp useBgFill="1">
+        <p:nvSpPr>
+          <p:cNvPr id="9" name="Rectangle 8">
+            <a:extLst>
+              <a:ext uri="{FF2B5EF4-FFF2-40B4-BE49-F238E27FC236}">
+                <a16:creationId xmlns:a16="http://schemas.microsoft.com/office/drawing/2014/main" id="{3B854194-185D-494D-905C-7C7CB2E30F6E}"/>
+              </a:ext>
+              <a:ext uri="{C183D7F6-B498-43B3-948B-1728B52AA6E4}">
+                <adec:decorative xmlns:adec="http://schemas.microsoft.com/office/drawing/2017/decorative" val="1"/>
+              </a:ext>
+            </a:extLst>
+          </p:cNvPr>
+          <p:cNvSpPr>
+            <a:spLocks noGrp="1" noRot="1" noChangeAspect="1" noMove="1" noResize="1" noEditPoints="1" noAdjustHandles="1" noChangeArrowheads="1" noChangeShapeType="1" noTextEdit="1"/>
+          </p:cNvSpPr>
+          <p:nvPr>
+            <p:extLst>
+              <p:ext uri="{386F3935-93C4-4BCD-93E2-E3B085C9AB24}">
+                <p16:designElem xmlns:p16="http://schemas.microsoft.com/office/powerpoint/2015/main" val="1"/>
+              </p:ext>
+            </p:extLst>
+          </p:nvPr>
+        </p:nvSpPr>
+        <p:spPr>
+          <a:xfrm>
+            <a:off x="1" y="0"/>
+            <a:ext cx="6082110" cy="6858000"/>
+          </a:xfrm>
+          <a:prstGeom prst="rect">
+            <a:avLst/>
+          </a:prstGeom>
+          <a:ln>
+            <a:noFill/>
+          </a:ln>
+        </p:spPr>
+        <p:style>
+          <a:lnRef idx="2">
+            <a:schemeClr val="accent1">
+              <a:shade val="50000"/>
+            </a:schemeClr>
+          </a:lnRef>
+          <a:fillRef idx="1">
+            <a:schemeClr val="accent1"/>
+          </a:fillRef>
+          <a:effectRef idx="0">
+            <a:schemeClr val="accent1"/>
+          </a:effectRef>
+          <a:fontRef idx="minor">
+            <a:schemeClr val="lt1"/>
+          </a:fontRef>
+        </p:style>
+        <p:txBody>
+          <a:bodyPr rtlCol="0" anchor="ctr"/>
+          <a:lstStyle/>
+          <a:p>
+            <a:pPr algn="ctr"/>
+            <a:endParaRPr lang="en-US"/>
+          </a:p>
+        </p:txBody>
+      </p:sp>
+      <p:sp>
+        <p:nvSpPr>
+          <p:cNvPr id="11" name="Rectangle 10">
+            <a:extLst>
+              <a:ext uri="{FF2B5EF4-FFF2-40B4-BE49-F238E27FC236}">
+                <a16:creationId xmlns:a16="http://schemas.microsoft.com/office/drawing/2014/main" id="{B4F5FA0D-0104-4987-8241-EFF7C85B88DE}"/>
+              </a:ext>
+              <a:ext uri="{C183D7F6-B498-43B3-948B-1728B52AA6E4}">
+                <adec:decorative xmlns:adec="http://schemas.microsoft.com/office/drawing/2017/decorative" val="1"/>
+              </a:ext>
+            </a:extLst>
+          </p:cNvPr>
+          <p:cNvSpPr>
+            <a:spLocks noGrp="1" noRot="1" noChangeAspect="1" noMove="1" noResize="1" noEditPoints="1" noAdjustHandles="1" noChangeArrowheads="1" noChangeShapeType="1" noTextEdit="1"/>
+          </p:cNvSpPr>
+          <p:nvPr>
+            <p:extLst>
+              <p:ext uri="{386F3935-93C4-4BCD-93E2-E3B085C9AB24}">
+                <p16:designElem xmlns:p16="http://schemas.microsoft.com/office/powerpoint/2015/main" val="1"/>
+              </p:ext>
+            </p:extLst>
+          </p:nvPr>
+        </p:nvSpPr>
+        <p:spPr>
+          <a:xfrm>
+            <a:off x="1" y="0"/>
+            <a:ext cx="12191998" cy="6858000"/>
+          </a:xfrm>
+          <a:prstGeom prst="rect">
+            <a:avLst/>
+          </a:prstGeom>
+          <a:gradFill>
+            <a:gsLst>
+              <a:gs pos="0">
+                <a:schemeClr val="accent1"/>
+              </a:gs>
+              <a:gs pos="25000">
+                <a:schemeClr val="accent1"/>
+              </a:gs>
+              <a:gs pos="94000">
+                <a:schemeClr val="accent5"/>
+              </a:gs>
+              <a:gs pos="100000">
+                <a:schemeClr val="accent5"/>
+              </a:gs>
+            </a:gsLst>
+            <a:lin ang="4200000" scaled="0"/>
+          </a:gradFill>
+          <a:ln>
+            <a:noFill/>
+          </a:ln>
+        </p:spPr>
+        <p:style>
+          <a:lnRef idx="2">
+            <a:schemeClr val="accent1">
+              <a:shade val="50000"/>
+            </a:schemeClr>
+          </a:lnRef>
+          <a:fillRef idx="1">
+            <a:schemeClr val="accent1"/>
+          </a:fillRef>
+          <a:effectRef idx="0">
+            <a:schemeClr val="accent1"/>
+          </a:effectRef>
+          <a:fontRef idx="minor">
+            <a:schemeClr val="lt1"/>
+          </a:fontRef>
+        </p:style>
+        <p:txBody>
+          <a:bodyPr rtlCol="0" anchor="ctr"/>
+          <a:lstStyle/>
+          <a:p>
+            <a:pPr algn="ctr"/>
+            <a:endParaRPr lang="en-US"/>
+          </a:p>
+        </p:txBody>
+      </p:sp>
+      <p:pic>
+        <p:nvPicPr>
+          <p:cNvPr id="13" name="Picture 12">
+            <a:extLst>
+              <a:ext uri="{FF2B5EF4-FFF2-40B4-BE49-F238E27FC236}">
+                <a16:creationId xmlns:a16="http://schemas.microsoft.com/office/drawing/2014/main" id="{2897127E-6CEF-446C-BE87-93B7C46E49D1}"/>
+              </a:ext>
+              <a:ext uri="{C183D7F6-B498-43B3-948B-1728B52AA6E4}">
+                <adec:decorative xmlns:adec="http://schemas.microsoft.com/office/drawing/2017/decorative" val="1"/>
+              </a:ext>
+            </a:extLst>
+          </p:cNvPr>
+          <p:cNvPicPr>
+            <a:picLocks noGrp="1" noRot="1" noChangeAspect="1" noMove="1" noResize="1" noEditPoints="1" noAdjustHandles="1" noChangeArrowheads="1" noChangeShapeType="1" noCrop="1"/>
+          </p:cNvPicPr>
+          <p:nvPr>
+            <p:extLst>
+              <p:ext uri="{386F3935-93C4-4BCD-93E2-E3B085C9AB24}">
+                <p16:designElem xmlns:p16="http://schemas.microsoft.com/office/powerpoint/2015/main" val="1"/>
+              </p:ext>
+            </p:extLst>
+          </p:nvPr>
+        </p:nvPicPr>
+        <p:blipFill>
+          <a:blip r:embed="rId2">
+            <a:extLst>
+              <a:ext uri="{28A0092B-C50C-407E-A947-70E740481C1C}">
+                <a14:useLocalDpi xmlns:a14="http://schemas.microsoft.com/office/drawing/2010/main" val="0"/>
+              </a:ext>
+            </a:extLst>
+          </a:blip>
+          <a:stretch>
+            <a:fillRect/>
+          </a:stretch>
+        </p:blipFill>
+        <p:spPr>
+          <a:xfrm>
+            <a:off x="0" y="0"/>
+            <a:ext cx="12192000" cy="6858000"/>
+          </a:xfrm>
+          <a:prstGeom prst="rect">
+            <a:avLst/>
+          </a:prstGeom>
+        </p:spPr>
+      </p:pic>
+      <p:sp>
+        <p:nvSpPr>
+          <p:cNvPr id="2" name="Title 1">
+            <a:extLst>
+              <a:ext uri="{FF2B5EF4-FFF2-40B4-BE49-F238E27FC236}">
+                <a16:creationId xmlns:a16="http://schemas.microsoft.com/office/drawing/2014/main" id="{004F2053-AB8D-479A-866D-0DF818ABCE55}"/>
+              </a:ext>
+            </a:extLst>
+          </p:cNvPr>
+          <p:cNvSpPr>
+            <a:spLocks noGrp="1"/>
+          </p:cNvSpPr>
+          <p:nvPr>
+            <p:ph type="title"/>
+          </p:nvPr>
+        </p:nvSpPr>
+        <p:spPr>
+          <a:xfrm>
             <a:off x="640079" y="2053641"/>
             <a:ext cx="3669161" cy="2760098"/>
           </a:xfrm>
@@ -4035,7 +5157,7 @@
           <a:lstStyle/>
           <a:p>
             <a:r>
-              <a:rPr lang="en-US" sz="3100" b="1" kern="1200" dirty="0">
+              <a:rPr lang="en-US" sz="3200" b="1" kern="1200" dirty="0">
                 <a:solidFill>
                   <a:srgbClr val="FFFFFF"/>
                 </a:solidFill>
@@ -4349,6 +5471,35 @@
               </a:rPr>
               <a:t>Accommodate skiers and riders of all levels and abilities.</a:t>
             </a:r>
+          </a:p>
+        </p:txBody>
+      </p:sp>
+      <p:sp>
+        <p:nvSpPr>
+          <p:cNvPr id="3" name="Slide Number Placeholder 2">
+            <a:extLst>
+              <a:ext uri="{FF2B5EF4-FFF2-40B4-BE49-F238E27FC236}">
+                <a16:creationId xmlns:a16="http://schemas.microsoft.com/office/drawing/2014/main" id="{13805ACE-D995-42A6-A5DC-CFCA27E84C70}"/>
+              </a:ext>
+            </a:extLst>
+          </p:cNvPr>
+          <p:cNvSpPr>
+            <a:spLocks noGrp="1"/>
+          </p:cNvSpPr>
+          <p:nvPr>
+            <p:ph type="sldNum" sz="quarter" idx="12"/>
+          </p:nvPr>
+        </p:nvSpPr>
+        <p:spPr/>
+        <p:txBody>
+          <a:bodyPr/>
+          <a:lstStyle/>
+          <a:p>
+            <a:fld id="{144EF1FE-37A2-4E8F-9397-BF5241D9507E}" type="slidenum">
+              <a:rPr lang="en-US" smtClean="0"/>
+              <a:t>2</a:t>
+            </a:fld>
+            <a:endParaRPr lang="en-US"/>
           </a:p>
         </p:txBody>
       </p:sp>
@@ -4368,6 +5519,14 @@
 <file path=ppt/slides/slide3.xml><?xml version="1.0" encoding="utf-8"?>
 <p:sld xmlns:a="http://schemas.openxmlformats.org/drawingml/2006/main" xmlns:r="http://schemas.openxmlformats.org/officeDocument/2006/relationships" xmlns:p="http://schemas.openxmlformats.org/presentationml/2006/main">
   <p:cSld>
+    <p:bg>
+      <p:bgPr>
+        <a:solidFill>
+          <a:schemeClr val="bg1"/>
+        </a:solidFill>
+        <a:effectLst/>
+      </p:bgPr>
+    </p:bg>
     <p:spTree>
       <p:nvGrpSpPr>
         <p:cNvPr id="1" name=""/>
@@ -4382,435 +5541,220 @@
           <a:chExt cx="0" cy="0"/>
         </a:xfrm>
       </p:grpSpPr>
-      <p:sp>
-        <p:nvSpPr>
-          <p:cNvPr id="2" name="Title 1">
-            <a:extLst>
-              <a:ext uri="{FF2B5EF4-FFF2-40B4-BE49-F238E27FC236}">
-                <a16:creationId xmlns:a16="http://schemas.microsoft.com/office/drawing/2014/main" id="{05147315-8D99-4BD7-992C-51F70DF4AA0F}"/>
-              </a:ext>
-            </a:extLst>
-          </p:cNvPr>
-          <p:cNvSpPr>
-            <a:spLocks noGrp="1"/>
-          </p:cNvSpPr>
-          <p:nvPr>
-            <p:ph type="title"/>
+      <p:sp useBgFill="1">
+        <p:nvSpPr>
+          <p:cNvPr id="9" name="Rectangle 8">
+            <a:extLst>
+              <a:ext uri="{FF2B5EF4-FFF2-40B4-BE49-F238E27FC236}">
+                <a16:creationId xmlns:a16="http://schemas.microsoft.com/office/drawing/2014/main" id="{3B854194-185D-494D-905C-7C7CB2E30F6E}"/>
+              </a:ext>
+              <a:ext uri="{C183D7F6-B498-43B3-948B-1728B52AA6E4}">
+                <adec:decorative xmlns:adec="http://schemas.microsoft.com/office/drawing/2017/decorative" val="1"/>
+              </a:ext>
+            </a:extLst>
+          </p:cNvPr>
+          <p:cNvSpPr>
+            <a:spLocks noGrp="1" noRot="1" noChangeAspect="1" noMove="1" noResize="1" noEditPoints="1" noAdjustHandles="1" noChangeArrowheads="1" noChangeShapeType="1" noTextEdit="1"/>
+          </p:cNvSpPr>
+          <p:nvPr>
+            <p:extLst>
+              <p:ext uri="{386F3935-93C4-4BCD-93E2-E3B085C9AB24}">
+                <p16:designElem xmlns:p16="http://schemas.microsoft.com/office/powerpoint/2015/main" val="1"/>
+              </p:ext>
+            </p:extLst>
           </p:nvPr>
         </p:nvSpPr>
         <p:spPr>
           <a:xfrm>
-            <a:off x="463826" y="387405"/>
-            <a:ext cx="11298886" cy="1325563"/>
-          </a:xfrm>
-        </p:spPr>
-        <p:txBody>
-          <a:bodyPr>
-            <a:noAutofit/>
-          </a:bodyPr>
-          <a:lstStyle/>
-          <a:p>
-            <a:r>
-              <a:rPr lang="en-US" sz="2400" b="1" dirty="0">
-                <a:solidFill>
-                  <a:schemeClr val="accent5">
-                    <a:lumMod val="75000"/>
-                  </a:schemeClr>
-                </a:solidFill>
-              </a:rPr>
-              <a:t>Recommendation</a:t>
-            </a:r>
-            <a:br>
-              <a:rPr lang="en-US" sz="2400" dirty="0"/>
-            </a:br>
-            <a:r>
-              <a:rPr lang="en-US" sz="2400" dirty="0">
-                <a:effectLst/>
-                <a:ea typeface="Calibri" panose="020F0502020204030204" pitchFamily="34" charset="0"/>
-                <a:cs typeface="Calibri" panose="020F0502020204030204" pitchFamily="34" charset="0"/>
-              </a:rPr>
-              <a:t>Model predicts a ticket price of </a:t>
-            </a:r>
-            <a:r>
-              <a:rPr lang="en-US" sz="2400" b="1" dirty="0">
-                <a:effectLst/>
-                <a:ea typeface="Calibri" panose="020F0502020204030204" pitchFamily="34" charset="0"/>
-                <a:cs typeface="Calibri" panose="020F0502020204030204" pitchFamily="34" charset="0"/>
-              </a:rPr>
-              <a:t>$95.87 </a:t>
-            </a:r>
-            <a:r>
-              <a:rPr lang="en-US" sz="2400" dirty="0">
-                <a:effectLst/>
-                <a:ea typeface="Calibri" panose="020F0502020204030204" pitchFamily="34" charset="0"/>
-                <a:cs typeface="Calibri" panose="020F0502020204030204" pitchFamily="34" charset="0"/>
-              </a:rPr>
-              <a:t>with a mean absolute error of. $10.39. </a:t>
-            </a:r>
-            <a:r>
-              <a:rPr lang="en-US" sz="2400" dirty="0">
-                <a:ea typeface="Calibri" panose="020F0502020204030204" pitchFamily="34" charset="0"/>
-                <a:cs typeface="Calibri" panose="020F0502020204030204" pitchFamily="34" charset="0"/>
-              </a:rPr>
-              <a:t>It </a:t>
-            </a:r>
-            <a:r>
-              <a:rPr lang="en-US" sz="2400" dirty="0">
-                <a:effectLst/>
-                <a:ea typeface="Calibri" panose="020F0502020204030204" pitchFamily="34" charset="0"/>
-                <a:cs typeface="Calibri" panose="020F0502020204030204" pitchFamily="34" charset="0"/>
-              </a:rPr>
-              <a:t>suggests there is room for an increase.</a:t>
-            </a:r>
-            <a:endParaRPr lang="en-US" sz="2400" dirty="0"/>
-          </a:p>
-        </p:txBody>
-      </p:sp>
-      <p:sp>
-        <p:nvSpPr>
-          <p:cNvPr id="24" name="TextBox 23">
-            <a:extLst>
-              <a:ext uri="{FF2B5EF4-FFF2-40B4-BE49-F238E27FC236}">
-                <a16:creationId xmlns:a16="http://schemas.microsoft.com/office/drawing/2014/main" id="{4E56BE99-97D1-48EE-827D-11A93F2B91C6}"/>
-              </a:ext>
-            </a:extLst>
-          </p:cNvPr>
-          <p:cNvSpPr txBox="1"/>
-          <p:nvPr/>
-        </p:nvSpPr>
-        <p:spPr>
-          <a:xfrm>
-            <a:off x="463826" y="2215063"/>
-            <a:ext cx="3143670" cy="4247317"/>
+            <a:off x="1" y="0"/>
+            <a:ext cx="6082110" cy="6858000"/>
           </a:xfrm>
           <a:prstGeom prst="rect">
             <a:avLst/>
           </a:prstGeom>
-          <a:noFill/>
+          <a:ln>
+            <a:noFill/>
+          </a:ln>
         </p:spPr>
-        <p:txBody>
-          <a:bodyPr wrap="square">
-            <a:spAutoFit/>
-          </a:bodyPr>
-          <a:lstStyle/>
-          <a:p>
-            <a:r>
-              <a:rPr lang="en-US" sz="2400" b="1" dirty="0">
-                <a:solidFill>
-                  <a:srgbClr val="00B0F0"/>
-                </a:solidFill>
-                <a:latin typeface="+mj-lt"/>
-              </a:rPr>
-              <a:t>Features that matter:</a:t>
-            </a:r>
-          </a:p>
-          <a:p>
-            <a:r>
-              <a:rPr lang="en-US" dirty="0">
-                <a:latin typeface="+mj-lt"/>
-              </a:rPr>
-              <a:t>Customers are more likely to pay more for these features:</a:t>
-            </a:r>
-            <a:br>
-              <a:rPr lang="en-US" dirty="0">
-                <a:latin typeface="+mj-lt"/>
-              </a:rPr>
-            </a:br>
-            <a:endParaRPr lang="en-US" dirty="0">
-              <a:latin typeface="+mj-lt"/>
-            </a:endParaRPr>
-          </a:p>
-          <a:p>
-            <a:pPr marL="342900" indent="-342900">
-              <a:buFont typeface="Arial" panose="020B0604020202020204" pitchFamily="34" charset="0"/>
-              <a:buChar char="•"/>
-            </a:pPr>
-            <a:r>
-              <a:rPr lang="en-US" sz="2400" dirty="0">
-                <a:latin typeface="+mj-lt"/>
-              </a:rPr>
-              <a:t>Vertical Drop</a:t>
-            </a:r>
-          </a:p>
-          <a:p>
-            <a:pPr marL="342900" indent="-342900">
-              <a:buFont typeface="Arial" panose="020B0604020202020204" pitchFamily="34" charset="0"/>
-              <a:buChar char="•"/>
-            </a:pPr>
-            <a:r>
-              <a:rPr lang="en-US" sz="2400" dirty="0">
-                <a:latin typeface="+mj-lt"/>
-              </a:rPr>
-              <a:t>Snow Making Area</a:t>
-            </a:r>
-          </a:p>
-          <a:p>
-            <a:pPr marL="342900" indent="-342900">
-              <a:buFont typeface="Arial" panose="020B0604020202020204" pitchFamily="34" charset="0"/>
-              <a:buChar char="•"/>
-            </a:pPr>
-            <a:r>
-              <a:rPr lang="en-US" sz="2400" dirty="0">
-                <a:latin typeface="+mj-lt"/>
-              </a:rPr>
-              <a:t>Chairs</a:t>
-            </a:r>
-          </a:p>
-          <a:p>
-            <a:pPr marL="342900" indent="-342900">
-              <a:buFont typeface="Arial" panose="020B0604020202020204" pitchFamily="34" charset="0"/>
-              <a:buChar char="•"/>
-            </a:pPr>
-            <a:r>
-              <a:rPr lang="en-US" sz="2400" dirty="0">
-                <a:latin typeface="+mj-lt"/>
-              </a:rPr>
-              <a:t>Fast Quads</a:t>
-            </a:r>
-          </a:p>
-          <a:p>
-            <a:pPr marL="342900" indent="-342900">
-              <a:buFont typeface="Arial" panose="020B0604020202020204" pitchFamily="34" charset="0"/>
-              <a:buChar char="•"/>
-            </a:pPr>
-            <a:r>
-              <a:rPr lang="en-US" sz="2400" dirty="0">
-                <a:latin typeface="+mj-lt"/>
-              </a:rPr>
-              <a:t>Runs</a:t>
-            </a:r>
-          </a:p>
-          <a:p>
-            <a:pPr marL="342900" indent="-342900">
-              <a:buFont typeface="Arial" panose="020B0604020202020204" pitchFamily="34" charset="0"/>
-              <a:buChar char="•"/>
-            </a:pPr>
-            <a:r>
-              <a:rPr lang="en-US" sz="2400" dirty="0">
-                <a:latin typeface="+mj-lt"/>
-              </a:rPr>
-              <a:t>Longest Run</a:t>
-            </a:r>
-          </a:p>
-          <a:p>
-            <a:pPr marL="342900" indent="-342900">
-              <a:buFont typeface="Arial" panose="020B0604020202020204" pitchFamily="34" charset="0"/>
-              <a:buChar char="•"/>
-            </a:pPr>
-            <a:r>
-              <a:rPr lang="en-US" sz="2400" dirty="0">
-                <a:latin typeface="+mj-lt"/>
-              </a:rPr>
-              <a:t>Trams</a:t>
-            </a:r>
-          </a:p>
-          <a:p>
-            <a:pPr marL="342900" indent="-342900">
-              <a:buFont typeface="Arial" panose="020B0604020202020204" pitchFamily="34" charset="0"/>
-              <a:buChar char="•"/>
-            </a:pPr>
-            <a:r>
-              <a:rPr lang="en-US" sz="2400" dirty="0">
-                <a:latin typeface="+mj-lt"/>
-              </a:rPr>
-              <a:t>Skiable Area</a:t>
-            </a:r>
-          </a:p>
-        </p:txBody>
-      </p:sp>
-      <p:sp>
-        <p:nvSpPr>
-          <p:cNvPr id="25" name="TextBox 24">
-            <a:extLst>
-              <a:ext uri="{FF2B5EF4-FFF2-40B4-BE49-F238E27FC236}">
-                <a16:creationId xmlns:a16="http://schemas.microsoft.com/office/drawing/2014/main" id="{B37D56F2-2CF3-43C3-A35B-52F600779507}"/>
-              </a:ext>
-            </a:extLst>
-          </p:cNvPr>
-          <p:cNvSpPr txBox="1"/>
-          <p:nvPr/>
+        <p:style>
+          <a:lnRef idx="2">
+            <a:schemeClr val="accent1">
+              <a:shade val="50000"/>
+            </a:schemeClr>
+          </a:lnRef>
+          <a:fillRef idx="1">
+            <a:schemeClr val="accent1"/>
+          </a:fillRef>
+          <a:effectRef idx="0">
+            <a:schemeClr val="accent1"/>
+          </a:effectRef>
+          <a:fontRef idx="minor">
+            <a:schemeClr val="lt1"/>
+          </a:fontRef>
+        </p:style>
+        <p:txBody>
+          <a:bodyPr rtlCol="0" anchor="ctr"/>
+          <a:lstStyle/>
+          <a:p>
+            <a:pPr algn="ctr"/>
+            <a:endParaRPr lang="en-US"/>
+          </a:p>
+        </p:txBody>
+      </p:sp>
+      <p:sp>
+        <p:nvSpPr>
+          <p:cNvPr id="11" name="Rectangle 10">
+            <a:extLst>
+              <a:ext uri="{FF2B5EF4-FFF2-40B4-BE49-F238E27FC236}">
+                <a16:creationId xmlns:a16="http://schemas.microsoft.com/office/drawing/2014/main" id="{B4F5FA0D-0104-4987-8241-EFF7C85B88DE}"/>
+              </a:ext>
+              <a:ext uri="{C183D7F6-B498-43B3-948B-1728B52AA6E4}">
+                <adec:decorative xmlns:adec="http://schemas.microsoft.com/office/drawing/2017/decorative" val="1"/>
+              </a:ext>
+            </a:extLst>
+          </p:cNvPr>
+          <p:cNvSpPr>
+            <a:spLocks noGrp="1" noRot="1" noChangeAspect="1" noMove="1" noResize="1" noEditPoints="1" noAdjustHandles="1" noChangeArrowheads="1" noChangeShapeType="1" noTextEdit="1"/>
+          </p:cNvSpPr>
+          <p:nvPr>
+            <p:extLst>
+              <p:ext uri="{386F3935-93C4-4BCD-93E2-E3B085C9AB24}">
+                <p16:designElem xmlns:p16="http://schemas.microsoft.com/office/powerpoint/2015/main" val="1"/>
+              </p:ext>
+            </p:extLst>
+          </p:nvPr>
         </p:nvSpPr>
         <p:spPr>
           <a:xfrm>
-            <a:off x="5038595" y="3031932"/>
-            <a:ext cx="6724117" cy="3441391"/>
+            <a:off x="1" y="0"/>
+            <a:ext cx="12191998" cy="6858000"/>
           </a:xfrm>
           <a:prstGeom prst="rect">
             <a:avLst/>
           </a:prstGeom>
-          <a:noFill/>
+          <a:gradFill>
+            <a:gsLst>
+              <a:gs pos="0">
+                <a:schemeClr val="accent1"/>
+              </a:gs>
+              <a:gs pos="25000">
+                <a:schemeClr val="accent1"/>
+              </a:gs>
+              <a:gs pos="94000">
+                <a:schemeClr val="accent5"/>
+              </a:gs>
+              <a:gs pos="100000">
+                <a:schemeClr val="accent5"/>
+              </a:gs>
+            </a:gsLst>
+            <a:lin ang="4200000" scaled="0"/>
+          </a:gradFill>
+          <a:ln>
+            <a:noFill/>
+          </a:ln>
         </p:spPr>
-        <p:txBody>
-          <a:bodyPr wrap="square">
-            <a:spAutoFit/>
-          </a:bodyPr>
-          <a:lstStyle/>
-          <a:p>
-            <a:pPr marR="0" lvl="0">
-              <a:lnSpc>
-                <a:spcPct val="107000"/>
-              </a:lnSpc>
-              <a:spcBef>
-                <a:spcPts val="0"/>
-              </a:spcBef>
-              <a:spcAft>
-                <a:spcPts val="800"/>
-              </a:spcAft>
-            </a:pPr>
-            <a:r>
-              <a:rPr lang="en-US" sz="2400" b="1" dirty="0">
-                <a:solidFill>
-                  <a:srgbClr val="00B0F0"/>
-                </a:solidFill>
-                <a:effectLst/>
-                <a:latin typeface="+mj-lt"/>
-                <a:ea typeface="Calibri" panose="020F0502020204030204" pitchFamily="34" charset="0"/>
-                <a:cs typeface="Calibri" panose="020F0502020204030204" pitchFamily="34" charset="0"/>
-              </a:rPr>
-              <a:t>Proposals with most potential:</a:t>
-            </a:r>
-          </a:p>
-          <a:p>
-            <a:pPr marL="457200" marR="0" lvl="0" indent="-457200">
-              <a:lnSpc>
-                <a:spcPct val="107000"/>
-              </a:lnSpc>
-              <a:spcBef>
-                <a:spcPts val="0"/>
-              </a:spcBef>
-              <a:spcAft>
-                <a:spcPts val="800"/>
-              </a:spcAft>
-              <a:buFont typeface="+mj-lt"/>
-              <a:buAutoNum type="arabicPeriod"/>
-            </a:pPr>
-            <a:r>
-              <a:rPr lang="en-US" sz="2400" b="1" dirty="0">
-                <a:effectLst/>
-                <a:latin typeface="+mj-lt"/>
-                <a:ea typeface="Calibri" panose="020F0502020204030204" pitchFamily="34" charset="0"/>
-                <a:cs typeface="Calibri" panose="020F0502020204030204" pitchFamily="34" charset="0"/>
-              </a:rPr>
-              <a:t>Close top 1 unused run.</a:t>
-            </a:r>
-            <a:br>
-              <a:rPr lang="en-US" sz="2400" dirty="0">
-                <a:effectLst/>
-                <a:latin typeface="+mj-lt"/>
-                <a:ea typeface="Calibri" panose="020F0502020204030204" pitchFamily="34" charset="0"/>
-                <a:cs typeface="Calibri" panose="020F0502020204030204" pitchFamily="34" charset="0"/>
-              </a:rPr>
-            </a:br>
-            <a:r>
-              <a:rPr lang="en-US" sz="2400" dirty="0">
-                <a:effectLst/>
-                <a:latin typeface="+mj-lt"/>
-                <a:ea typeface="Calibri" panose="020F0502020204030204" pitchFamily="34" charset="0"/>
-                <a:cs typeface="Calibri" panose="020F0502020204030204" pitchFamily="34" charset="0"/>
-              </a:rPr>
-              <a:t>Model says closing one run makes no difference.</a:t>
-            </a:r>
-            <a:endParaRPr lang="en-US" sz="2400" b="1" dirty="0">
-              <a:effectLst/>
-              <a:latin typeface="+mj-lt"/>
-              <a:ea typeface="Calibri" panose="020F0502020204030204" pitchFamily="34" charset="0"/>
-              <a:cs typeface="Calibri" panose="020F0502020204030204" pitchFamily="34" charset="0"/>
-            </a:endParaRPr>
-          </a:p>
-          <a:p>
-            <a:pPr marL="457200" marR="0" lvl="0" indent="-457200">
-              <a:lnSpc>
-                <a:spcPct val="107000"/>
-              </a:lnSpc>
-              <a:spcBef>
-                <a:spcPts val="0"/>
-              </a:spcBef>
-              <a:spcAft>
-                <a:spcPts val="800"/>
-              </a:spcAft>
-              <a:buFont typeface="+mj-lt"/>
-              <a:buAutoNum type="arabicPeriod"/>
-            </a:pPr>
-            <a:r>
-              <a:rPr lang="en-US" sz="2400" b="1" dirty="0">
-                <a:effectLst/>
-                <a:latin typeface="+mj-lt"/>
-                <a:ea typeface="Calibri" panose="020F0502020204030204" pitchFamily="34" charset="0"/>
-                <a:cs typeface="Calibri" panose="020F0502020204030204" pitchFamily="34" charset="0"/>
-              </a:rPr>
-              <a:t>Increase vertical drop 150 feet and install additional chair lift.</a:t>
-            </a:r>
-            <a:br>
-              <a:rPr lang="en-US" sz="2400" dirty="0">
-                <a:effectLst/>
-                <a:latin typeface="+mj-lt"/>
-                <a:ea typeface="Calibri" panose="020F0502020204030204" pitchFamily="34" charset="0"/>
-                <a:cs typeface="Calibri" panose="020F0502020204030204" pitchFamily="34" charset="0"/>
-              </a:rPr>
-            </a:br>
-            <a:r>
-              <a:rPr lang="en-US" sz="2400" dirty="0">
-                <a:effectLst/>
-                <a:latin typeface="+mj-lt"/>
-                <a:ea typeface="Calibri" panose="020F0502020204030204" pitchFamily="34" charset="0"/>
-                <a:cs typeface="Calibri" panose="020F0502020204030204" pitchFamily="34" charset="0"/>
-              </a:rPr>
-              <a:t>This scenario increases support for ticket price by $1.99 and over the season this could be expected to amount to $3474638.00</a:t>
-            </a:r>
-            <a:endParaRPr lang="en-US" sz="2400" dirty="0">
-              <a:effectLst/>
-              <a:latin typeface="+mj-lt"/>
-              <a:ea typeface="Calibri" panose="020F0502020204030204" pitchFamily="34" charset="0"/>
-              <a:cs typeface="Times New Roman" panose="02020603050405020304" pitchFamily="18" charset="0"/>
-            </a:endParaRPr>
-          </a:p>
-        </p:txBody>
-      </p:sp>
-      <p:sp>
-        <p:nvSpPr>
-          <p:cNvPr id="27" name="TextBox 26">
-            <a:extLst>
-              <a:ext uri="{FF2B5EF4-FFF2-40B4-BE49-F238E27FC236}">
-                <a16:creationId xmlns:a16="http://schemas.microsoft.com/office/drawing/2014/main" id="{F6F72908-61F4-4777-A7E1-B141A40B5CF9}"/>
-              </a:ext>
-            </a:extLst>
-          </p:cNvPr>
-          <p:cNvSpPr txBox="1"/>
-          <p:nvPr/>
-        </p:nvSpPr>
+        <p:style>
+          <a:lnRef idx="2">
+            <a:schemeClr val="accent1">
+              <a:shade val="50000"/>
+            </a:schemeClr>
+          </a:lnRef>
+          <a:fillRef idx="1">
+            <a:schemeClr val="accent1"/>
+          </a:fillRef>
+          <a:effectRef idx="0">
+            <a:schemeClr val="accent1"/>
+          </a:effectRef>
+          <a:fontRef idx="minor">
+            <a:schemeClr val="lt1"/>
+          </a:fontRef>
+        </p:style>
+        <p:txBody>
+          <a:bodyPr rtlCol="0" anchor="ctr"/>
+          <a:lstStyle/>
+          <a:p>
+            <a:pPr algn="ctr"/>
+            <a:endParaRPr lang="en-US"/>
+          </a:p>
+        </p:txBody>
+      </p:sp>
+      <p:pic>
+        <p:nvPicPr>
+          <p:cNvPr id="13" name="Picture 12">
+            <a:extLst>
+              <a:ext uri="{FF2B5EF4-FFF2-40B4-BE49-F238E27FC236}">
+                <a16:creationId xmlns:a16="http://schemas.microsoft.com/office/drawing/2014/main" id="{2897127E-6CEF-446C-BE87-93B7C46E49D1}"/>
+              </a:ext>
+              <a:ext uri="{C183D7F6-B498-43B3-948B-1728B52AA6E4}">
+                <adec:decorative xmlns:adec="http://schemas.microsoft.com/office/drawing/2017/decorative" val="1"/>
+              </a:ext>
+            </a:extLst>
+          </p:cNvPr>
+          <p:cNvPicPr>
+            <a:picLocks noGrp="1" noRot="1" noChangeAspect="1" noMove="1" noResize="1" noEditPoints="1" noAdjustHandles="1" noChangeArrowheads="1" noChangeShapeType="1" noCrop="1"/>
+          </p:cNvPicPr>
+          <p:nvPr>
+            <p:extLst>
+              <p:ext uri="{386F3935-93C4-4BCD-93E2-E3B085C9AB24}">
+                <p16:designElem xmlns:p16="http://schemas.microsoft.com/office/powerpoint/2015/main" val="1"/>
+              </p:ext>
+            </p:extLst>
+          </p:nvPr>
+        </p:nvPicPr>
+        <p:blipFill>
+          <a:blip r:embed="rId2">
+            <a:extLst>
+              <a:ext uri="{28A0092B-C50C-407E-A947-70E740481C1C}">
+                <a14:useLocalDpi xmlns:a14="http://schemas.microsoft.com/office/drawing/2010/main" val="0"/>
+              </a:ext>
+            </a:extLst>
+          </a:blip>
+          <a:stretch>
+            <a:fillRect/>
+          </a:stretch>
+        </p:blipFill>
         <p:spPr>
           <a:xfrm>
-            <a:off x="463826" y="1672466"/>
-            <a:ext cx="6093912" cy="470000"/>
+            <a:off x="0" y="0"/>
+            <a:ext cx="12192000" cy="6858000"/>
           </a:xfrm>
           <a:prstGeom prst="rect">
             <a:avLst/>
           </a:prstGeom>
-          <a:noFill/>
         </p:spPr>
-        <p:txBody>
-          <a:bodyPr wrap="square">
-            <a:spAutoFit/>
+      </p:pic>
+      <p:sp>
+        <p:nvSpPr>
+          <p:cNvPr id="2" name="Title 1">
+            <a:extLst>
+              <a:ext uri="{FF2B5EF4-FFF2-40B4-BE49-F238E27FC236}">
+                <a16:creationId xmlns:a16="http://schemas.microsoft.com/office/drawing/2014/main" id="{004F2053-AB8D-479A-866D-0DF818ABCE55}"/>
+              </a:ext>
+            </a:extLst>
+          </p:cNvPr>
+          <p:cNvSpPr>
+            <a:spLocks noGrp="1"/>
+          </p:cNvSpPr>
+          <p:nvPr>
+            <p:ph type="title"/>
+          </p:nvPr>
+        </p:nvSpPr>
+        <p:spPr>
+          <a:xfrm>
+            <a:off x="488539" y="3014337"/>
+            <a:ext cx="3669161" cy="726629"/>
+          </a:xfrm>
+        </p:spPr>
+        <p:txBody>
+          <a:bodyPr vert="horz" lIns="91440" tIns="45720" rIns="91440" bIns="45720" rtlCol="0" anchor="ctr">
+            <a:normAutofit/>
           </a:bodyPr>
           <a:lstStyle/>
           <a:p>
-            <a:pPr marR="0" lvl="0">
-              <a:lnSpc>
-                <a:spcPct val="107000"/>
-              </a:lnSpc>
-              <a:spcBef>
-                <a:spcPts val="0"/>
-              </a:spcBef>
-              <a:spcAft>
-                <a:spcPts val="800"/>
-              </a:spcAft>
-            </a:pPr>
-            <a:r>
-              <a:rPr lang="en-US" sz="2400" b="1" dirty="0">
+            <a:r>
+              <a:rPr lang="en-US" sz="3200" b="1" dirty="0">
                 <a:solidFill>
-                  <a:schemeClr val="accent5">
-                    <a:lumMod val="75000"/>
-                  </a:schemeClr>
+                  <a:schemeClr val="bg1"/>
                 </a:solidFill>
                 <a:effectLst/>
                 <a:latin typeface="+mj-lt"/>
@@ -4819,26 +5763,23 @@
               </a:rPr>
               <a:t>Key Findings</a:t>
             </a:r>
-            <a:endParaRPr lang="en-US" sz="2400" b="1" dirty="0">
+            <a:endParaRPr lang="en-US" sz="3100" kern="1200" dirty="0">
               <a:solidFill>
-                <a:schemeClr val="accent5">
-                  <a:lumMod val="75000"/>
-                </a:schemeClr>
+                <a:srgbClr val="FFFFFF"/>
               </a:solidFill>
-              <a:effectLst/>
               <a:latin typeface="+mj-lt"/>
-              <a:ea typeface="Calibri" panose="020F0502020204030204" pitchFamily="34" charset="0"/>
-              <a:cs typeface="Times New Roman" panose="02020603050405020304" pitchFamily="18" charset="0"/>
+              <a:ea typeface="+mj-ea"/>
+              <a:cs typeface="+mj-cs"/>
             </a:endParaRPr>
           </a:p>
         </p:txBody>
       </p:sp>
       <p:sp>
         <p:nvSpPr>
-          <p:cNvPr id="29" name="TextBox 28">
-            <a:extLst>
-              <a:ext uri="{FF2B5EF4-FFF2-40B4-BE49-F238E27FC236}">
-                <a16:creationId xmlns:a16="http://schemas.microsoft.com/office/drawing/2014/main" id="{D9EBEC53-1F84-4C6F-BD32-6E4BE2E333BA}"/>
+          <p:cNvPr id="7" name="TextBox 6">
+            <a:extLst>
+              <a:ext uri="{FF2B5EF4-FFF2-40B4-BE49-F238E27FC236}">
+                <a16:creationId xmlns:a16="http://schemas.microsoft.com/office/drawing/2014/main" id="{1D12F95A-68A0-4D18-8A0A-DAEBCAE7A0B7}"/>
               </a:ext>
             </a:extLst>
           </p:cNvPr>
@@ -4847,8 +5788,163 @@
         </p:nvSpPr>
         <p:spPr>
           <a:xfrm>
-            <a:off x="5055863" y="2142466"/>
-            <a:ext cx="6689579" cy="830997"/>
+            <a:off x="5780419" y="708850"/>
+            <a:ext cx="6084654" cy="4093428"/>
+          </a:xfrm>
+          <a:prstGeom prst="rect">
+            <a:avLst/>
+          </a:prstGeom>
+          <a:noFill/>
+        </p:spPr>
+        <p:txBody>
+          <a:bodyPr wrap="square">
+            <a:spAutoFit/>
+          </a:bodyPr>
+          <a:lstStyle/>
+          <a:p>
+            <a:r>
+              <a:rPr lang="en-US" sz="2800" b="1" dirty="0">
+                <a:solidFill>
+                  <a:srgbClr val="00B0F0"/>
+                </a:solidFill>
+                <a:latin typeface="+mj-lt"/>
+              </a:rPr>
+              <a:t>Features that matter:</a:t>
+            </a:r>
+          </a:p>
+          <a:p>
+            <a:r>
+              <a:rPr lang="en-US" sz="2000" dirty="0">
+                <a:latin typeface="+mj-lt"/>
+              </a:rPr>
+              <a:t>Customers are more likely to pay more for these features:</a:t>
+            </a:r>
+            <a:br>
+              <a:rPr lang="en-US" sz="2000" dirty="0">
+                <a:latin typeface="+mj-lt"/>
+              </a:rPr>
+            </a:br>
+            <a:endParaRPr lang="en-US" sz="2000" dirty="0">
+              <a:latin typeface="+mj-lt"/>
+            </a:endParaRPr>
+          </a:p>
+          <a:p>
+            <a:pPr marL="800100" lvl="1" indent="-342900">
+              <a:buFont typeface="Arial" panose="020B0604020202020204" pitchFamily="34" charset="0"/>
+              <a:buChar char="•"/>
+            </a:pPr>
+            <a:r>
+              <a:rPr lang="en-US" sz="2400" dirty="0">
+                <a:latin typeface="+mj-lt"/>
+              </a:rPr>
+              <a:t>Vertical Drop</a:t>
+            </a:r>
+          </a:p>
+          <a:p>
+            <a:pPr marL="800100" lvl="1" indent="-342900">
+              <a:buFont typeface="Arial" panose="020B0604020202020204" pitchFamily="34" charset="0"/>
+              <a:buChar char="•"/>
+            </a:pPr>
+            <a:r>
+              <a:rPr lang="en-US" sz="2400" dirty="0">
+                <a:latin typeface="+mj-lt"/>
+              </a:rPr>
+              <a:t>Snow Making Area </a:t>
+            </a:r>
+          </a:p>
+          <a:p>
+            <a:pPr marL="800100" lvl="1" indent="-342900">
+              <a:buFont typeface="Arial" panose="020B0604020202020204" pitchFamily="34" charset="0"/>
+              <a:buChar char="•"/>
+            </a:pPr>
+            <a:r>
+              <a:rPr lang="en-US" sz="2400" dirty="0">
+                <a:latin typeface="+mj-lt"/>
+              </a:rPr>
+              <a:t>Chairs </a:t>
+            </a:r>
+          </a:p>
+          <a:p>
+            <a:pPr marL="800100" lvl="1" indent="-342900">
+              <a:buFont typeface="Arial" panose="020B0604020202020204" pitchFamily="34" charset="0"/>
+              <a:buChar char="•"/>
+            </a:pPr>
+            <a:r>
+              <a:rPr lang="en-US" sz="2400" dirty="0">
+                <a:latin typeface="+mj-lt"/>
+              </a:rPr>
+              <a:t>Fast Quads  </a:t>
+            </a:r>
+          </a:p>
+          <a:p>
+            <a:pPr marL="800100" lvl="1" indent="-342900">
+              <a:buFont typeface="Arial" panose="020B0604020202020204" pitchFamily="34" charset="0"/>
+              <a:buChar char="•"/>
+            </a:pPr>
+            <a:r>
+              <a:rPr lang="en-US" sz="2400" dirty="0">
+                <a:latin typeface="+mj-lt"/>
+              </a:rPr>
+              <a:t>Runs </a:t>
+            </a:r>
+          </a:p>
+          <a:p>
+            <a:pPr marL="800100" lvl="1" indent="-342900">
+              <a:buFont typeface="Arial" panose="020B0604020202020204" pitchFamily="34" charset="0"/>
+              <a:buChar char="•"/>
+            </a:pPr>
+            <a:r>
+              <a:rPr lang="en-US" sz="2400" dirty="0">
+                <a:latin typeface="+mj-lt"/>
+              </a:rPr>
+              <a:t>Longest Run </a:t>
+            </a:r>
+          </a:p>
+          <a:p>
+            <a:pPr marL="800100" lvl="1" indent="-342900">
+              <a:buFont typeface="Arial" panose="020B0604020202020204" pitchFamily="34" charset="0"/>
+              <a:buChar char="•"/>
+            </a:pPr>
+            <a:r>
+              <a:rPr lang="en-US" sz="2400" dirty="0">
+                <a:latin typeface="+mj-lt"/>
+              </a:rPr>
+              <a:t>Trams </a:t>
+            </a:r>
+          </a:p>
+          <a:p>
+            <a:pPr marL="800100" lvl="1" indent="-342900">
+              <a:buFont typeface="Arial" panose="020B0604020202020204" pitchFamily="34" charset="0"/>
+              <a:buChar char="•"/>
+            </a:pPr>
+            <a:r>
+              <a:rPr lang="en-US" sz="2400" dirty="0">
+                <a:latin typeface="+mj-lt"/>
+              </a:rPr>
+              <a:t>Skiable Area</a:t>
+            </a:r>
+            <a:endParaRPr lang="en-US" sz="2200" dirty="0">
+              <a:latin typeface="+mj-lt"/>
+            </a:endParaRPr>
+          </a:p>
+        </p:txBody>
+      </p:sp>
+      <p:sp>
+        <p:nvSpPr>
+          <p:cNvPr id="10" name="TextBox 9">
+            <a:extLst>
+              <a:ext uri="{FF2B5EF4-FFF2-40B4-BE49-F238E27FC236}">
+                <a16:creationId xmlns:a16="http://schemas.microsoft.com/office/drawing/2014/main" id="{B91458D3-CC77-4BCC-AD42-1DDE9C9A3D31}"/>
+              </a:ext>
+            </a:extLst>
+          </p:cNvPr>
+          <p:cNvSpPr txBox="1"/>
+          <p:nvPr/>
+        </p:nvSpPr>
+        <p:spPr>
+          <a:xfrm>
+            <a:off x="5782963" y="5318153"/>
+            <a:ext cx="6082110" cy="830997"/>
           </a:xfrm>
           <a:prstGeom prst="rect">
             <a:avLst/>
@@ -4887,10 +5983,39 @@
           </a:p>
         </p:txBody>
       </p:sp>
+      <p:sp>
+        <p:nvSpPr>
+          <p:cNvPr id="3" name="Slide Number Placeholder 2">
+            <a:extLst>
+              <a:ext uri="{FF2B5EF4-FFF2-40B4-BE49-F238E27FC236}">
+                <a16:creationId xmlns:a16="http://schemas.microsoft.com/office/drawing/2014/main" id="{7CDDFE60-B4AE-4B5C-A787-FB47BC5F6ED0}"/>
+              </a:ext>
+            </a:extLst>
+          </p:cNvPr>
+          <p:cNvSpPr>
+            <a:spLocks noGrp="1"/>
+          </p:cNvSpPr>
+          <p:nvPr>
+            <p:ph type="sldNum" sz="quarter" idx="12"/>
+          </p:nvPr>
+        </p:nvSpPr>
+        <p:spPr/>
+        <p:txBody>
+          <a:bodyPr/>
+          <a:lstStyle/>
+          <a:p>
+            <a:fld id="{144EF1FE-37A2-4E8F-9397-BF5241D9507E}" type="slidenum">
+              <a:rPr lang="en-US" smtClean="0"/>
+              <a:t>3</a:t>
+            </a:fld>
+            <a:endParaRPr lang="en-US"/>
+          </a:p>
+        </p:txBody>
+      </p:sp>
     </p:spTree>
     <p:extLst>
       <p:ext uri="{BB962C8B-B14F-4D97-AF65-F5344CB8AC3E}">
-        <p14:creationId xmlns:p14="http://schemas.microsoft.com/office/powerpoint/2010/main" val="3035026278"/>
+        <p14:creationId xmlns:p14="http://schemas.microsoft.com/office/powerpoint/2010/main" val="1001453417"/>
       </p:ext>
     </p:extLst>
   </p:cSld>
@@ -4925,12 +6050,12 @@
           <a:chExt cx="0" cy="0"/>
         </a:xfrm>
       </p:grpSpPr>
-      <p:sp>
-        <p:nvSpPr>
-          <p:cNvPr id="24" name="Rectangle 23">
-            <a:extLst>
-              <a:ext uri="{FF2B5EF4-FFF2-40B4-BE49-F238E27FC236}">
-                <a16:creationId xmlns:a16="http://schemas.microsoft.com/office/drawing/2014/main" id="{0DE6A193-4755-479A-BC6F-A7EBCA73BE1A}"/>
+      <p:sp useBgFill="1">
+        <p:nvSpPr>
+          <p:cNvPr id="9" name="Rectangle 8">
+            <a:extLst>
+              <a:ext uri="{FF2B5EF4-FFF2-40B4-BE49-F238E27FC236}">
+                <a16:creationId xmlns:a16="http://schemas.microsoft.com/office/drawing/2014/main" id="{3B854194-185D-494D-905C-7C7CB2E30F6E}"/>
               </a:ext>
               <a:ext uri="{C183D7F6-B498-43B3-948B-1728B52AA6E4}">
                 <adec:decorative xmlns:adec="http://schemas.microsoft.com/office/drawing/2017/decorative" val="1"/>
@@ -4950,15 +6075,12 @@
         </p:nvSpPr>
         <p:spPr>
           <a:xfrm>
-            <a:off x="0" y="0"/>
-            <a:ext cx="12192001" cy="6858000"/>
+            <a:off x="1" y="0"/>
+            <a:ext cx="6082110" cy="6858000"/>
           </a:xfrm>
           <a:prstGeom prst="rect">
             <a:avLst/>
           </a:prstGeom>
-          <a:solidFill>
-            <a:schemeClr val="tx1"/>
-          </a:solidFill>
           <a:ln>
             <a:noFill/>
           </a:ln>
@@ -4990,10 +6112,10 @@
       </p:sp>
       <p:sp>
         <p:nvSpPr>
-          <p:cNvPr id="26" name="Freeform: Shape 25">
-            <a:extLst>
-              <a:ext uri="{FF2B5EF4-FFF2-40B4-BE49-F238E27FC236}">
-                <a16:creationId xmlns:a16="http://schemas.microsoft.com/office/drawing/2014/main" id="{5A55B759-31A7-423C-9BC2-A8BC09FE98B9}"/>
+          <p:cNvPr id="11" name="Rectangle 10">
+            <a:extLst>
+              <a:ext uri="{FF2B5EF4-FFF2-40B4-BE49-F238E27FC236}">
+                <a16:creationId xmlns:a16="http://schemas.microsoft.com/office/drawing/2014/main" id="{B4F5FA0D-0104-4987-8241-EFF7C85B88DE}"/>
               </a:ext>
               <a:ext uri="{C183D7F6-B498-43B3-948B-1728B52AA6E4}">
                 <adec:decorative xmlns:adec="http://schemas.microsoft.com/office/drawing/2017/decorative" val="1"/>
@@ -5013,78 +6135,29 @@
         </p:nvSpPr>
         <p:spPr>
           <a:xfrm>
-            <a:off x="433166" y="-478"/>
-            <a:ext cx="6754318" cy="6858478"/>
+            <a:off x="1" y="0"/>
+            <a:ext cx="12191998" cy="6858000"/>
           </a:xfrm>
-          <a:custGeom>
+          <a:prstGeom prst="rect">
             <a:avLst/>
-            <a:gdLst>
-              <a:gd name="connsiteX0" fmla="*/ 0 w 6754318"/>
-              <a:gd name="connsiteY0" fmla="*/ 6858478 h 6858478"/>
-              <a:gd name="connsiteX1" fmla="*/ 6754318 w 6754318"/>
-              <a:gd name="connsiteY1" fmla="*/ 6858478 h 6858478"/>
-              <a:gd name="connsiteX2" fmla="*/ 3577943 w 6754318"/>
-              <a:gd name="connsiteY2" fmla="*/ 0 h 6858478"/>
-              <a:gd name="connsiteX3" fmla="*/ 3572366 w 6754318"/>
-              <a:gd name="connsiteY3" fmla="*/ 0 h 6858478"/>
-              <a:gd name="connsiteX4" fmla="*/ 2506138 w 6754318"/>
-              <a:gd name="connsiteY4" fmla="*/ 0 h 6858478"/>
-              <a:gd name="connsiteX5" fmla="*/ 0 w 6754318"/>
-              <a:gd name="connsiteY5" fmla="*/ 0 h 6858478"/>
-            </a:gdLst>
-            <a:ahLst/>
-            <a:cxnLst>
-              <a:cxn ang="0">
-                <a:pos x="connsiteX0" y="connsiteY0"/>
-              </a:cxn>
-              <a:cxn ang="0">
-                <a:pos x="connsiteX1" y="connsiteY1"/>
-              </a:cxn>
-              <a:cxn ang="0">
-                <a:pos x="connsiteX2" y="connsiteY2"/>
-              </a:cxn>
-              <a:cxn ang="0">
-                <a:pos x="connsiteX3" y="connsiteY3"/>
-              </a:cxn>
-              <a:cxn ang="0">
-                <a:pos x="connsiteX4" y="connsiteY4"/>
-              </a:cxn>
-              <a:cxn ang="0">
-                <a:pos x="connsiteX5" y="connsiteY5"/>
-              </a:cxn>
-            </a:cxnLst>
-            <a:rect l="l" t="t" r="r" b="b"/>
-            <a:pathLst>
-              <a:path w="6754318" h="6858478">
-                <a:moveTo>
-                  <a:pt x="0" y="6858478"/>
-                </a:moveTo>
-                <a:lnTo>
-                  <a:pt x="6754318" y="6858478"/>
-                </a:lnTo>
-                <a:lnTo>
-                  <a:pt x="3577943" y="0"/>
-                </a:lnTo>
-                <a:lnTo>
-                  <a:pt x="3572366" y="0"/>
-                </a:lnTo>
-                <a:lnTo>
-                  <a:pt x="2506138" y="0"/>
-                </a:lnTo>
-                <a:lnTo>
-                  <a:pt x="0" y="0"/>
-                </a:lnTo>
-                <a:close/>
-              </a:path>
-            </a:pathLst>
-          </a:custGeom>
-          <a:solidFill>
-            <a:schemeClr val="bg1">
-              <a:lumMod val="85000"/>
-              <a:lumOff val="15000"/>
-              <a:alpha val="70000"/>
-            </a:schemeClr>
-          </a:solidFill>
+          </a:prstGeom>
+          <a:gradFill>
+            <a:gsLst>
+              <a:gs pos="0">
+                <a:schemeClr val="accent1"/>
+              </a:gs>
+              <a:gs pos="25000">
+                <a:schemeClr val="accent1"/>
+              </a:gs>
+              <a:gs pos="94000">
+                <a:schemeClr val="accent5"/>
+              </a:gs>
+              <a:gs pos="100000">
+                <a:schemeClr val="accent5"/>
+              </a:gs>
+            </a:gsLst>
+            <a:lin ang="4200000" scaled="0"/>
+          </a:gradFill>
           <a:ln>
             <a:noFill/>
           </a:ln>
@@ -5106,60 +6179,29 @@
           </a:fontRef>
         </p:style>
         <p:txBody>
-          <a:bodyPr wrap="square" rtlCol="0" anchor="ctr">
-            <a:noAutofit/>
-          </a:bodyPr>
-          <a:lstStyle/>
-          <a:p>
-            <a:pPr marL="0" marR="0" lvl="0" indent="0" algn="ctr" defTabSz="914400" rtl="0" eaLnBrk="1" fontAlgn="auto" latinLnBrk="0" hangingPunct="1">
-              <a:lnSpc>
-                <a:spcPct val="100000"/>
-              </a:lnSpc>
-              <a:spcBef>
-                <a:spcPts val="0"/>
-              </a:spcBef>
-              <a:spcAft>
-                <a:spcPts val="0"/>
-              </a:spcAft>
-              <a:buClrTx/>
-              <a:buSzTx/>
-              <a:buFontTx/>
-              <a:buNone/>
-              <a:tabLst/>
-              <a:defRPr/>
-            </a:pPr>
-            <a:endParaRPr kumimoji="0" lang="en-US" sz="1800" b="0" i="0" u="none" strike="noStrike" kern="1200" cap="none" spc="0" normalizeH="0" baseline="0" noProof="0">
-              <a:ln>
-                <a:noFill/>
-              </a:ln>
-              <a:solidFill>
-                <a:prstClr val="white"/>
-              </a:solidFill>
-              <a:effectLst/>
-              <a:uLnTx/>
-              <a:uFillTx/>
-              <a:latin typeface="Calibri" panose="020F0502020204030204"/>
-              <a:ea typeface="+mn-ea"/>
-              <a:cs typeface="+mn-cs"/>
-            </a:endParaRPr>
-          </a:p>
-        </p:txBody>
-      </p:sp>
-      <p:sp>
-        <p:nvSpPr>
-          <p:cNvPr id="28" name="Freeform: Shape 27">
-            <a:extLst>
-              <a:ext uri="{FF2B5EF4-FFF2-40B4-BE49-F238E27FC236}">
-                <a16:creationId xmlns:a16="http://schemas.microsoft.com/office/drawing/2014/main" id="{617D17FB-975C-487E-8519-38E547609E33}"/>
+          <a:bodyPr rtlCol="0" anchor="ctr"/>
+          <a:lstStyle/>
+          <a:p>
+            <a:pPr algn="ctr"/>
+            <a:endParaRPr lang="en-US"/>
+          </a:p>
+        </p:txBody>
+      </p:sp>
+      <p:pic>
+        <p:nvPicPr>
+          <p:cNvPr id="13" name="Picture 12">
+            <a:extLst>
+              <a:ext uri="{FF2B5EF4-FFF2-40B4-BE49-F238E27FC236}">
+                <a16:creationId xmlns:a16="http://schemas.microsoft.com/office/drawing/2014/main" id="{2897127E-6CEF-446C-BE87-93B7C46E49D1}"/>
               </a:ext>
               <a:ext uri="{C183D7F6-B498-43B3-948B-1728B52AA6E4}">
                 <adec:decorative xmlns:adec="http://schemas.microsoft.com/office/drawing/2017/decorative" val="1"/>
               </a:ext>
             </a:extLst>
           </p:cNvPr>
-          <p:cNvSpPr>
-            <a:spLocks noGrp="1" noRot="1" noChangeAspect="1" noMove="1" noResize="1" noEditPoints="1" noAdjustHandles="1" noChangeArrowheads="1" noChangeShapeType="1" noTextEdit="1"/>
-          </p:cNvSpPr>
+          <p:cNvPicPr>
+            <a:picLocks noGrp="1" noRot="1" noChangeAspect="1" noMove="1" noResize="1" noEditPoints="1" noAdjustHandles="1" noChangeArrowheads="1" noChangeShapeType="1" noCrop="1"/>
+          </p:cNvPicPr>
           <p:nvPr>
             <p:extLst>
               <p:ext uri="{386F3935-93C4-4BCD-93E2-E3B085C9AB24}">
@@ -5167,226 +6209,122 @@
               </p:ext>
             </p:extLst>
           </p:nvPr>
-        </p:nvSpPr>
-        <p:spPr>
-          <a:xfrm>
-            <a:off x="0" y="-478"/>
-            <a:ext cx="6386947" cy="6858478"/>
-          </a:xfrm>
-          <a:custGeom>
-            <a:avLst/>
-            <a:gdLst>
-              <a:gd name="connsiteX0" fmla="*/ 433167 w 6386947"/>
-              <a:gd name="connsiteY0" fmla="*/ 0 h 6858478"/>
-              <a:gd name="connsiteX1" fmla="*/ 2138767 w 6386947"/>
-              <a:gd name="connsiteY1" fmla="*/ 0 h 6858478"/>
-              <a:gd name="connsiteX2" fmla="*/ 3204995 w 6386947"/>
-              <a:gd name="connsiteY2" fmla="*/ 0 h 6858478"/>
-              <a:gd name="connsiteX3" fmla="*/ 3210572 w 6386947"/>
-              <a:gd name="connsiteY3" fmla="*/ 0 h 6858478"/>
-              <a:gd name="connsiteX4" fmla="*/ 6386947 w 6386947"/>
-              <a:gd name="connsiteY4" fmla="*/ 6858478 h 6858478"/>
-              <a:gd name="connsiteX5" fmla="*/ 1832610 w 6386947"/>
-              <a:gd name="connsiteY5" fmla="*/ 6858478 h 6858478"/>
-              <a:gd name="connsiteX6" fmla="*/ 433167 w 6386947"/>
-              <a:gd name="connsiteY6" fmla="*/ 6858478 h 6858478"/>
-              <a:gd name="connsiteX7" fmla="*/ 0 w 6386947"/>
-              <a:gd name="connsiteY7" fmla="*/ 6858478 h 6858478"/>
-              <a:gd name="connsiteX8" fmla="*/ 0 w 6386947"/>
-              <a:gd name="connsiteY8" fmla="*/ 478 h 6858478"/>
-              <a:gd name="connsiteX9" fmla="*/ 433167 w 6386947"/>
-              <a:gd name="connsiteY9" fmla="*/ 478 h 6858478"/>
-            </a:gdLst>
-            <a:ahLst/>
-            <a:cxnLst>
-              <a:cxn ang="0">
-                <a:pos x="connsiteX0" y="connsiteY0"/>
-              </a:cxn>
-              <a:cxn ang="0">
-                <a:pos x="connsiteX1" y="connsiteY1"/>
-              </a:cxn>
-              <a:cxn ang="0">
-                <a:pos x="connsiteX2" y="connsiteY2"/>
-              </a:cxn>
-              <a:cxn ang="0">
-                <a:pos x="connsiteX3" y="connsiteY3"/>
-              </a:cxn>
-              <a:cxn ang="0">
-                <a:pos x="connsiteX4" y="connsiteY4"/>
-              </a:cxn>
-              <a:cxn ang="0">
-                <a:pos x="connsiteX5" y="connsiteY5"/>
-              </a:cxn>
-              <a:cxn ang="0">
-                <a:pos x="connsiteX6" y="connsiteY6"/>
-              </a:cxn>
-              <a:cxn ang="0">
-                <a:pos x="connsiteX7" y="connsiteY7"/>
-              </a:cxn>
-              <a:cxn ang="0">
-                <a:pos x="connsiteX8" y="connsiteY8"/>
-              </a:cxn>
-              <a:cxn ang="0">
-                <a:pos x="connsiteX9" y="connsiteY9"/>
-              </a:cxn>
-            </a:cxnLst>
-            <a:rect l="l" t="t" r="r" b="b"/>
-            <a:pathLst>
-              <a:path w="6386947" h="6858478">
-                <a:moveTo>
-                  <a:pt x="433167" y="0"/>
-                </a:moveTo>
-                <a:lnTo>
-                  <a:pt x="2138767" y="0"/>
-                </a:lnTo>
-                <a:lnTo>
-                  <a:pt x="3204995" y="0"/>
-                </a:lnTo>
-                <a:lnTo>
-                  <a:pt x="3210572" y="0"/>
-                </a:lnTo>
-                <a:lnTo>
-                  <a:pt x="6386947" y="6858478"/>
-                </a:lnTo>
-                <a:lnTo>
-                  <a:pt x="1832610" y="6858478"/>
-                </a:lnTo>
-                <a:lnTo>
-                  <a:pt x="433167" y="6858478"/>
-                </a:lnTo>
-                <a:lnTo>
-                  <a:pt x="0" y="6858478"/>
-                </a:lnTo>
-                <a:lnTo>
-                  <a:pt x="0" y="478"/>
-                </a:lnTo>
-                <a:lnTo>
-                  <a:pt x="433167" y="478"/>
-                </a:lnTo>
-                <a:close/>
-              </a:path>
-            </a:pathLst>
-          </a:custGeom>
-          <a:solidFill>
-            <a:schemeClr val="bg1">
-              <a:lumMod val="85000"/>
-              <a:lumOff val="15000"/>
-            </a:schemeClr>
-          </a:solidFill>
-          <a:ln>
-            <a:noFill/>
-          </a:ln>
-        </p:spPr>
-        <p:style>
-          <a:lnRef idx="2">
-            <a:schemeClr val="accent1">
-              <a:shade val="50000"/>
-            </a:schemeClr>
-          </a:lnRef>
-          <a:fillRef idx="1">
-            <a:schemeClr val="accent1"/>
-          </a:fillRef>
-          <a:effectRef idx="0">
-            <a:schemeClr val="accent1"/>
-          </a:effectRef>
-          <a:fontRef idx="minor">
-            <a:schemeClr val="lt1"/>
-          </a:fontRef>
-        </p:style>
-        <p:txBody>
-          <a:bodyPr wrap="square" rtlCol="0" anchor="ctr">
-            <a:noAutofit/>
-          </a:bodyPr>
-          <a:lstStyle/>
-          <a:p>
-            <a:pPr algn="ctr"/>
-            <a:endParaRPr lang="en-US"/>
-          </a:p>
-        </p:txBody>
-      </p:sp>
-      <p:sp>
-        <p:nvSpPr>
-          <p:cNvPr id="10" name="TextBox 9">
-            <a:extLst>
-              <a:ext uri="{FF2B5EF4-FFF2-40B4-BE49-F238E27FC236}">
-                <a16:creationId xmlns:a16="http://schemas.microsoft.com/office/drawing/2014/main" id="{53B82577-E7AA-4750-9B17-1D73462A06CB}"/>
-              </a:ext>
-            </a:extLst>
-          </p:cNvPr>
-          <p:cNvSpPr txBox="1"/>
-          <p:nvPr/>
-        </p:nvSpPr>
-        <p:spPr>
-          <a:xfrm>
-            <a:off x="804672" y="3993681"/>
-            <a:ext cx="4057840" cy="2249424"/>
-          </a:xfrm>
-          <a:prstGeom prst="rect">
-            <a:avLst/>
-          </a:prstGeom>
-        </p:spPr>
-        <p:txBody>
-          <a:bodyPr vert="horz" lIns="91440" tIns="45720" rIns="91440" bIns="45720" rtlCol="0" anchor="t">
-            <a:normAutofit/>
-          </a:bodyPr>
-          <a:lstStyle/>
-          <a:p>
-            <a:pPr>
-              <a:lnSpc>
-                <a:spcPct val="90000"/>
-              </a:lnSpc>
-              <a:spcBef>
-                <a:spcPct val="0"/>
-              </a:spcBef>
-              <a:spcAft>
-                <a:spcPts val="600"/>
-              </a:spcAft>
-            </a:pPr>
-            <a:r>
-              <a:rPr lang="en-US" sz="3800" b="1" dirty="0">
-                <a:latin typeface="+mj-lt"/>
-                <a:ea typeface="+mj-ea"/>
-                <a:cs typeface="+mj-cs"/>
-              </a:rPr>
-              <a:t>Ticket Prices for Big Mountain Resort compared with the market segment</a:t>
-            </a:r>
-          </a:p>
-        </p:txBody>
-      </p:sp>
-      <p:pic>
-        <p:nvPicPr>
-          <p:cNvPr id="6" name="Picture 5">
-            <a:extLst>
-              <a:ext uri="{FF2B5EF4-FFF2-40B4-BE49-F238E27FC236}">
-                <a16:creationId xmlns:a16="http://schemas.microsoft.com/office/drawing/2014/main" id="{D9EE0ADD-7537-46F1-8DE4-6597361511B5}"/>
-              </a:ext>
-            </a:extLst>
-          </p:cNvPr>
-          <p:cNvPicPr/>
-          <p:nvPr/>
         </p:nvPicPr>
         <p:blipFill>
-          <a:blip r:embed="rId2"/>
+          <a:blip r:embed="rId2">
+            <a:extLst>
+              <a:ext uri="{28A0092B-C50C-407E-A947-70E740481C1C}">
+                <a14:useLocalDpi xmlns:a14="http://schemas.microsoft.com/office/drawing/2010/main" val="0"/>
+              </a:ext>
+            </a:extLst>
+          </a:blip>
           <a:stretch>
             <a:fillRect/>
           </a:stretch>
         </p:blipFill>
         <p:spPr>
           <a:xfrm>
-            <a:off x="5953781" y="353643"/>
-            <a:ext cx="5702113" cy="3022119"/>
+            <a:off x="0" y="0"/>
+            <a:ext cx="12192000" cy="6858000"/>
           </a:xfrm>
           <a:prstGeom prst="rect">
             <a:avLst/>
           </a:prstGeom>
         </p:spPr>
       </p:pic>
+      <p:sp>
+        <p:nvSpPr>
+          <p:cNvPr id="2" name="Title 1">
+            <a:extLst>
+              <a:ext uri="{FF2B5EF4-FFF2-40B4-BE49-F238E27FC236}">
+                <a16:creationId xmlns:a16="http://schemas.microsoft.com/office/drawing/2014/main" id="{004F2053-AB8D-479A-866D-0DF818ABCE55}"/>
+              </a:ext>
+            </a:extLst>
+          </p:cNvPr>
+          <p:cNvSpPr>
+            <a:spLocks noGrp="1"/>
+          </p:cNvSpPr>
+          <p:nvPr>
+            <p:ph type="title"/>
+          </p:nvPr>
+        </p:nvSpPr>
+        <p:spPr>
+          <a:xfrm>
+            <a:off x="488539" y="1186249"/>
+            <a:ext cx="3669161" cy="4399005"/>
+          </a:xfrm>
+        </p:spPr>
+        <p:txBody>
+          <a:bodyPr vert="horz" lIns="91440" tIns="45720" rIns="91440" bIns="45720" rtlCol="0" anchor="ctr">
+            <a:normAutofit/>
+          </a:bodyPr>
+          <a:lstStyle/>
+          <a:p>
+            <a:pPr algn="ctr"/>
+            <a:r>
+              <a:rPr lang="en-US" sz="3200" b="1" dirty="0">
+                <a:solidFill>
+                  <a:schemeClr val="bg1"/>
+                </a:solidFill>
+                <a:latin typeface="+mj-lt"/>
+                <a:ea typeface="+mj-ea"/>
+                <a:cs typeface="+mj-cs"/>
+              </a:rPr>
+              <a:t>Ticket Prices for Big Mountain Resort compared with the market segment</a:t>
+            </a:r>
+            <a:br>
+              <a:rPr lang="en-US" sz="3200" b="1" dirty="0">
+                <a:latin typeface="+mj-lt"/>
+                <a:ea typeface="+mj-ea"/>
+                <a:cs typeface="+mj-cs"/>
+              </a:rPr>
+            </a:br>
+            <a:endParaRPr lang="en-US" sz="3100" kern="1200" dirty="0">
+              <a:solidFill>
+                <a:schemeClr val="bg1"/>
+              </a:solidFill>
+              <a:latin typeface="+mj-lt"/>
+              <a:ea typeface="+mj-ea"/>
+              <a:cs typeface="+mj-cs"/>
+            </a:endParaRPr>
+          </a:p>
+        </p:txBody>
+      </p:sp>
+      <p:sp>
+        <p:nvSpPr>
+          <p:cNvPr id="3" name="Slide Number Placeholder 2">
+            <a:extLst>
+              <a:ext uri="{FF2B5EF4-FFF2-40B4-BE49-F238E27FC236}">
+                <a16:creationId xmlns:a16="http://schemas.microsoft.com/office/drawing/2014/main" id="{8B63AA6B-BDC3-4A59-BFC9-0B23E9907802}"/>
+              </a:ext>
+            </a:extLst>
+          </p:cNvPr>
+          <p:cNvSpPr>
+            <a:spLocks noGrp="1"/>
+          </p:cNvSpPr>
+          <p:nvPr>
+            <p:ph type="sldNum" sz="quarter" idx="12"/>
+          </p:nvPr>
+        </p:nvSpPr>
+        <p:spPr/>
+        <p:txBody>
+          <a:bodyPr/>
+          <a:lstStyle/>
+          <a:p>
+            <a:fld id="{144EF1FE-37A2-4E8F-9397-BF5241D9507E}" type="slidenum">
+              <a:rPr lang="en-US" smtClean="0"/>
+              <a:t>4</a:t>
+            </a:fld>
+            <a:endParaRPr lang="en-US"/>
+          </a:p>
+        </p:txBody>
+      </p:sp>
       <p:pic>
         <p:nvPicPr>
-          <p:cNvPr id="8" name="Picture 7">
-            <a:extLst>
-              <a:ext uri="{FF2B5EF4-FFF2-40B4-BE49-F238E27FC236}">
-                <a16:creationId xmlns:a16="http://schemas.microsoft.com/office/drawing/2014/main" id="{9B05764C-2CE6-4B40-8CEA-D2E7F841FC5A}"/>
+          <p:cNvPr id="10" name="Picture 9">
+            <a:extLst>
+              <a:ext uri="{FF2B5EF4-FFF2-40B4-BE49-F238E27FC236}">
+                <a16:creationId xmlns:a16="http://schemas.microsoft.com/office/drawing/2014/main" id="{2FDF0E00-EA59-41C5-98A6-824DBA53B86D}"/>
               </a:ext>
             </a:extLst>
           </p:cNvPr>
@@ -5401,7 +6339,35 @@
         </p:blipFill>
         <p:spPr>
           <a:xfrm>
-            <a:off x="7491109" y="3772063"/>
+            <a:off x="5651687" y="668123"/>
+            <a:ext cx="5702113" cy="3022119"/>
+          </a:xfrm>
+          <a:prstGeom prst="rect">
+            <a:avLst/>
+          </a:prstGeom>
+        </p:spPr>
+      </p:pic>
+      <p:pic>
+        <p:nvPicPr>
+          <p:cNvPr id="12" name="Picture 11">
+            <a:extLst>
+              <a:ext uri="{FF2B5EF4-FFF2-40B4-BE49-F238E27FC236}">
+                <a16:creationId xmlns:a16="http://schemas.microsoft.com/office/drawing/2014/main" id="{66B6645B-BA44-4D47-A358-EE563895CEF2}"/>
+              </a:ext>
+            </a:extLst>
+          </p:cNvPr>
+          <p:cNvPicPr/>
+          <p:nvPr/>
+        </p:nvPicPr>
+        <p:blipFill>
+          <a:blip r:embed="rId4"/>
+          <a:stretch>
+            <a:fillRect/>
+          </a:stretch>
+        </p:blipFill>
+        <p:spPr>
+          <a:xfrm>
+            <a:off x="7189015" y="4086543"/>
             <a:ext cx="4164785" cy="2269807"/>
           </a:xfrm>
           <a:prstGeom prst="rect">
@@ -5409,70 +6375,15 @@
           </a:prstGeom>
         </p:spPr>
       </p:pic>
-      <p:sp>
-        <p:nvSpPr>
-          <p:cNvPr id="4" name="Title 1">
-            <a:extLst>
-              <a:ext uri="{FF2B5EF4-FFF2-40B4-BE49-F238E27FC236}">
-                <a16:creationId xmlns:a16="http://schemas.microsoft.com/office/drawing/2014/main" id="{6EBDA69C-F760-42B6-8F89-0D859FA954CB}"/>
-              </a:ext>
-            </a:extLst>
-          </p:cNvPr>
-          <p:cNvSpPr txBox="1">
-            <a:spLocks/>
-          </p:cNvSpPr>
-          <p:nvPr/>
-        </p:nvSpPr>
-        <p:spPr>
-          <a:xfrm>
-            <a:off x="463826" y="1465381"/>
-            <a:ext cx="11191461" cy="1325563"/>
-          </a:xfrm>
-          <a:prstGeom prst="rect">
-            <a:avLst/>
-          </a:prstGeom>
-        </p:spPr>
-        <p:txBody>
-          <a:bodyPr vert="horz" lIns="91440" tIns="45720" rIns="91440" bIns="45720" rtlCol="0" anchor="ctr">
-            <a:normAutofit fontScale="97500"/>
-          </a:bodyPr>
-          <a:lstStyle>
-            <a:lvl1pPr algn="l" defTabSz="914400" rtl="0" eaLnBrk="1" latinLnBrk="0" hangingPunct="1">
-              <a:lnSpc>
-                <a:spcPct val="90000"/>
-              </a:lnSpc>
-              <a:spcBef>
-                <a:spcPct val="0"/>
-              </a:spcBef>
-              <a:buNone/>
-              <a:defRPr sz="4400" kern="1200">
-                <a:solidFill>
-                  <a:schemeClr val="tx1"/>
-                </a:solidFill>
-                <a:latin typeface="+mj-lt"/>
-                <a:ea typeface="+mj-ea"/>
-                <a:cs typeface="+mj-cs"/>
-              </a:defRPr>
-            </a:lvl1pPr>
-          </a:lstStyle>
-          <a:p>
-            <a:endParaRPr lang="en-US" sz="2500" dirty="0">
-              <a:effectLst/>
-              <a:ea typeface="Calibri" panose="020F0502020204030204" pitchFamily="34" charset="0"/>
-              <a:cs typeface="Times New Roman" panose="02020603050405020304" pitchFamily="18" charset="0"/>
-            </a:endParaRPr>
-          </a:p>
-        </p:txBody>
-      </p:sp>
     </p:spTree>
     <p:extLst>
       <p:ext uri="{BB962C8B-B14F-4D97-AF65-F5344CB8AC3E}">
-        <p14:creationId xmlns:p14="http://schemas.microsoft.com/office/powerpoint/2010/main" val="3604653763"/>
+        <p14:creationId xmlns:p14="http://schemas.microsoft.com/office/powerpoint/2010/main" val="4136706987"/>
       </p:ext>
     </p:extLst>
   </p:cSld>
   <p:clrMapOvr>
-    <a:overrideClrMapping bg1="dk1" tx1="lt1" bg2="dk2" tx2="lt2" accent1="accent1" accent2="accent2" accent3="accent3" accent4="accent4" accent5="accent5" accent6="accent6" hlink="hlink" folHlink="folHlink"/>
+    <a:masterClrMapping/>
   </p:clrMapOvr>
 </p:sld>
 </file>
@@ -5960,6 +6871,35 @@
           </a:prstGeom>
         </p:spPr>
       </p:pic>
+      <p:sp>
+        <p:nvSpPr>
+          <p:cNvPr id="2" name="Slide Number Placeholder 1">
+            <a:extLst>
+              <a:ext uri="{FF2B5EF4-FFF2-40B4-BE49-F238E27FC236}">
+                <a16:creationId xmlns:a16="http://schemas.microsoft.com/office/drawing/2014/main" id="{9B745A43-788C-4382-BBBB-BFA0337785B8}"/>
+              </a:ext>
+            </a:extLst>
+          </p:cNvPr>
+          <p:cNvSpPr>
+            <a:spLocks noGrp="1"/>
+          </p:cNvSpPr>
+          <p:nvPr>
+            <p:ph type="sldNum" sz="quarter" idx="12"/>
+          </p:nvPr>
+        </p:nvSpPr>
+        <p:spPr/>
+        <p:txBody>
+          <a:bodyPr/>
+          <a:lstStyle/>
+          <a:p>
+            <a:fld id="{144EF1FE-37A2-4E8F-9397-BF5241D9507E}" type="slidenum">
+              <a:rPr lang="en-US" smtClean="0"/>
+              <a:t>5</a:t>
+            </a:fld>
+            <a:endParaRPr lang="en-US"/>
+          </a:p>
+        </p:txBody>
+      </p:sp>
     </p:spTree>
     <p:extLst>
       <p:ext uri="{BB962C8B-B14F-4D97-AF65-F5344CB8AC3E}">
@@ -6456,6 +7396,35 @@
           </a:prstGeom>
         </p:spPr>
       </p:pic>
+      <p:sp>
+        <p:nvSpPr>
+          <p:cNvPr id="2" name="Slide Number Placeholder 1">
+            <a:extLst>
+              <a:ext uri="{FF2B5EF4-FFF2-40B4-BE49-F238E27FC236}">
+                <a16:creationId xmlns:a16="http://schemas.microsoft.com/office/drawing/2014/main" id="{4FD2F42F-2157-4435-885C-E6B1B43CE692}"/>
+              </a:ext>
+            </a:extLst>
+          </p:cNvPr>
+          <p:cNvSpPr>
+            <a:spLocks noGrp="1"/>
+          </p:cNvSpPr>
+          <p:nvPr>
+            <p:ph type="sldNum" sz="quarter" idx="12"/>
+          </p:nvPr>
+        </p:nvSpPr>
+        <p:spPr/>
+        <p:txBody>
+          <a:bodyPr/>
+          <a:lstStyle/>
+          <a:p>
+            <a:fld id="{144EF1FE-37A2-4E8F-9397-BF5241D9507E}" type="slidenum">
+              <a:rPr lang="en-US" smtClean="0"/>
+              <a:t>6</a:t>
+            </a:fld>
+            <a:endParaRPr lang="en-US"/>
+          </a:p>
+        </p:txBody>
+      </p:sp>
     </p:spTree>
     <p:extLst>
       <p:ext uri="{BB962C8B-B14F-4D97-AF65-F5344CB8AC3E}">
@@ -6472,6 +7441,14 @@
 <file path=ppt/slides/slide7.xml><?xml version="1.0" encoding="utf-8"?>
 <p:sld xmlns:a="http://schemas.openxmlformats.org/drawingml/2006/main" xmlns:r="http://schemas.openxmlformats.org/officeDocument/2006/relationships" xmlns:p="http://schemas.openxmlformats.org/presentationml/2006/main">
   <p:cSld>
+    <p:bg>
+      <p:bgPr>
+        <a:solidFill>
+          <a:schemeClr val="bg1"/>
+        </a:solidFill>
+        <a:effectLst/>
+      </p:bgPr>
+    </p:bg>
     <p:spTree>
       <p:nvGrpSpPr>
         <p:cNvPr id="1" name=""/>
@@ -6486,12 +7463,238 @@
           <a:chExt cx="0" cy="0"/>
         </a:xfrm>
       </p:grpSpPr>
-      <p:sp>
-        <p:nvSpPr>
-          <p:cNvPr id="18" name="TextBox 17">
-            <a:extLst>
-              <a:ext uri="{FF2B5EF4-FFF2-40B4-BE49-F238E27FC236}">
-                <a16:creationId xmlns:a16="http://schemas.microsoft.com/office/drawing/2014/main" id="{DE76E5CE-AC5C-400E-8638-99B6A4A0EF50}"/>
+      <p:sp useBgFill="1">
+        <p:nvSpPr>
+          <p:cNvPr id="9" name="Rectangle 8">
+            <a:extLst>
+              <a:ext uri="{FF2B5EF4-FFF2-40B4-BE49-F238E27FC236}">
+                <a16:creationId xmlns:a16="http://schemas.microsoft.com/office/drawing/2014/main" id="{3B854194-185D-494D-905C-7C7CB2E30F6E}"/>
+              </a:ext>
+              <a:ext uri="{C183D7F6-B498-43B3-948B-1728B52AA6E4}">
+                <adec:decorative xmlns:adec="http://schemas.microsoft.com/office/drawing/2017/decorative" val="1"/>
+              </a:ext>
+            </a:extLst>
+          </p:cNvPr>
+          <p:cNvSpPr>
+            <a:spLocks noGrp="1" noRot="1" noChangeAspect="1" noMove="1" noResize="1" noEditPoints="1" noAdjustHandles="1" noChangeArrowheads="1" noChangeShapeType="1" noTextEdit="1"/>
+          </p:cNvSpPr>
+          <p:nvPr>
+            <p:extLst>
+              <p:ext uri="{386F3935-93C4-4BCD-93E2-E3B085C9AB24}">
+                <p16:designElem xmlns:p16="http://schemas.microsoft.com/office/powerpoint/2015/main" val="1"/>
+              </p:ext>
+            </p:extLst>
+          </p:nvPr>
+        </p:nvSpPr>
+        <p:spPr>
+          <a:xfrm>
+            <a:off x="1" y="0"/>
+            <a:ext cx="6082110" cy="6858000"/>
+          </a:xfrm>
+          <a:prstGeom prst="rect">
+            <a:avLst/>
+          </a:prstGeom>
+          <a:ln>
+            <a:noFill/>
+          </a:ln>
+        </p:spPr>
+        <p:style>
+          <a:lnRef idx="2">
+            <a:schemeClr val="accent1">
+              <a:shade val="50000"/>
+            </a:schemeClr>
+          </a:lnRef>
+          <a:fillRef idx="1">
+            <a:schemeClr val="accent1"/>
+          </a:fillRef>
+          <a:effectRef idx="0">
+            <a:schemeClr val="accent1"/>
+          </a:effectRef>
+          <a:fontRef idx="minor">
+            <a:schemeClr val="lt1"/>
+          </a:fontRef>
+        </p:style>
+        <p:txBody>
+          <a:bodyPr rtlCol="0" anchor="ctr"/>
+          <a:lstStyle/>
+          <a:p>
+            <a:pPr algn="ctr"/>
+            <a:endParaRPr lang="en-US"/>
+          </a:p>
+        </p:txBody>
+      </p:sp>
+      <p:sp>
+        <p:nvSpPr>
+          <p:cNvPr id="11" name="Rectangle 10">
+            <a:extLst>
+              <a:ext uri="{FF2B5EF4-FFF2-40B4-BE49-F238E27FC236}">
+                <a16:creationId xmlns:a16="http://schemas.microsoft.com/office/drawing/2014/main" id="{B4F5FA0D-0104-4987-8241-EFF7C85B88DE}"/>
+              </a:ext>
+              <a:ext uri="{C183D7F6-B498-43B3-948B-1728B52AA6E4}">
+                <adec:decorative xmlns:adec="http://schemas.microsoft.com/office/drawing/2017/decorative" val="1"/>
+              </a:ext>
+            </a:extLst>
+          </p:cNvPr>
+          <p:cNvSpPr>
+            <a:spLocks noGrp="1" noRot="1" noChangeAspect="1" noMove="1" noResize="1" noEditPoints="1" noAdjustHandles="1" noChangeArrowheads="1" noChangeShapeType="1" noTextEdit="1"/>
+          </p:cNvSpPr>
+          <p:nvPr>
+            <p:extLst>
+              <p:ext uri="{386F3935-93C4-4BCD-93E2-E3B085C9AB24}">
+                <p16:designElem xmlns:p16="http://schemas.microsoft.com/office/powerpoint/2015/main" val="1"/>
+              </p:ext>
+            </p:extLst>
+          </p:nvPr>
+        </p:nvSpPr>
+        <p:spPr>
+          <a:xfrm>
+            <a:off x="1" y="0"/>
+            <a:ext cx="12191998" cy="6858000"/>
+          </a:xfrm>
+          <a:prstGeom prst="rect">
+            <a:avLst/>
+          </a:prstGeom>
+          <a:gradFill>
+            <a:gsLst>
+              <a:gs pos="0">
+                <a:schemeClr val="accent1"/>
+              </a:gs>
+              <a:gs pos="25000">
+                <a:schemeClr val="accent1"/>
+              </a:gs>
+              <a:gs pos="94000">
+                <a:schemeClr val="accent5"/>
+              </a:gs>
+              <a:gs pos="100000">
+                <a:schemeClr val="accent5"/>
+              </a:gs>
+            </a:gsLst>
+            <a:lin ang="4200000" scaled="0"/>
+          </a:gradFill>
+          <a:ln>
+            <a:noFill/>
+          </a:ln>
+        </p:spPr>
+        <p:style>
+          <a:lnRef idx="2">
+            <a:schemeClr val="accent1">
+              <a:shade val="50000"/>
+            </a:schemeClr>
+          </a:lnRef>
+          <a:fillRef idx="1">
+            <a:schemeClr val="accent1"/>
+          </a:fillRef>
+          <a:effectRef idx="0">
+            <a:schemeClr val="accent1"/>
+          </a:effectRef>
+          <a:fontRef idx="minor">
+            <a:schemeClr val="lt1"/>
+          </a:fontRef>
+        </p:style>
+        <p:txBody>
+          <a:bodyPr rtlCol="0" anchor="ctr"/>
+          <a:lstStyle/>
+          <a:p>
+            <a:pPr algn="ctr"/>
+            <a:endParaRPr lang="en-US"/>
+          </a:p>
+        </p:txBody>
+      </p:sp>
+      <p:pic>
+        <p:nvPicPr>
+          <p:cNvPr id="13" name="Picture 12">
+            <a:extLst>
+              <a:ext uri="{FF2B5EF4-FFF2-40B4-BE49-F238E27FC236}">
+                <a16:creationId xmlns:a16="http://schemas.microsoft.com/office/drawing/2014/main" id="{2897127E-6CEF-446C-BE87-93B7C46E49D1}"/>
+              </a:ext>
+              <a:ext uri="{C183D7F6-B498-43B3-948B-1728B52AA6E4}">
+                <adec:decorative xmlns:adec="http://schemas.microsoft.com/office/drawing/2017/decorative" val="1"/>
+              </a:ext>
+            </a:extLst>
+          </p:cNvPr>
+          <p:cNvPicPr>
+            <a:picLocks noGrp="1" noRot="1" noChangeAspect="1" noMove="1" noResize="1" noEditPoints="1" noAdjustHandles="1" noChangeArrowheads="1" noChangeShapeType="1" noCrop="1"/>
+          </p:cNvPicPr>
+          <p:nvPr>
+            <p:extLst>
+              <p:ext uri="{386F3935-93C4-4BCD-93E2-E3B085C9AB24}">
+                <p16:designElem xmlns:p16="http://schemas.microsoft.com/office/powerpoint/2015/main" val="1"/>
+              </p:ext>
+            </p:extLst>
+          </p:nvPr>
+        </p:nvPicPr>
+        <p:blipFill>
+          <a:blip r:embed="rId2">
+            <a:extLst>
+              <a:ext uri="{28A0092B-C50C-407E-A947-70E740481C1C}">
+                <a14:useLocalDpi xmlns:a14="http://schemas.microsoft.com/office/drawing/2010/main" val="0"/>
+              </a:ext>
+            </a:extLst>
+          </a:blip>
+          <a:stretch>
+            <a:fillRect/>
+          </a:stretch>
+        </p:blipFill>
+        <p:spPr>
+          <a:xfrm>
+            <a:off x="0" y="0"/>
+            <a:ext cx="12192000" cy="6858000"/>
+          </a:xfrm>
+          <a:prstGeom prst="rect">
+            <a:avLst/>
+          </a:prstGeom>
+        </p:spPr>
+      </p:pic>
+      <p:sp>
+        <p:nvSpPr>
+          <p:cNvPr id="2" name="Title 1">
+            <a:extLst>
+              <a:ext uri="{FF2B5EF4-FFF2-40B4-BE49-F238E27FC236}">
+                <a16:creationId xmlns:a16="http://schemas.microsoft.com/office/drawing/2014/main" id="{004F2053-AB8D-479A-866D-0DF818ABCE55}"/>
+              </a:ext>
+            </a:extLst>
+          </p:cNvPr>
+          <p:cNvSpPr>
+            <a:spLocks noGrp="1"/>
+          </p:cNvSpPr>
+          <p:nvPr>
+            <p:ph type="title"/>
+          </p:nvPr>
+        </p:nvSpPr>
+        <p:spPr>
+          <a:xfrm>
+            <a:off x="488539" y="1186249"/>
+            <a:ext cx="3669161" cy="4399005"/>
+          </a:xfrm>
+        </p:spPr>
+        <p:txBody>
+          <a:bodyPr vert="horz" lIns="91440" tIns="45720" rIns="91440" bIns="45720" rtlCol="0" anchor="ctr">
+            <a:normAutofit/>
+          </a:bodyPr>
+          <a:lstStyle/>
+          <a:p>
+            <a:pPr algn="ctr"/>
+            <a:r>
+              <a:rPr lang="en-US" sz="3200" b="1" dirty="0">
+                <a:solidFill>
+                  <a:schemeClr val="bg1"/>
+                </a:solidFill>
+                <a:effectLst/>
+                <a:latin typeface="+mj-lt"/>
+                <a:ea typeface="Calibri" panose="020F0502020204030204" pitchFamily="34" charset="0"/>
+                <a:cs typeface="Calibri" panose="020F0502020204030204" pitchFamily="34" charset="0"/>
+              </a:rPr>
+              <a:t>Model predictions for various proposals to increase revenue</a:t>
+            </a:r>
+          </a:p>
+        </p:txBody>
+      </p:sp>
+      <p:sp>
+        <p:nvSpPr>
+          <p:cNvPr id="7" name="TextBox 6">
+            <a:extLst>
+              <a:ext uri="{FF2B5EF4-FFF2-40B4-BE49-F238E27FC236}">
+                <a16:creationId xmlns:a16="http://schemas.microsoft.com/office/drawing/2014/main" id="{8383B45B-192B-4664-AE39-16094C0B8358}"/>
               </a:ext>
             </a:extLst>
           </p:cNvPr>
@@ -6500,8 +7703,8 @@
         </p:nvSpPr>
         <p:spPr>
           <a:xfrm>
-            <a:off x="363255" y="300625"/>
-            <a:ext cx="11386159" cy="5742662"/>
+            <a:off x="5897647" y="911676"/>
+            <a:ext cx="5805814" cy="5034648"/>
           </a:xfrm>
           <a:prstGeom prst="rect">
             <a:avLst/>
@@ -6513,31 +7716,6 @@
             <a:spAutoFit/>
           </a:bodyPr>
           <a:lstStyle/>
-          <a:p>
-            <a:pPr marR="0" lvl="0">
-              <a:lnSpc>
-                <a:spcPct val="107000"/>
-              </a:lnSpc>
-              <a:spcBef>
-                <a:spcPts val="0"/>
-              </a:spcBef>
-              <a:spcAft>
-                <a:spcPts val="0"/>
-              </a:spcAft>
-            </a:pPr>
-            <a:r>
-              <a:rPr lang="en-US" sz="2400" b="1" dirty="0">
-                <a:solidFill>
-                  <a:srgbClr val="0070C0"/>
-                </a:solidFill>
-                <a:effectLst/>
-                <a:latin typeface="Calibri" panose="020F0502020204030204" pitchFamily="34" charset="0"/>
-                <a:ea typeface="Calibri" panose="020F0502020204030204" pitchFamily="34" charset="0"/>
-                <a:cs typeface="Calibri" panose="020F0502020204030204" pitchFamily="34" charset="0"/>
-              </a:rPr>
-              <a:t>Model predictions for various proposals:</a:t>
-            </a:r>
-          </a:p>
           <a:p>
             <a:pPr marR="0" lvl="0">
               <a:lnSpc>
@@ -6568,8 +7746,8 @@
               <a:spcAft>
                 <a:spcPts val="0"/>
               </a:spcAft>
-              <a:buFont typeface="+mj-lt"/>
-              <a:buAutoNum type="arabicPeriod"/>
+              <a:buFont typeface="Arial" panose="020B0604020202020204" pitchFamily="34" charset="0"/>
+              <a:buChar char="•"/>
             </a:pPr>
             <a:r>
               <a:rPr lang="en-US" sz="1900" b="1" dirty="0">
@@ -6623,8 +7801,8 @@
               <a:spcAft>
                 <a:spcPts val="0"/>
               </a:spcAft>
-              <a:buFont typeface="+mj-lt"/>
-              <a:buAutoNum type="arabicPeriod"/>
+              <a:buFont typeface="Arial" panose="020B0604020202020204" pitchFamily="34" charset="0"/>
+              <a:buChar char="•"/>
             </a:pPr>
             <a:r>
               <a:rPr lang="en-US" sz="1900" b="1" dirty="0">
@@ -6650,16 +7828,8 @@
                 <a:ea typeface="Calibri" panose="020F0502020204030204" pitchFamily="34" charset="0"/>
                 <a:cs typeface="Calibri" panose="020F0502020204030204" pitchFamily="34" charset="0"/>
               </a:rPr>
-              <a:t>In this scenario, Big Mountain is adding a run, increasing the vertical drop by 150 feet, and installing an additional chair lift. This scenario increases support for ticket price by $1.99 and over the season this could be expected to amount to $3474638.</a:t>
-            </a:r>
-            <a:br>
-              <a:rPr lang="en-US" sz="1900" dirty="0">
-                <a:effectLst/>
-                <a:latin typeface="+mj-lt"/>
-                <a:ea typeface="Calibri" panose="020F0502020204030204" pitchFamily="34" charset="0"/>
-                <a:cs typeface="Calibri" panose="020F0502020204030204" pitchFamily="34" charset="0"/>
-              </a:rPr>
-            </a:br>
+              <a:t>In this scenario, Big Mountain is adding a run, increasing the vertical drop by 150 feet, and installing an additional chair lift. This scenario increases support for ticket price by $1.99 and over the season this could be expected to amount to $3,474,638.</a:t>
+            </a:r>
             <a:endParaRPr lang="en-US" sz="1900" dirty="0">
               <a:effectLst/>
               <a:latin typeface="+mj-lt"/>
@@ -6667,123 +7837,41 @@
               <a:cs typeface="Times New Roman" panose="02020603050405020304" pitchFamily="18" charset="0"/>
             </a:endParaRPr>
           </a:p>
-          <a:p>
-            <a:pPr marL="342900" marR="0" lvl="0" indent="-342900">
-              <a:lnSpc>
-                <a:spcPct val="107000"/>
-              </a:lnSpc>
-              <a:spcBef>
-                <a:spcPts val="0"/>
-              </a:spcBef>
-              <a:spcAft>
-                <a:spcPts val="0"/>
-              </a:spcAft>
-              <a:buFont typeface="+mj-lt"/>
-              <a:buAutoNum type="arabicPeriod"/>
-            </a:pPr>
-            <a:r>
-              <a:rPr lang="en-US" sz="1900" b="1" dirty="0">
-                <a:effectLst/>
-                <a:latin typeface="+mj-lt"/>
-                <a:ea typeface="Calibri" panose="020F0502020204030204" pitchFamily="34" charset="0"/>
-                <a:cs typeface="Calibri" panose="020F0502020204030204" pitchFamily="34" charset="0"/>
-              </a:rPr>
-              <a:t>Increase vertical drop by 150 feet and install an additional chair lift and add 2 acres of snow making capability. </a:t>
-            </a:r>
-            <a:br>
-              <a:rPr lang="en-US" sz="1900" b="1" dirty="0">
-                <a:effectLst/>
-                <a:latin typeface="+mj-lt"/>
-                <a:ea typeface="Calibri" panose="020F0502020204030204" pitchFamily="34" charset="0"/>
-                <a:cs typeface="Calibri" panose="020F0502020204030204" pitchFamily="34" charset="0"/>
-              </a:rPr>
-            </a:br>
-            <a:r>
-              <a:rPr lang="en-US" sz="1900" dirty="0">
-                <a:effectLst/>
-                <a:latin typeface="+mj-lt"/>
-                <a:ea typeface="Calibri" panose="020F0502020204030204" pitchFamily="34" charset="0"/>
-                <a:cs typeface="Calibri" panose="020F0502020204030204" pitchFamily="34" charset="0"/>
-              </a:rPr>
-              <a:t>This scenario increases support for ticket price by $1.99 and over the season this could be expected to amount to $3474638. This is similar to scenario 2 so there is no effect of adding extra 2 acres of snow making capability.</a:t>
-            </a:r>
-            <a:br>
-              <a:rPr lang="en-US" sz="1900" dirty="0">
-                <a:effectLst/>
-                <a:latin typeface="+mj-lt"/>
-                <a:ea typeface="Calibri" panose="020F0502020204030204" pitchFamily="34" charset="0"/>
-                <a:cs typeface="Calibri" panose="020F0502020204030204" pitchFamily="34" charset="0"/>
-              </a:rPr>
-            </a:br>
-            <a:endParaRPr lang="en-US" sz="1900" dirty="0">
-              <a:effectLst/>
-              <a:latin typeface="+mj-lt"/>
-              <a:ea typeface="Calibri" panose="020F0502020204030204" pitchFamily="34" charset="0"/>
-              <a:cs typeface="Times New Roman" panose="02020603050405020304" pitchFamily="18" charset="0"/>
-            </a:endParaRPr>
-          </a:p>
-          <a:p>
-            <a:pPr marL="342900" marR="0" lvl="0" indent="-342900">
-              <a:lnSpc>
-                <a:spcPct val="107000"/>
-              </a:lnSpc>
-              <a:spcBef>
-                <a:spcPts val="0"/>
-              </a:spcBef>
-              <a:spcAft>
-                <a:spcPts val="800"/>
-              </a:spcAft>
-              <a:buFont typeface="+mj-lt"/>
-              <a:buAutoNum type="arabicPeriod"/>
-            </a:pPr>
-            <a:r>
-              <a:rPr lang="en-US" sz="1900" b="1" dirty="0">
-                <a:effectLst/>
-                <a:latin typeface="+mj-lt"/>
-                <a:ea typeface="Calibri" panose="020F0502020204030204" pitchFamily="34" charset="0"/>
-                <a:cs typeface="Calibri" panose="020F0502020204030204" pitchFamily="34" charset="0"/>
-              </a:rPr>
-              <a:t>Increase longest run by 0.2 miles and guaranteeing its snow coverage by adding 4 acres of snow making capability.</a:t>
-            </a:r>
-            <a:r>
-              <a:rPr lang="en-US" sz="1900" dirty="0">
-                <a:effectLst/>
-                <a:latin typeface="+mj-lt"/>
-                <a:ea typeface="Calibri" panose="020F0502020204030204" pitchFamily="34" charset="0"/>
-                <a:cs typeface="Calibri" panose="020F0502020204030204" pitchFamily="34" charset="0"/>
-              </a:rPr>
-              <a:t> </a:t>
-            </a:r>
-            <a:br>
-              <a:rPr lang="en-US" sz="1900" dirty="0">
-                <a:effectLst/>
-                <a:latin typeface="+mj-lt"/>
-                <a:ea typeface="Calibri" panose="020F0502020204030204" pitchFamily="34" charset="0"/>
-                <a:cs typeface="Calibri" panose="020F0502020204030204" pitchFamily="34" charset="0"/>
-              </a:rPr>
-            </a:br>
-            <a:r>
-              <a:rPr lang="en-US" sz="1900" dirty="0">
-                <a:effectLst/>
-                <a:latin typeface="+mj-lt"/>
-                <a:ea typeface="Calibri" panose="020F0502020204030204" pitchFamily="34" charset="0"/>
-                <a:cs typeface="Calibri" panose="020F0502020204030204" pitchFamily="34" charset="0"/>
-              </a:rPr>
-              <a:t>This scenario does not support any increase in ticket price.</a:t>
-            </a:r>
-            <a:endParaRPr lang="en-US" sz="1900" dirty="0">
-              <a:effectLst/>
-              <a:latin typeface="+mj-lt"/>
-              <a:ea typeface="Calibri" panose="020F0502020204030204" pitchFamily="34" charset="0"/>
-              <a:cs typeface="Times New Roman" panose="02020603050405020304" pitchFamily="18" charset="0"/>
-            </a:endParaRPr>
+        </p:txBody>
+      </p:sp>
+      <p:sp>
+        <p:nvSpPr>
+          <p:cNvPr id="3" name="Slide Number Placeholder 2">
+            <a:extLst>
+              <a:ext uri="{FF2B5EF4-FFF2-40B4-BE49-F238E27FC236}">
+                <a16:creationId xmlns:a16="http://schemas.microsoft.com/office/drawing/2014/main" id="{E11B0C12-5E4A-4100-9FB2-BB083AAB2350}"/>
+              </a:ext>
+            </a:extLst>
+          </p:cNvPr>
+          <p:cNvSpPr>
+            <a:spLocks noGrp="1"/>
+          </p:cNvSpPr>
+          <p:nvPr>
+            <p:ph type="sldNum" sz="quarter" idx="12"/>
+          </p:nvPr>
+        </p:nvSpPr>
+        <p:spPr/>
+        <p:txBody>
+          <a:bodyPr/>
+          <a:lstStyle/>
+          <a:p>
+            <a:fld id="{144EF1FE-37A2-4E8F-9397-BF5241D9507E}" type="slidenum">
+              <a:rPr lang="en-US" smtClean="0"/>
+              <a:t>7</a:t>
+            </a:fld>
+            <a:endParaRPr lang="en-US"/>
           </a:p>
         </p:txBody>
       </p:sp>
     </p:spTree>
     <p:extLst>
       <p:ext uri="{BB962C8B-B14F-4D97-AF65-F5344CB8AC3E}">
-        <p14:creationId xmlns:p14="http://schemas.microsoft.com/office/powerpoint/2010/main" val="565353852"/>
+        <p14:creationId xmlns:p14="http://schemas.microsoft.com/office/powerpoint/2010/main" val="3319809471"/>
       </p:ext>
     </p:extLst>
   </p:cSld>
@@ -6818,12 +7906,12 @@
           <a:chExt cx="0" cy="0"/>
         </a:xfrm>
       </p:grpSpPr>
-      <p:sp>
-        <p:nvSpPr>
-          <p:cNvPr id="23" name="Rectangle 17">
-            <a:extLst>
-              <a:ext uri="{FF2B5EF4-FFF2-40B4-BE49-F238E27FC236}">
-                <a16:creationId xmlns:a16="http://schemas.microsoft.com/office/drawing/2014/main" id="{AFA67CD3-AB4E-4A7A-BEB8-53C445D8C44E}"/>
+      <p:sp useBgFill="1">
+        <p:nvSpPr>
+          <p:cNvPr id="9" name="Rectangle 8">
+            <a:extLst>
+              <a:ext uri="{FF2B5EF4-FFF2-40B4-BE49-F238E27FC236}">
+                <a16:creationId xmlns:a16="http://schemas.microsoft.com/office/drawing/2014/main" id="{3B854194-185D-494D-905C-7C7CB2E30F6E}"/>
               </a:ext>
               <a:ext uri="{C183D7F6-B498-43B3-948B-1728B52AA6E4}">
                 <adec:decorative xmlns:adec="http://schemas.microsoft.com/office/drawing/2017/decorative" val="1"/>
@@ -6843,8 +7931,68 @@
         </p:nvSpPr>
         <p:spPr>
           <a:xfrm>
-            <a:off x="1" y="3726"/>
-            <a:ext cx="5614875" cy="6858000"/>
+            <a:off x="1" y="0"/>
+            <a:ext cx="6082110" cy="6858000"/>
+          </a:xfrm>
+          <a:prstGeom prst="rect">
+            <a:avLst/>
+          </a:prstGeom>
+          <a:ln>
+            <a:noFill/>
+          </a:ln>
+        </p:spPr>
+        <p:style>
+          <a:lnRef idx="2">
+            <a:schemeClr val="accent1">
+              <a:shade val="50000"/>
+            </a:schemeClr>
+          </a:lnRef>
+          <a:fillRef idx="1">
+            <a:schemeClr val="accent1"/>
+          </a:fillRef>
+          <a:effectRef idx="0">
+            <a:schemeClr val="accent1"/>
+          </a:effectRef>
+          <a:fontRef idx="minor">
+            <a:schemeClr val="lt1"/>
+          </a:fontRef>
+        </p:style>
+        <p:txBody>
+          <a:bodyPr rtlCol="0" anchor="ctr"/>
+          <a:lstStyle/>
+          <a:p>
+            <a:pPr algn="ctr"/>
+            <a:endParaRPr lang="en-US"/>
+          </a:p>
+        </p:txBody>
+      </p:sp>
+      <p:sp>
+        <p:nvSpPr>
+          <p:cNvPr id="11" name="Rectangle 10">
+            <a:extLst>
+              <a:ext uri="{FF2B5EF4-FFF2-40B4-BE49-F238E27FC236}">
+                <a16:creationId xmlns:a16="http://schemas.microsoft.com/office/drawing/2014/main" id="{B4F5FA0D-0104-4987-8241-EFF7C85B88DE}"/>
+              </a:ext>
+              <a:ext uri="{C183D7F6-B498-43B3-948B-1728B52AA6E4}">
+                <adec:decorative xmlns:adec="http://schemas.microsoft.com/office/drawing/2017/decorative" val="1"/>
+              </a:ext>
+            </a:extLst>
+          </p:cNvPr>
+          <p:cNvSpPr>
+            <a:spLocks noGrp="1" noRot="1" noChangeAspect="1" noMove="1" noResize="1" noEditPoints="1" noAdjustHandles="1" noChangeArrowheads="1" noChangeShapeType="1" noTextEdit="1"/>
+          </p:cNvSpPr>
+          <p:nvPr>
+            <p:extLst>
+              <p:ext uri="{386F3935-93C4-4BCD-93E2-E3B085C9AB24}">
+                <p16:designElem xmlns:p16="http://schemas.microsoft.com/office/powerpoint/2015/main" val="1"/>
+              </p:ext>
+            </p:extLst>
+          </p:nvPr>
+        </p:nvSpPr>
+        <p:spPr>
+          <a:xfrm>
+            <a:off x="1" y="0"/>
+            <a:ext cx="12191998" cy="6858000"/>
           </a:xfrm>
           <a:prstGeom prst="rect">
             <a:avLst/>
@@ -6852,25 +8000,16 @@
           <a:gradFill>
             <a:gsLst>
               <a:gs pos="0">
-                <a:schemeClr val="accent1">
-                  <a:lumMod val="100000"/>
-                  <a:alpha val="82000"/>
-                </a:schemeClr>
+                <a:schemeClr val="accent1"/>
               </a:gs>
               <a:gs pos="25000">
-                <a:schemeClr val="accent1">
-                  <a:alpha val="60000"/>
-                </a:schemeClr>
+                <a:schemeClr val="accent1"/>
               </a:gs>
               <a:gs pos="94000">
-                <a:schemeClr val="bg2">
-                  <a:lumMod val="75000"/>
-                </a:schemeClr>
+                <a:schemeClr val="accent5"/>
               </a:gs>
               <a:gs pos="100000">
-                <a:schemeClr val="bg2">
-                  <a:lumMod val="75000"/>
-                </a:schemeClr>
+                <a:schemeClr val="accent5"/>
               </a:gs>
             </a:gsLst>
             <a:lin ang="4200000" scaled="0"/>
@@ -6906,10 +8045,10 @@
       </p:sp>
       <p:pic>
         <p:nvPicPr>
-          <p:cNvPr id="24" name="Picture 19">
-            <a:extLst>
-              <a:ext uri="{FF2B5EF4-FFF2-40B4-BE49-F238E27FC236}">
-                <a16:creationId xmlns:a16="http://schemas.microsoft.com/office/drawing/2014/main" id="{07CF545F-9C2E-4446-97CD-AD92990C2B68}"/>
+          <p:cNvPr id="13" name="Picture 12">
+            <a:extLst>
+              <a:ext uri="{FF2B5EF4-FFF2-40B4-BE49-F238E27FC236}">
+                <a16:creationId xmlns:a16="http://schemas.microsoft.com/office/drawing/2014/main" id="{2897127E-6CEF-446C-BE87-93B7C46E49D1}"/>
               </a:ext>
               <a:ext uri="{C183D7F6-B498-43B3-948B-1728B52AA6E4}">
                 <adec:decorative xmlns:adec="http://schemas.microsoft.com/office/drawing/2017/decorative" val="1"/>
@@ -6951,10 +8090,54 @@
       </p:pic>
       <p:sp>
         <p:nvSpPr>
+          <p:cNvPr id="2" name="Title 1">
+            <a:extLst>
+              <a:ext uri="{FF2B5EF4-FFF2-40B4-BE49-F238E27FC236}">
+                <a16:creationId xmlns:a16="http://schemas.microsoft.com/office/drawing/2014/main" id="{004F2053-AB8D-479A-866D-0DF818ABCE55}"/>
+              </a:ext>
+            </a:extLst>
+          </p:cNvPr>
+          <p:cNvSpPr>
+            <a:spLocks noGrp="1"/>
+          </p:cNvSpPr>
+          <p:nvPr>
+            <p:ph type="title"/>
+          </p:nvPr>
+        </p:nvSpPr>
+        <p:spPr>
+          <a:xfrm>
+            <a:off x="488539" y="1186249"/>
+            <a:ext cx="3669161" cy="4399005"/>
+          </a:xfrm>
+        </p:spPr>
+        <p:txBody>
+          <a:bodyPr vert="horz" lIns="91440" tIns="45720" rIns="91440" bIns="45720" rtlCol="0" anchor="ctr">
+            <a:normAutofit/>
+          </a:bodyPr>
+          <a:lstStyle/>
+          <a:p>
+            <a:pPr algn="ctr"/>
+            <a:r>
+              <a:rPr lang="en-US" sz="3200" b="1" dirty="0">
+                <a:solidFill>
+                  <a:schemeClr val="bg1"/>
+                </a:solidFill>
+                <a:effectLst/>
+                <a:latin typeface="+mj-lt"/>
+                <a:ea typeface="Calibri" panose="020F0502020204030204" pitchFamily="34" charset="0"/>
+                <a:cs typeface="Calibri" panose="020F0502020204030204" pitchFamily="34" charset="0"/>
+              </a:rPr>
+              <a:t>Model predictions for various proposals to increase revenue</a:t>
+            </a:r>
+          </a:p>
+        </p:txBody>
+      </p:sp>
+      <p:sp>
+        <p:nvSpPr>
           <p:cNvPr id="7" name="TextBox 6">
             <a:extLst>
               <a:ext uri="{FF2B5EF4-FFF2-40B4-BE49-F238E27FC236}">
-                <a16:creationId xmlns:a16="http://schemas.microsoft.com/office/drawing/2014/main" id="{7DCEA9AB-DCF5-4BE9-B6AD-2916098A0896}"/>
+                <a16:creationId xmlns:a16="http://schemas.microsoft.com/office/drawing/2014/main" id="{8383B45B-192B-4664-AE39-16094C0B8358}"/>
               </a:ext>
             </a:extLst>
           </p:cNvPr>
@@ -6963,59 +8146,224 @@
         </p:nvSpPr>
         <p:spPr>
           <a:xfrm>
-            <a:off x="6094105" y="802955"/>
-            <a:ext cx="4977976" cy="1454051"/>
+            <a:off x="5897647" y="1068097"/>
+            <a:ext cx="5805814" cy="4721805"/>
           </a:xfrm>
           <a:prstGeom prst="rect">
             <a:avLst/>
           </a:prstGeom>
+          <a:noFill/>
         </p:spPr>
         <p:txBody>
-          <a:bodyPr vert="horz" lIns="91440" tIns="45720" rIns="91440" bIns="45720" rtlCol="0" anchor="ctr">
-            <a:normAutofit/>
+          <a:bodyPr wrap="square">
+            <a:spAutoFit/>
           </a:bodyPr>
           <a:lstStyle/>
           <a:p>
-            <a:pPr>
+            <a:pPr marR="0" lvl="0">
               <a:lnSpc>
-                <a:spcPct val="90000"/>
+                <a:spcPct val="107000"/>
               </a:lnSpc>
               <a:spcBef>
-                <a:spcPct val="0"/>
+                <a:spcPts val="0"/>
               </a:spcBef>
               <a:spcAft>
-                <a:spcPts val="600"/>
+                <a:spcPts val="0"/>
               </a:spcAft>
             </a:pPr>
-            <a:r>
-              <a:rPr lang="en-US" sz="4400" b="1" i="0" kern="1200">
-                <a:solidFill>
-                  <a:srgbClr val="000000"/>
-                </a:solidFill>
+            <a:endParaRPr lang="en-US" sz="1600" b="1" dirty="0">
+              <a:effectLst/>
+              <a:latin typeface="Calibri" panose="020F0502020204030204" pitchFamily="34" charset="0"/>
+              <a:ea typeface="Calibri" panose="020F0502020204030204" pitchFamily="34" charset="0"/>
+              <a:cs typeface="Calibri" panose="020F0502020204030204" pitchFamily="34" charset="0"/>
+            </a:endParaRPr>
+          </a:p>
+          <a:p>
+            <a:pPr marL="342900" marR="0" lvl="0" indent="-342900">
+              <a:lnSpc>
+                <a:spcPct val="107000"/>
+              </a:lnSpc>
+              <a:spcBef>
+                <a:spcPts val="0"/>
+              </a:spcBef>
+              <a:spcAft>
+                <a:spcPts val="0"/>
+              </a:spcAft>
+              <a:buFont typeface="Arial" panose="020B0604020202020204" pitchFamily="34" charset="0"/>
+              <a:buChar char="•"/>
+            </a:pPr>
+            <a:r>
+              <a:rPr lang="en-US" sz="1900" b="1" dirty="0">
                 <a:effectLst/>
                 <a:latin typeface="+mj-lt"/>
-                <a:ea typeface="+mj-ea"/>
-                <a:cs typeface="+mj-cs"/>
+                <a:ea typeface="Calibri" panose="020F0502020204030204" pitchFamily="34" charset="0"/>
+                <a:cs typeface="Calibri" panose="020F0502020204030204" pitchFamily="34" charset="0"/>
               </a:rPr>
-              <a:t>Summary</a:t>
-            </a:r>
-            <a:endParaRPr lang="en-US" sz="4400" b="1" kern="1200">
-              <a:solidFill>
-                <a:srgbClr val="000000"/>
-              </a:solidFill>
+              <a:t>Increase vertical drop by 150 feet and install an additional chair lift and add 2 acres of snow making capability. </a:t>
+            </a:r>
+            <a:br>
+              <a:rPr lang="en-US" sz="1900" b="1" dirty="0">
+                <a:effectLst/>
+                <a:latin typeface="+mj-lt"/>
+                <a:ea typeface="Calibri" panose="020F0502020204030204" pitchFamily="34" charset="0"/>
+                <a:cs typeface="Calibri" panose="020F0502020204030204" pitchFamily="34" charset="0"/>
+              </a:rPr>
+            </a:br>
+            <a:r>
+              <a:rPr lang="en-US" sz="1900" dirty="0">
+                <a:effectLst/>
+                <a:latin typeface="+mj-lt"/>
+                <a:ea typeface="Calibri" panose="020F0502020204030204" pitchFamily="34" charset="0"/>
+                <a:cs typeface="Calibri" panose="020F0502020204030204" pitchFamily="34" charset="0"/>
+              </a:rPr>
+              <a:t>This scenario increases support for ticket price by $1.99 and over the season this could be expected to amount to $3,474,638. This is similar to scenario 2 so there is no effect of adding extra 2 acres of snow making capability.</a:t>
+            </a:r>
+            <a:br>
+              <a:rPr lang="en-US" sz="1900" dirty="0">
+                <a:effectLst/>
+                <a:latin typeface="+mj-lt"/>
+                <a:ea typeface="Calibri" panose="020F0502020204030204" pitchFamily="34" charset="0"/>
+                <a:cs typeface="Calibri" panose="020F0502020204030204" pitchFamily="34" charset="0"/>
+              </a:rPr>
+            </a:br>
+            <a:endParaRPr lang="en-US" sz="1900" dirty="0">
+              <a:effectLst/>
               <a:latin typeface="+mj-lt"/>
-              <a:ea typeface="+mj-ea"/>
-              <a:cs typeface="+mj-cs"/>
+              <a:ea typeface="Calibri" panose="020F0502020204030204" pitchFamily="34" charset="0"/>
+              <a:cs typeface="Times New Roman" panose="02020603050405020304" pitchFamily="18" charset="0"/>
             </a:endParaRPr>
           </a:p>
-        </p:txBody>
-      </p:sp>
-      <p:sp>
-        <p:nvSpPr>
-          <p:cNvPr id="22" name="Freeform 62">
-            <a:extLst>
-              <a:ext uri="{FF2B5EF4-FFF2-40B4-BE49-F238E27FC236}">
-                <a16:creationId xmlns:a16="http://schemas.microsoft.com/office/drawing/2014/main" id="{339C8D78-A644-462F-B674-F440635E5353}"/>
+          <a:p>
+            <a:pPr marL="342900" marR="0" lvl="0" indent="-342900">
+              <a:lnSpc>
+                <a:spcPct val="107000"/>
+              </a:lnSpc>
+              <a:spcBef>
+                <a:spcPts val="0"/>
+              </a:spcBef>
+              <a:spcAft>
+                <a:spcPts val="800"/>
+              </a:spcAft>
+              <a:buFont typeface="Arial" panose="020B0604020202020204" pitchFamily="34" charset="0"/>
+              <a:buChar char="•"/>
+            </a:pPr>
+            <a:r>
+              <a:rPr lang="en-US" sz="1900" b="1" dirty="0">
+                <a:effectLst/>
+                <a:latin typeface="+mj-lt"/>
+                <a:ea typeface="Calibri" panose="020F0502020204030204" pitchFamily="34" charset="0"/>
+                <a:cs typeface="Calibri" panose="020F0502020204030204" pitchFamily="34" charset="0"/>
+              </a:rPr>
+              <a:t>Increase longest run by 0.2 miles and guaranteeing its snow coverage by adding 4 acres of snow making capability.</a:t>
+            </a:r>
+            <a:r>
+              <a:rPr lang="en-US" sz="1900" dirty="0">
+                <a:effectLst/>
+                <a:latin typeface="+mj-lt"/>
+                <a:ea typeface="Calibri" panose="020F0502020204030204" pitchFamily="34" charset="0"/>
+                <a:cs typeface="Calibri" panose="020F0502020204030204" pitchFamily="34" charset="0"/>
+              </a:rPr>
+              <a:t> </a:t>
+            </a:r>
+            <a:br>
+              <a:rPr lang="en-US" sz="1900" dirty="0">
+                <a:effectLst/>
+                <a:latin typeface="+mj-lt"/>
+                <a:ea typeface="Calibri" panose="020F0502020204030204" pitchFamily="34" charset="0"/>
+                <a:cs typeface="Calibri" panose="020F0502020204030204" pitchFamily="34" charset="0"/>
+              </a:rPr>
+            </a:br>
+            <a:r>
+              <a:rPr lang="en-US" sz="1900" dirty="0">
+                <a:effectLst/>
+                <a:latin typeface="+mj-lt"/>
+                <a:ea typeface="Calibri" panose="020F0502020204030204" pitchFamily="34" charset="0"/>
+                <a:cs typeface="Calibri" panose="020F0502020204030204" pitchFamily="34" charset="0"/>
+              </a:rPr>
+              <a:t>This scenario does not support any increase in ticket price.</a:t>
+            </a:r>
+            <a:endParaRPr lang="en-US" sz="1900" dirty="0">
+              <a:effectLst/>
+              <a:latin typeface="+mj-lt"/>
+              <a:ea typeface="Calibri" panose="020F0502020204030204" pitchFamily="34" charset="0"/>
+              <a:cs typeface="Times New Roman" panose="02020603050405020304" pitchFamily="18" charset="0"/>
+            </a:endParaRPr>
+          </a:p>
+        </p:txBody>
+      </p:sp>
+      <p:sp>
+        <p:nvSpPr>
+          <p:cNvPr id="3" name="Slide Number Placeholder 2">
+            <a:extLst>
+              <a:ext uri="{FF2B5EF4-FFF2-40B4-BE49-F238E27FC236}">
+                <a16:creationId xmlns:a16="http://schemas.microsoft.com/office/drawing/2014/main" id="{0F899AF7-4AA3-4825-B2FC-C73F466F2831}"/>
+              </a:ext>
+            </a:extLst>
+          </p:cNvPr>
+          <p:cNvSpPr>
+            <a:spLocks noGrp="1"/>
+          </p:cNvSpPr>
+          <p:nvPr>
+            <p:ph type="sldNum" sz="quarter" idx="12"/>
+          </p:nvPr>
+        </p:nvSpPr>
+        <p:spPr/>
+        <p:txBody>
+          <a:bodyPr/>
+          <a:lstStyle/>
+          <a:p>
+            <a:fld id="{144EF1FE-37A2-4E8F-9397-BF5241D9507E}" type="slidenum">
+              <a:rPr lang="en-US" smtClean="0"/>
+              <a:t>8</a:t>
+            </a:fld>
+            <a:endParaRPr lang="en-US"/>
+          </a:p>
+        </p:txBody>
+      </p:sp>
+    </p:spTree>
+    <p:extLst>
+      <p:ext uri="{BB962C8B-B14F-4D97-AF65-F5344CB8AC3E}">
+        <p14:creationId xmlns:p14="http://schemas.microsoft.com/office/powerpoint/2010/main" val="2669200048"/>
+      </p:ext>
+    </p:extLst>
+  </p:cSld>
+  <p:clrMapOvr>
+    <a:masterClrMapping/>
+  </p:clrMapOvr>
+</p:sld>
+</file>
+
+<file path=ppt/slides/slide9.xml><?xml version="1.0" encoding="utf-8"?>
+<p:sld xmlns:a="http://schemas.openxmlformats.org/drawingml/2006/main" xmlns:r="http://schemas.openxmlformats.org/officeDocument/2006/relationships" xmlns:p="http://schemas.openxmlformats.org/presentationml/2006/main">
+  <p:cSld>
+    <p:bg>
+      <p:bgPr>
+        <a:solidFill>
+          <a:schemeClr val="bg1"/>
+        </a:solidFill>
+        <a:effectLst/>
+      </p:bgPr>
+    </p:bg>
+    <p:spTree>
+      <p:nvGrpSpPr>
+        <p:cNvPr id="1" name=""/>
+        <p:cNvGrpSpPr/>
+        <p:nvPr/>
+      </p:nvGrpSpPr>
+      <p:grpSpPr>
+        <a:xfrm>
+          <a:off x="0" y="0"/>
+          <a:ext cx="0" cy="0"/>
+          <a:chOff x="0" y="0"/>
+          <a:chExt cx="0" cy="0"/>
+        </a:xfrm>
+      </p:grpSpPr>
+      <p:sp useBgFill="1">
+        <p:nvSpPr>
+          <p:cNvPr id="9" name="Rectangle 8">
+            <a:extLst>
+              <a:ext uri="{FF2B5EF4-FFF2-40B4-BE49-F238E27FC236}">
+                <a16:creationId xmlns:a16="http://schemas.microsoft.com/office/drawing/2014/main" id="{3B854194-185D-494D-905C-7C7CB2E30F6E}"/>
               </a:ext>
               <a:ext uri="{C183D7F6-B498-43B3-948B-1728B52AA6E4}">
                 <adec:decorative xmlns:adec="http://schemas.microsoft.com/office/drawing/2017/decorative" val="1"/>
@@ -7035,126 +8383,14 @@
         </p:nvSpPr>
         <p:spPr>
           <a:xfrm>
-            <a:off x="0" y="738619"/>
-            <a:ext cx="5000438" cy="5400962"/>
+            <a:off x="1" y="0"/>
+            <a:ext cx="6082110" cy="6858000"/>
           </a:xfrm>
-          <a:custGeom>
+          <a:prstGeom prst="rect">
             <a:avLst/>
-            <a:gdLst>
-              <a:gd name="connsiteX0" fmla="*/ 2299956 w 5000438"/>
-              <a:gd name="connsiteY0" fmla="*/ 0 h 5400962"/>
-              <a:gd name="connsiteX1" fmla="*/ 5000438 w 5000438"/>
-              <a:gd name="connsiteY1" fmla="*/ 2700481 h 5400962"/>
-              <a:gd name="connsiteX2" fmla="*/ 2299956 w 5000438"/>
-              <a:gd name="connsiteY2" fmla="*/ 5400962 h 5400962"/>
-              <a:gd name="connsiteX3" fmla="*/ 60675 w 5000438"/>
-              <a:gd name="connsiteY3" fmla="*/ 4210346 h 5400962"/>
-              <a:gd name="connsiteX4" fmla="*/ 0 w 5000438"/>
-              <a:gd name="connsiteY4" fmla="*/ 4110472 h 5400962"/>
-              <a:gd name="connsiteX5" fmla="*/ 0 w 5000438"/>
-              <a:gd name="connsiteY5" fmla="*/ 1290491 h 5400962"/>
-              <a:gd name="connsiteX6" fmla="*/ 60675 w 5000438"/>
-              <a:gd name="connsiteY6" fmla="*/ 1190617 h 5400962"/>
-              <a:gd name="connsiteX7" fmla="*/ 2299956 w 5000438"/>
-              <a:gd name="connsiteY7" fmla="*/ 0 h 5400962"/>
-            </a:gdLst>
-            <a:ahLst/>
-            <a:cxnLst>
-              <a:cxn ang="0">
-                <a:pos x="connsiteX0" y="connsiteY0"/>
-              </a:cxn>
-              <a:cxn ang="0">
-                <a:pos x="connsiteX1" y="connsiteY1"/>
-              </a:cxn>
-              <a:cxn ang="0">
-                <a:pos x="connsiteX2" y="connsiteY2"/>
-              </a:cxn>
-              <a:cxn ang="0">
-                <a:pos x="connsiteX3" y="connsiteY3"/>
-              </a:cxn>
-              <a:cxn ang="0">
-                <a:pos x="connsiteX4" y="connsiteY4"/>
-              </a:cxn>
-              <a:cxn ang="0">
-                <a:pos x="connsiteX5" y="connsiteY5"/>
-              </a:cxn>
-              <a:cxn ang="0">
-                <a:pos x="connsiteX6" y="connsiteY6"/>
-              </a:cxn>
-              <a:cxn ang="0">
-                <a:pos x="connsiteX7" y="connsiteY7"/>
-              </a:cxn>
-            </a:cxnLst>
-            <a:rect l="l" t="t" r="r" b="b"/>
-            <a:pathLst>
-              <a:path w="5000438" h="5400962">
-                <a:moveTo>
-                  <a:pt x="2299956" y="0"/>
-                </a:moveTo>
-                <a:cubicBezTo>
-                  <a:pt x="3791390" y="0"/>
-                  <a:pt x="5000438" y="1209047"/>
-                  <a:pt x="5000438" y="2700481"/>
-                </a:cubicBezTo>
-                <a:cubicBezTo>
-                  <a:pt x="5000438" y="4191915"/>
-                  <a:pt x="3791390" y="5400962"/>
-                  <a:pt x="2299956" y="5400962"/>
-                </a:cubicBezTo>
-                <a:cubicBezTo>
-                  <a:pt x="1367810" y="5400962"/>
-                  <a:pt x="545971" y="4928678"/>
-                  <a:pt x="60675" y="4210346"/>
-                </a:cubicBezTo>
-                <a:lnTo>
-                  <a:pt x="0" y="4110472"/>
-                </a:lnTo>
-                <a:lnTo>
-                  <a:pt x="0" y="1290491"/>
-                </a:lnTo>
-                <a:lnTo>
-                  <a:pt x="60675" y="1190617"/>
-                </a:lnTo>
-                <a:cubicBezTo>
-                  <a:pt x="545971" y="472284"/>
-                  <a:pt x="1367810" y="0"/>
-                  <a:pt x="2299956" y="0"/>
-                </a:cubicBezTo>
-                <a:close/>
-              </a:path>
-            </a:pathLst>
-          </a:custGeom>
-          <a:solidFill>
-            <a:srgbClr val="FFFFFF"/>
-          </a:solidFill>
+          </a:prstGeom>
           <a:ln>
-            <a:gradFill>
-              <a:gsLst>
-                <a:gs pos="0">
-                  <a:schemeClr val="accent1">
-                    <a:lumMod val="40000"/>
-                    <a:lumOff val="60000"/>
-                  </a:schemeClr>
-                </a:gs>
-                <a:gs pos="23000">
-                  <a:schemeClr val="accent1">
-                    <a:lumMod val="45000"/>
-                    <a:lumOff val="55000"/>
-                  </a:schemeClr>
-                </a:gs>
-                <a:gs pos="83000">
-                  <a:schemeClr val="bg2">
-                    <a:lumMod val="85000"/>
-                  </a:schemeClr>
-                </a:gs>
-                <a:gs pos="100000">
-                  <a:schemeClr val="bg2">
-                    <a:lumMod val="85000"/>
-                  </a:schemeClr>
-                </a:gs>
-              </a:gsLst>
-              <a:lin ang="5400000" scaled="1"/>
-            </a:gradFill>
+            <a:noFill/>
           </a:ln>
         </p:spPr>
         <p:style>
@@ -7174,9 +8410,7 @@
           </a:fontRef>
         </p:style>
         <p:txBody>
-          <a:bodyPr wrap="square" rtlCol="0" anchor="ctr">
-            <a:noAutofit/>
-          </a:bodyPr>
+          <a:bodyPr rtlCol="0" anchor="ctr"/>
           <a:lstStyle/>
           <a:p>
             <a:pPr algn="ctr"/>
@@ -7184,28 +8418,111 @@
           </a:p>
         </p:txBody>
       </p:sp>
+      <p:sp>
+        <p:nvSpPr>
+          <p:cNvPr id="11" name="Rectangle 10">
+            <a:extLst>
+              <a:ext uri="{FF2B5EF4-FFF2-40B4-BE49-F238E27FC236}">
+                <a16:creationId xmlns:a16="http://schemas.microsoft.com/office/drawing/2014/main" id="{B4F5FA0D-0104-4987-8241-EFF7C85B88DE}"/>
+              </a:ext>
+              <a:ext uri="{C183D7F6-B498-43B3-948B-1728B52AA6E4}">
+                <adec:decorative xmlns:adec="http://schemas.microsoft.com/office/drawing/2017/decorative" val="1"/>
+              </a:ext>
+            </a:extLst>
+          </p:cNvPr>
+          <p:cNvSpPr>
+            <a:spLocks noGrp="1" noRot="1" noChangeAspect="1" noMove="1" noResize="1" noEditPoints="1" noAdjustHandles="1" noChangeArrowheads="1" noChangeShapeType="1" noTextEdit="1"/>
+          </p:cNvSpPr>
+          <p:nvPr>
+            <p:extLst>
+              <p:ext uri="{386F3935-93C4-4BCD-93E2-E3B085C9AB24}">
+                <p16:designElem xmlns:p16="http://schemas.microsoft.com/office/powerpoint/2015/main" val="1"/>
+              </p:ext>
+            </p:extLst>
+          </p:nvPr>
+        </p:nvSpPr>
+        <p:spPr>
+          <a:xfrm>
+            <a:off x="1" y="0"/>
+            <a:ext cx="12191998" cy="6858000"/>
+          </a:xfrm>
+          <a:prstGeom prst="rect">
+            <a:avLst/>
+          </a:prstGeom>
+          <a:gradFill>
+            <a:gsLst>
+              <a:gs pos="0">
+                <a:schemeClr val="accent1"/>
+              </a:gs>
+              <a:gs pos="25000">
+                <a:schemeClr val="accent1"/>
+              </a:gs>
+              <a:gs pos="94000">
+                <a:schemeClr val="accent5"/>
+              </a:gs>
+              <a:gs pos="100000">
+                <a:schemeClr val="accent5"/>
+              </a:gs>
+            </a:gsLst>
+            <a:lin ang="4200000" scaled="0"/>
+          </a:gradFill>
+          <a:ln>
+            <a:noFill/>
+          </a:ln>
+        </p:spPr>
+        <p:style>
+          <a:lnRef idx="2">
+            <a:schemeClr val="accent1">
+              <a:shade val="50000"/>
+            </a:schemeClr>
+          </a:lnRef>
+          <a:fillRef idx="1">
+            <a:schemeClr val="accent1"/>
+          </a:fillRef>
+          <a:effectRef idx="0">
+            <a:schemeClr val="accent1"/>
+          </a:effectRef>
+          <a:fontRef idx="minor">
+            <a:schemeClr val="lt1"/>
+          </a:fontRef>
+        </p:style>
+        <p:txBody>
+          <a:bodyPr rtlCol="0" anchor="ctr"/>
+          <a:lstStyle/>
+          <a:p>
+            <a:pPr algn="ctr"/>
+            <a:endParaRPr lang="en-US"/>
+          </a:p>
+        </p:txBody>
+      </p:sp>
       <p:pic>
         <p:nvPicPr>
-          <p:cNvPr id="15" name="Graphic 14" descr="Euro">
-            <a:extLst>
-              <a:ext uri="{FF2B5EF4-FFF2-40B4-BE49-F238E27FC236}">
-                <a16:creationId xmlns:a16="http://schemas.microsoft.com/office/drawing/2014/main" id="{857BE960-D167-4EC8-801B-14C4DBD02564}"/>
+          <p:cNvPr id="13" name="Picture 12">
+            <a:extLst>
+              <a:ext uri="{FF2B5EF4-FFF2-40B4-BE49-F238E27FC236}">
+                <a16:creationId xmlns:a16="http://schemas.microsoft.com/office/drawing/2014/main" id="{2897127E-6CEF-446C-BE87-93B7C46E49D1}"/>
+              </a:ext>
+              <a:ext uri="{C183D7F6-B498-43B3-948B-1728B52AA6E4}">
+                <adec:decorative xmlns:adec="http://schemas.microsoft.com/office/drawing/2017/decorative" val="1"/>
               </a:ext>
             </a:extLst>
           </p:cNvPr>
           <p:cNvPicPr>
-            <a:picLocks noChangeAspect="1"/>
+            <a:picLocks noGrp="1" noRot="1" noChangeAspect="1" noMove="1" noResize="1" noEditPoints="1" noAdjustHandles="1" noChangeArrowheads="1" noChangeShapeType="1" noCrop="1"/>
           </p:cNvPicPr>
-          <p:nvPr/>
+          <p:nvPr>
+            <p:extLst>
+              <p:ext uri="{386F3935-93C4-4BCD-93E2-E3B085C9AB24}">
+                <p16:designElem xmlns:p16="http://schemas.microsoft.com/office/powerpoint/2015/main" val="1"/>
+              </p:ext>
+            </p:extLst>
+          </p:nvPr>
         </p:nvPicPr>
         <p:blipFill>
-          <a:blip r:embed="rId3">
+          <a:blip r:embed="rId2">
             <a:extLst>
               <a:ext uri="{28A0092B-C50C-407E-A947-70E740481C1C}">
                 <a14:useLocalDpi xmlns:a14="http://schemas.microsoft.com/office/drawing/2010/main" val="0"/>
-              </a:ext>
-              <a:ext uri="{96DAC541-7B7A-43D3-8B79-37D633B846F1}">
-                <asvg:svgBlip xmlns:asvg="http://schemas.microsoft.com/office/drawing/2016/SVG/main" r:embed="rId4"/>
               </a:ext>
             </a:extLst>
           </a:blip>
@@ -7215,8 +8532,8 @@
         </p:blipFill>
         <p:spPr>
           <a:xfrm>
-            <a:off x="450254" y="1629089"/>
-            <a:ext cx="3620021" cy="3620021"/>
+            <a:off x="0" y="0"/>
+            <a:ext cx="12192000" cy="6858000"/>
           </a:xfrm>
           <a:prstGeom prst="rect">
             <a:avLst/>
@@ -7225,10 +8542,62 @@
       </p:pic>
       <p:sp>
         <p:nvSpPr>
-          <p:cNvPr id="9" name="TextBox 8">
-            <a:extLst>
-              <a:ext uri="{FF2B5EF4-FFF2-40B4-BE49-F238E27FC236}">
-                <a16:creationId xmlns:a16="http://schemas.microsoft.com/office/drawing/2014/main" id="{FEFE440E-5C6A-4B1D-B67D-CF2ECE49B56F}"/>
+          <p:cNvPr id="2" name="Title 1">
+            <a:extLst>
+              <a:ext uri="{FF2B5EF4-FFF2-40B4-BE49-F238E27FC236}">
+                <a16:creationId xmlns:a16="http://schemas.microsoft.com/office/drawing/2014/main" id="{004F2053-AB8D-479A-866D-0DF818ABCE55}"/>
+              </a:ext>
+            </a:extLst>
+          </p:cNvPr>
+          <p:cNvSpPr>
+            <a:spLocks noGrp="1"/>
+          </p:cNvSpPr>
+          <p:nvPr>
+            <p:ph type="title"/>
+          </p:nvPr>
+        </p:nvSpPr>
+        <p:spPr>
+          <a:xfrm>
+            <a:off x="488539" y="1186249"/>
+            <a:ext cx="3669161" cy="4399005"/>
+          </a:xfrm>
+        </p:spPr>
+        <p:txBody>
+          <a:bodyPr vert="horz" lIns="91440" tIns="45720" rIns="91440" bIns="45720" rtlCol="0" anchor="ctr">
+            <a:normAutofit/>
+          </a:bodyPr>
+          <a:lstStyle/>
+          <a:p>
+            <a:pPr algn="ctr"/>
+            <a:r>
+              <a:rPr lang="en-US" sz="3200" b="1" dirty="0">
+                <a:solidFill>
+                  <a:schemeClr val="bg1"/>
+                </a:solidFill>
+                <a:effectLst/>
+                <a:latin typeface="+mj-lt"/>
+                <a:ea typeface="Calibri" panose="020F0502020204030204" pitchFamily="34" charset="0"/>
+                <a:cs typeface="Calibri" panose="020F0502020204030204" pitchFamily="34" charset="0"/>
+              </a:rPr>
+              <a:t>Proposals with the most potential for increased revenue</a:t>
+            </a:r>
+            <a:endParaRPr lang="en-US" sz="3100" kern="1200" dirty="0">
+              <a:solidFill>
+                <a:schemeClr val="bg1"/>
+              </a:solidFill>
+              <a:latin typeface="+mj-lt"/>
+              <a:ea typeface="+mj-ea"/>
+              <a:cs typeface="+mj-cs"/>
+            </a:endParaRPr>
+          </a:p>
+        </p:txBody>
+      </p:sp>
+      <p:sp>
+        <p:nvSpPr>
+          <p:cNvPr id="8" name="TextBox 7">
+            <a:extLst>
+              <a:ext uri="{FF2B5EF4-FFF2-40B4-BE49-F238E27FC236}">
+                <a16:creationId xmlns:a16="http://schemas.microsoft.com/office/drawing/2014/main" id="{1C559B9D-11E1-42A3-9AF7-8F3C40C3B867}"/>
               </a:ext>
             </a:extLst>
           </p:cNvPr>
@@ -7237,120 +8606,23 @@
         </p:nvSpPr>
         <p:spPr>
           <a:xfrm>
-            <a:off x="6065129" y="2112192"/>
-            <a:ext cx="4977578" cy="3639289"/>
+            <a:off x="6109891" y="1597293"/>
+            <a:ext cx="5735851" cy="3605154"/>
           </a:xfrm>
           <a:prstGeom prst="rect">
             <a:avLst/>
           </a:prstGeom>
+          <a:noFill/>
         </p:spPr>
         <p:txBody>
-          <a:bodyPr vert="horz" lIns="91440" tIns="45720" rIns="91440" bIns="45720" rtlCol="0" anchor="ctr">
-            <a:normAutofit/>
+          <a:bodyPr wrap="square">
+            <a:spAutoFit/>
           </a:bodyPr>
           <a:lstStyle/>
           <a:p>
-            <a:pPr indent="-228600">
+            <a:pPr marR="0" lvl="0">
               <a:lnSpc>
-                <a:spcPct val="90000"/>
-              </a:lnSpc>
-              <a:buFont typeface="Arial" panose="020B0604020202020204" pitchFamily="34" charset="0"/>
-              <a:buChar char="•"/>
-            </a:pPr>
-            <a:r>
-              <a:rPr lang="en-US" sz="1900" dirty="0">
-                <a:solidFill>
-                  <a:srgbClr val="000000"/>
-                </a:solidFill>
-                <a:effectLst/>
-              </a:rPr>
-              <a:t>Model predicts a ticket price of </a:t>
-            </a:r>
-            <a:r>
-              <a:rPr lang="en-US" sz="1900" b="1" dirty="0">
-                <a:solidFill>
-                  <a:srgbClr val="000000"/>
-                </a:solidFill>
-                <a:effectLst/>
-              </a:rPr>
-              <a:t>$95.87 </a:t>
-            </a:r>
-            <a:r>
-              <a:rPr lang="en-US" sz="1900" dirty="0">
-                <a:solidFill>
-                  <a:srgbClr val="000000"/>
-                </a:solidFill>
-                <a:effectLst/>
-              </a:rPr>
-              <a:t>with a mean absolute error of. $10.39. </a:t>
-            </a:r>
-            <a:r>
-              <a:rPr lang="en-US" sz="1900" dirty="0">
-                <a:solidFill>
-                  <a:srgbClr val="000000"/>
-                </a:solidFill>
-              </a:rPr>
-              <a:t>It </a:t>
-            </a:r>
-            <a:r>
-              <a:rPr lang="en-US" sz="1900" dirty="0">
-                <a:solidFill>
-                  <a:srgbClr val="000000"/>
-                </a:solidFill>
-                <a:effectLst/>
-              </a:rPr>
-              <a:t>suggests there is room for an increase.</a:t>
-            </a:r>
-          </a:p>
-          <a:p>
-            <a:pPr indent="-228600">
-              <a:lnSpc>
-                <a:spcPct val="90000"/>
-              </a:lnSpc>
-              <a:buFont typeface="Arial" panose="020B0604020202020204" pitchFamily="34" charset="0"/>
-              <a:buChar char="•"/>
-            </a:pPr>
-            <a:endParaRPr lang="en-US" sz="1900" dirty="0">
-              <a:solidFill>
-                <a:srgbClr val="000000"/>
-              </a:solidFill>
-            </a:endParaRPr>
-          </a:p>
-          <a:p>
-            <a:pPr indent="-228600">
-              <a:lnSpc>
-                <a:spcPct val="90000"/>
-              </a:lnSpc>
-              <a:buFont typeface="Arial" panose="020B0604020202020204" pitchFamily="34" charset="0"/>
-              <a:buChar char="•"/>
-            </a:pPr>
-            <a:r>
-              <a:rPr lang="en-US" sz="1900" b="1" dirty="0">
-                <a:solidFill>
-                  <a:srgbClr val="000000"/>
-                </a:solidFill>
-              </a:rPr>
-              <a:t>Other Proposals to consider:</a:t>
-            </a:r>
-          </a:p>
-          <a:p>
-            <a:pPr indent="-228600">
-              <a:lnSpc>
-                <a:spcPct val="90000"/>
-              </a:lnSpc>
-              <a:buFont typeface="Arial" panose="020B0604020202020204" pitchFamily="34" charset="0"/>
-              <a:buChar char="•"/>
-            </a:pPr>
-            <a:endParaRPr lang="en-US" sz="1900" dirty="0">
-              <a:solidFill>
-                <a:srgbClr val="000000"/>
-              </a:solidFill>
-            </a:endParaRPr>
-          </a:p>
-          <a:p>
-            <a:pPr marR="0" lvl="0" indent="-228600">
-              <a:lnSpc>
-                <a:spcPct val="90000"/>
+                <a:spcPct val="107000"/>
               </a:lnSpc>
               <a:spcBef>
                 <a:spcPts val="0"/>
@@ -7358,46 +8630,52 @@
               <a:spcAft>
                 <a:spcPts val="800"/>
               </a:spcAft>
-              <a:buFont typeface="Arial" panose="020B0604020202020204" pitchFamily="34" charset="0"/>
-              <a:buChar char="•"/>
             </a:pPr>
             <a:r>
-              <a:rPr lang="en-US" sz="1900" b="1" dirty="0">
-                <a:solidFill>
-                  <a:srgbClr val="000000"/>
-                </a:solidFill>
+              <a:rPr lang="en-US" sz="2800" b="1" dirty="0">
                 <a:effectLst/>
+                <a:latin typeface="+mj-lt"/>
+                <a:ea typeface="Calibri" panose="020F0502020204030204" pitchFamily="34" charset="0"/>
+                <a:cs typeface="Calibri" panose="020F0502020204030204" pitchFamily="34" charset="0"/>
               </a:rPr>
               <a:t>Close top 1 unused run.</a:t>
             </a:r>
             <a:br>
-              <a:rPr lang="en-US" sz="1900" dirty="0">
-                <a:solidFill>
-                  <a:srgbClr val="000000"/>
-                </a:solidFill>
+              <a:rPr lang="en-US" sz="2400" dirty="0">
                 <a:effectLst/>
+                <a:latin typeface="+mj-lt"/>
+                <a:ea typeface="Calibri" panose="020F0502020204030204" pitchFamily="34" charset="0"/>
+                <a:cs typeface="Calibri" panose="020F0502020204030204" pitchFamily="34" charset="0"/>
               </a:rPr>
             </a:br>
             <a:r>
-              <a:rPr lang="en-US" sz="1900" dirty="0">
-                <a:solidFill>
-                  <a:srgbClr val="000000"/>
-                </a:solidFill>
+              <a:rPr lang="en-US" sz="2000" dirty="0">
                 <a:effectLst/>
+                <a:latin typeface="+mj-lt"/>
+                <a:ea typeface="Calibri" panose="020F0502020204030204" pitchFamily="34" charset="0"/>
+                <a:cs typeface="Calibri" panose="020F0502020204030204" pitchFamily="34" charset="0"/>
               </a:rPr>
-              <a:t>Model says closing one run makes no difference.</a:t>
-            </a:r>
-            <a:endParaRPr lang="en-US" sz="1900" b="1" dirty="0">
-              <a:solidFill>
-                <a:srgbClr val="000000"/>
-              </a:solidFill>
+              <a:t>Model says closing one run makes no difference. This may lead to reduced operating costs.</a:t>
+            </a:r>
+            <a:br>
+              <a:rPr lang="en-US" sz="2400" dirty="0">
+                <a:effectLst/>
+                <a:latin typeface="+mj-lt"/>
+                <a:ea typeface="Calibri" panose="020F0502020204030204" pitchFamily="34" charset="0"/>
+                <a:cs typeface="Calibri" panose="020F0502020204030204" pitchFamily="34" charset="0"/>
+              </a:rPr>
+            </a:br>
+            <a:endParaRPr lang="en-US" sz="2400" b="1" dirty="0">
               <a:effectLst/>
+              <a:latin typeface="+mj-lt"/>
+              <a:ea typeface="Calibri" panose="020F0502020204030204" pitchFamily="34" charset="0"/>
+              <a:cs typeface="Calibri" panose="020F0502020204030204" pitchFamily="34" charset="0"/>
             </a:endParaRPr>
           </a:p>
           <a:p>
-            <a:pPr marR="0" lvl="0" indent="-228600">
+            <a:pPr marR="0" lvl="0">
               <a:lnSpc>
-                <a:spcPct val="90000"/>
+                <a:spcPct val="107000"/>
               </a:lnSpc>
               <a:spcBef>
                 <a:spcPts val="0"/>
@@ -7405,42 +8683,75 @@
               <a:spcAft>
                 <a:spcPts val="800"/>
               </a:spcAft>
-              <a:buFont typeface="Arial" panose="020B0604020202020204" pitchFamily="34" charset="0"/>
-              <a:buChar char="•"/>
             </a:pPr>
             <a:r>
-              <a:rPr lang="en-US" sz="1900" b="1" dirty="0">
-                <a:solidFill>
-                  <a:srgbClr val="000000"/>
-                </a:solidFill>
+              <a:rPr lang="en-US" sz="2800" b="1" dirty="0">
                 <a:effectLst/>
+                <a:latin typeface="+mj-lt"/>
+                <a:ea typeface="Calibri" panose="020F0502020204030204" pitchFamily="34" charset="0"/>
+                <a:cs typeface="Calibri" panose="020F0502020204030204" pitchFamily="34" charset="0"/>
               </a:rPr>
               <a:t>Increase vertical drop 150 feet and install additional chair lift.</a:t>
             </a:r>
             <a:br>
-              <a:rPr lang="en-US" sz="1900" dirty="0">
-                <a:solidFill>
-                  <a:srgbClr val="000000"/>
-                </a:solidFill>
+              <a:rPr lang="en-US" sz="2400" dirty="0">
                 <a:effectLst/>
+                <a:latin typeface="+mj-lt"/>
+                <a:ea typeface="Calibri" panose="020F0502020204030204" pitchFamily="34" charset="0"/>
+                <a:cs typeface="Calibri" panose="020F0502020204030204" pitchFamily="34" charset="0"/>
               </a:rPr>
             </a:br>
             <a:r>
-              <a:rPr lang="en-US" sz="1900" dirty="0">
-                <a:solidFill>
-                  <a:srgbClr val="000000"/>
-                </a:solidFill>
+              <a:rPr lang="en-US" sz="2000" dirty="0">
                 <a:effectLst/>
+                <a:latin typeface="+mj-lt"/>
+                <a:ea typeface="Calibri" panose="020F0502020204030204" pitchFamily="34" charset="0"/>
+                <a:cs typeface="Calibri" panose="020F0502020204030204" pitchFamily="34" charset="0"/>
               </a:rPr>
-              <a:t>This scenario increases support for ticket price by $1.99 and over the season this could be expected to amount to $3474638.00</a:t>
-            </a:r>
+              <a:t>This scenario increases support for ticket price by an additional $1.99 and over the season this could be expected to amount to $3,474,638.00</a:t>
+            </a:r>
+            <a:endParaRPr lang="en-US" sz="2400" dirty="0">
+              <a:effectLst/>
+              <a:latin typeface="+mj-lt"/>
+              <a:ea typeface="Calibri" panose="020F0502020204030204" pitchFamily="34" charset="0"/>
+              <a:cs typeface="Times New Roman" panose="02020603050405020304" pitchFamily="18" charset="0"/>
+            </a:endParaRPr>
+          </a:p>
+        </p:txBody>
+      </p:sp>
+      <p:sp>
+        <p:nvSpPr>
+          <p:cNvPr id="3" name="Slide Number Placeholder 2">
+            <a:extLst>
+              <a:ext uri="{FF2B5EF4-FFF2-40B4-BE49-F238E27FC236}">
+                <a16:creationId xmlns:a16="http://schemas.microsoft.com/office/drawing/2014/main" id="{8B63AA6B-BDC3-4A59-BFC9-0B23E9907802}"/>
+              </a:ext>
+            </a:extLst>
+          </p:cNvPr>
+          <p:cNvSpPr>
+            <a:spLocks noGrp="1"/>
+          </p:cNvSpPr>
+          <p:nvPr>
+            <p:ph type="sldNum" sz="quarter" idx="12"/>
+          </p:nvPr>
+        </p:nvSpPr>
+        <p:spPr/>
+        <p:txBody>
+          <a:bodyPr/>
+          <a:lstStyle/>
+          <a:p>
+            <a:fld id="{144EF1FE-37A2-4E8F-9397-BF5241D9507E}" type="slidenum">
+              <a:rPr lang="en-US" smtClean="0"/>
+              <a:t>9</a:t>
+            </a:fld>
+            <a:endParaRPr lang="en-US"/>
           </a:p>
         </p:txBody>
       </p:sp>
     </p:spTree>
     <p:extLst>
       <p:ext uri="{BB962C8B-B14F-4D97-AF65-F5344CB8AC3E}">
-        <p14:creationId xmlns:p14="http://schemas.microsoft.com/office/powerpoint/2010/main" val="1156192561"/>
+        <p14:creationId xmlns:p14="http://schemas.microsoft.com/office/powerpoint/2010/main" val="24443582"/>
       </p:ext>
     </p:extLst>
   </p:cSld>
@@ -7743,4 +9054,299 @@
     </a:ext>
   </a:extLst>
 </a:theme>
+</file>
+
+<file path=ppt/theme/theme2.xml><?xml version="1.0" encoding="utf-8"?>
+<a:theme xmlns:a="http://schemas.openxmlformats.org/drawingml/2006/main" name="Office Theme">
+  <a:themeElements>
+    <a:clrScheme name="Office">
+      <a:dk1>
+        <a:sysClr val="windowText" lastClr="000000"/>
+      </a:dk1>
+      <a:lt1>
+        <a:sysClr val="window" lastClr="FFFFFF"/>
+      </a:lt1>
+      <a:dk2>
+        <a:srgbClr val="44546A"/>
+      </a:dk2>
+      <a:lt2>
+        <a:srgbClr val="E7E6E6"/>
+      </a:lt2>
+      <a:accent1>
+        <a:srgbClr val="4472C4"/>
+      </a:accent1>
+      <a:accent2>
+        <a:srgbClr val="ED7D31"/>
+      </a:accent2>
+      <a:accent3>
+        <a:srgbClr val="A5A5A5"/>
+      </a:accent3>
+      <a:accent4>
+        <a:srgbClr val="FFC000"/>
+      </a:accent4>
+      <a:accent5>
+        <a:srgbClr val="5B9BD5"/>
+      </a:accent5>
+      <a:accent6>
+        <a:srgbClr val="70AD47"/>
+      </a:accent6>
+      <a:hlink>
+        <a:srgbClr val="0563C1"/>
+      </a:hlink>
+      <a:folHlink>
+        <a:srgbClr val="954F72"/>
+      </a:folHlink>
+    </a:clrScheme>
+    <a:fontScheme name="Office">
+      <a:majorFont>
+        <a:latin typeface="Calibri Light" panose="020F0302020204030204"/>
+        <a:ea typeface=""/>
+        <a:cs typeface=""/>
+        <a:font script="Jpan" typeface="游ゴシック Light"/>
+        <a:font script="Hang" typeface="맑은 고딕"/>
+        <a:font script="Hans" typeface="等线 Light"/>
+        <a:font script="Hant" typeface="新細明體"/>
+        <a:font script="Arab" typeface="Times New Roman"/>
+        <a:font script="Hebr" typeface="Times New Roman"/>
+        <a:font script="Thai" typeface="Angsana New"/>
+        <a:font script="Ethi" typeface="Nyala"/>
+        <a:font script="Beng" typeface="Vrinda"/>
+        <a:font script="Gujr" typeface="Shruti"/>
+        <a:font script="Khmr" typeface="MoolBoran"/>
+        <a:font script="Knda" typeface="Tunga"/>
+        <a:font script="Guru" typeface="Raavi"/>
+        <a:font script="Cans" typeface="Euphemia"/>
+        <a:font script="Cher" typeface="Plantagenet Cherokee"/>
+        <a:font script="Yiii" typeface="Microsoft Yi Baiti"/>
+        <a:font script="Tibt" typeface="Microsoft Himalaya"/>
+        <a:font script="Thaa" typeface="MV Boli"/>
+        <a:font script="Deva" typeface="Mangal"/>
+        <a:font script="Telu" typeface="Gautami"/>
+        <a:font script="Taml" typeface="Latha"/>
+        <a:font script="Syrc" typeface="Estrangelo Edessa"/>
+        <a:font script="Orya" typeface="Kalinga"/>
+        <a:font script="Mlym" typeface="Kartika"/>
+        <a:font script="Laoo" typeface="DokChampa"/>
+        <a:font script="Sinh" typeface="Iskoola Pota"/>
+        <a:font script="Mong" typeface="Mongolian Baiti"/>
+        <a:font script="Viet" typeface="Times New Roman"/>
+        <a:font script="Uigh" typeface="Microsoft Uighur"/>
+        <a:font script="Geor" typeface="Sylfaen"/>
+        <a:font script="Armn" typeface="Arial"/>
+        <a:font script="Bugi" typeface="Leelawadee UI"/>
+        <a:font script="Bopo" typeface="Microsoft JhengHei"/>
+        <a:font script="Java" typeface="Javanese Text"/>
+        <a:font script="Lisu" typeface="Segoe UI"/>
+        <a:font script="Mymr" typeface="Myanmar Text"/>
+        <a:font script="Nkoo" typeface="Ebrima"/>
+        <a:font script="Olck" typeface="Nirmala UI"/>
+        <a:font script="Osma" typeface="Ebrima"/>
+        <a:font script="Phag" typeface="Phagspa"/>
+        <a:font script="Syrn" typeface="Estrangelo Edessa"/>
+        <a:font script="Syrj" typeface="Estrangelo Edessa"/>
+        <a:font script="Syre" typeface="Estrangelo Edessa"/>
+        <a:font script="Sora" typeface="Nirmala UI"/>
+        <a:font script="Tale" typeface="Microsoft Tai Le"/>
+        <a:font script="Talu" typeface="Microsoft New Tai Lue"/>
+        <a:font script="Tfng" typeface="Ebrima"/>
+      </a:majorFont>
+      <a:minorFont>
+        <a:latin typeface="Calibri" panose="020F0502020204030204"/>
+        <a:ea typeface=""/>
+        <a:cs typeface=""/>
+        <a:font script="Jpan" typeface="游ゴシック"/>
+        <a:font script="Hang" typeface="맑은 고딕"/>
+        <a:font script="Hans" typeface="等线"/>
+        <a:font script="Hant" typeface="新細明體"/>
+        <a:font script="Arab" typeface="Arial"/>
+        <a:font script="Hebr" typeface="Arial"/>
+        <a:font script="Thai" typeface="Cordia New"/>
+        <a:font script="Ethi" typeface="Nyala"/>
+        <a:font script="Beng" typeface="Vrinda"/>
+        <a:font script="Gujr" typeface="Shruti"/>
+        <a:font script="Khmr" typeface="DaunPenh"/>
+        <a:font script="Knda" typeface="Tunga"/>
+        <a:font script="Guru" typeface="Raavi"/>
+        <a:font script="Cans" typeface="Euphemia"/>
+        <a:font script="Cher" typeface="Plantagenet Cherokee"/>
+        <a:font script="Yiii" typeface="Microsoft Yi Baiti"/>
+        <a:font script="Tibt" typeface="Microsoft Himalaya"/>
+        <a:font script="Thaa" typeface="MV Boli"/>
+        <a:font script="Deva" typeface="Mangal"/>
+        <a:font script="Telu" typeface="Gautami"/>
+        <a:font script="Taml" typeface="Latha"/>
+        <a:font script="Syrc" typeface="Estrangelo Edessa"/>
+        <a:font script="Orya" typeface="Kalinga"/>
+        <a:font script="Mlym" typeface="Kartika"/>
+        <a:font script="Laoo" typeface="DokChampa"/>
+        <a:font script="Sinh" typeface="Iskoola Pota"/>
+        <a:font script="Mong" typeface="Mongolian Baiti"/>
+        <a:font script="Viet" typeface="Arial"/>
+        <a:font script="Uigh" typeface="Microsoft Uighur"/>
+        <a:font script="Geor" typeface="Sylfaen"/>
+        <a:font script="Armn" typeface="Arial"/>
+        <a:font script="Bugi" typeface="Leelawadee UI"/>
+        <a:font script="Bopo" typeface="Microsoft JhengHei"/>
+        <a:font script="Java" typeface="Javanese Text"/>
+        <a:font script="Lisu" typeface="Segoe UI"/>
+        <a:font script="Mymr" typeface="Myanmar Text"/>
+        <a:font script="Nkoo" typeface="Ebrima"/>
+        <a:font script="Olck" typeface="Nirmala UI"/>
+        <a:font script="Osma" typeface="Ebrima"/>
+        <a:font script="Phag" typeface="Phagspa"/>
+        <a:font script="Syrn" typeface="Estrangelo Edessa"/>
+        <a:font script="Syrj" typeface="Estrangelo Edessa"/>
+        <a:font script="Syre" typeface="Estrangelo Edessa"/>
+        <a:font script="Sora" typeface="Nirmala UI"/>
+        <a:font script="Tale" typeface="Microsoft Tai Le"/>
+        <a:font script="Talu" typeface="Microsoft New Tai Lue"/>
+        <a:font script="Tfng" typeface="Ebrima"/>
+      </a:minorFont>
+    </a:fontScheme>
+    <a:fmtScheme name="Office">
+      <a:fillStyleLst>
+        <a:solidFill>
+          <a:schemeClr val="phClr"/>
+        </a:solidFill>
+        <a:gradFill rotWithShape="1">
+          <a:gsLst>
+            <a:gs pos="0">
+              <a:schemeClr val="phClr">
+                <a:lumMod val="110000"/>
+                <a:satMod val="105000"/>
+                <a:tint val="67000"/>
+              </a:schemeClr>
+            </a:gs>
+            <a:gs pos="50000">
+              <a:schemeClr val="phClr">
+                <a:lumMod val="105000"/>
+                <a:satMod val="103000"/>
+                <a:tint val="73000"/>
+              </a:schemeClr>
+            </a:gs>
+            <a:gs pos="100000">
+              <a:schemeClr val="phClr">
+                <a:lumMod val="105000"/>
+                <a:satMod val="109000"/>
+                <a:tint val="81000"/>
+              </a:schemeClr>
+            </a:gs>
+          </a:gsLst>
+          <a:lin ang="5400000" scaled="0"/>
+        </a:gradFill>
+        <a:gradFill rotWithShape="1">
+          <a:gsLst>
+            <a:gs pos="0">
+              <a:schemeClr val="phClr">
+                <a:satMod val="103000"/>
+                <a:lumMod val="102000"/>
+                <a:tint val="94000"/>
+              </a:schemeClr>
+            </a:gs>
+            <a:gs pos="50000">
+              <a:schemeClr val="phClr">
+                <a:satMod val="110000"/>
+                <a:lumMod val="100000"/>
+                <a:shade val="100000"/>
+              </a:schemeClr>
+            </a:gs>
+            <a:gs pos="100000">
+              <a:schemeClr val="phClr">
+                <a:lumMod val="99000"/>
+                <a:satMod val="120000"/>
+                <a:shade val="78000"/>
+              </a:schemeClr>
+            </a:gs>
+          </a:gsLst>
+          <a:lin ang="5400000" scaled="0"/>
+        </a:gradFill>
+      </a:fillStyleLst>
+      <a:lnStyleLst>
+        <a:ln w="6350" cap="flat" cmpd="sng" algn="ctr">
+          <a:solidFill>
+            <a:schemeClr val="phClr"/>
+          </a:solidFill>
+          <a:prstDash val="solid"/>
+          <a:miter lim="800000"/>
+        </a:ln>
+        <a:ln w="12700" cap="flat" cmpd="sng" algn="ctr">
+          <a:solidFill>
+            <a:schemeClr val="phClr"/>
+          </a:solidFill>
+          <a:prstDash val="solid"/>
+          <a:miter lim="800000"/>
+        </a:ln>
+        <a:ln w="19050" cap="flat" cmpd="sng" algn="ctr">
+          <a:solidFill>
+            <a:schemeClr val="phClr"/>
+          </a:solidFill>
+          <a:prstDash val="solid"/>
+          <a:miter lim="800000"/>
+        </a:ln>
+      </a:lnStyleLst>
+      <a:effectStyleLst>
+        <a:effectStyle>
+          <a:effectLst/>
+        </a:effectStyle>
+        <a:effectStyle>
+          <a:effectLst/>
+        </a:effectStyle>
+        <a:effectStyle>
+          <a:effectLst>
+            <a:outerShdw blurRad="57150" dist="19050" dir="5400000" algn="ctr" rotWithShape="0">
+              <a:srgbClr val="000000">
+                <a:alpha val="63000"/>
+              </a:srgbClr>
+            </a:outerShdw>
+          </a:effectLst>
+        </a:effectStyle>
+      </a:effectStyleLst>
+      <a:bgFillStyleLst>
+        <a:solidFill>
+          <a:schemeClr val="phClr"/>
+        </a:solidFill>
+        <a:solidFill>
+          <a:schemeClr val="phClr">
+            <a:tint val="95000"/>
+            <a:satMod val="170000"/>
+          </a:schemeClr>
+        </a:solidFill>
+        <a:gradFill rotWithShape="1">
+          <a:gsLst>
+            <a:gs pos="0">
+              <a:schemeClr val="phClr">
+                <a:tint val="93000"/>
+                <a:satMod val="150000"/>
+                <a:shade val="98000"/>
+                <a:lumMod val="102000"/>
+              </a:schemeClr>
+            </a:gs>
+            <a:gs pos="50000">
+              <a:schemeClr val="phClr">
+                <a:tint val="98000"/>
+                <a:satMod val="130000"/>
+                <a:shade val="90000"/>
+                <a:lumMod val="103000"/>
+              </a:schemeClr>
+            </a:gs>
+            <a:gs pos="100000">
+              <a:schemeClr val="phClr">
+                <a:shade val="63000"/>
+                <a:satMod val="120000"/>
+              </a:schemeClr>
+            </a:gs>
+          </a:gsLst>
+          <a:lin ang="5400000" scaled="0"/>
+        </a:gradFill>
+      </a:bgFillStyleLst>
+    </a:fmtScheme>
+  </a:themeElements>
+  <a:objectDefaults/>
+  <a:extraClrSchemeLst/>
+  <a:extLst>
+    <a:ext uri="{05A4C25C-085E-4340-85A3-A5531E510DB2}">
+      <thm15:themeFamily xmlns:thm15="http://schemas.microsoft.com/office/thememl/2012/main" name="Office Theme" id="{62F939B6-93AF-4DB8-9C6B-D6C7DFDC589F}" vid="{4A3C46E8-61CC-4603-A589-7422A47A8E4A}"/>
+    </a:ext>
+  </a:extLst>
+</a:theme>
 </file>
</xml_diff>